<commit_message>
maj diapo + code fonctionnel avec login
</commit_message>
<xml_diff>
--- a/documentation/Diapo projetDMX.pptx
+++ b/documentation/Diapo projetDMX.pptx
@@ -124,6 +124,11 @@
       </a:defRPr>
     </a:lvl9pPr>
   </p:defaultTextStyle>
+  <p:extLst>
+    <p:ext uri="{EFAFB233-063F-42B5-8137-9DF3F51BA10A}">
+      <p15:sldGuideLst xmlns:p15="http://schemas.microsoft.com/office/powerpoint/2012/main"/>
+    </p:ext>
+  </p:extLst>
 </p:presentation>
 </file>
 
@@ -5543,7 +5548,7 @@
         </p:nvSpPr>
         <p:spPr>
           <a:xfrm>
-            <a:off x="858982" y="2125237"/>
+            <a:off x="5940936" y="2277637"/>
             <a:ext cx="4784729" cy="748146"/>
           </a:xfrm>
           <a:prstGeom prst="rect">
@@ -5566,69 +5571,19 @@
               <a:rPr lang="fr-FR" sz="2400" dirty="0" smtClean="0">
                 <a:latin typeface="+mj-lt"/>
               </a:rPr>
-              <a:t>- Logiciel Visual Studio Code</a:t>
-            </a:r>
-          </a:p>
-          <a:p>
-            <a:pPr marL="0" lvl="0" indent="0">
-              <a:buClr>
-                <a:schemeClr val="lt1"/>
-              </a:buClr>
-              <a:buSzPts val="1100"/>
-            </a:pPr>
-            <a:endParaRPr lang="fr-FR" sz="2400" dirty="0">
-              <a:latin typeface="+mj-lt"/>
-            </a:endParaRPr>
-          </a:p>
-          <a:p>
-            <a:pPr marL="0" lvl="0" indent="0">
-              <a:buClr>
-                <a:schemeClr val="lt1"/>
-              </a:buClr>
-              <a:buSzPts val="1100"/>
-            </a:pPr>
+              <a:t>- </a:t>
+            </a:r>
             <a:r>
               <a:rPr lang="fr-FR" sz="2400" dirty="0" smtClean="0">
                 <a:latin typeface="+mj-lt"/>
               </a:rPr>
-              <a:t>- Lumières </a:t>
+              <a:t>Logiciel </a:t>
             </a:r>
             <a:r>
               <a:rPr lang="fr-FR" sz="2400" dirty="0" err="1" smtClean="0">
                 <a:latin typeface="+mj-lt"/>
               </a:rPr>
-              <a:t>Saber</a:t>
-            </a:r>
-            <a:r>
-              <a:rPr lang="fr-FR" sz="2400" dirty="0" smtClean="0">
-                <a:latin typeface="+mj-lt"/>
-              </a:rPr>
-              <a:t> avec protocole DMX</a:t>
-            </a:r>
-          </a:p>
-          <a:p>
-            <a:pPr marL="0" lvl="0" indent="0">
-              <a:buClr>
-                <a:schemeClr val="lt1"/>
-              </a:buClr>
-              <a:buSzPts val="1100"/>
-            </a:pPr>
-            <a:endParaRPr lang="fr-FR" sz="2400" dirty="0">
-              <a:latin typeface="+mj-lt"/>
-            </a:endParaRPr>
-          </a:p>
-          <a:p>
-            <a:pPr marL="0" lvl="0" indent="0">
-              <a:buClr>
-                <a:schemeClr val="lt1"/>
-              </a:buClr>
-              <a:buSzPts val="1100"/>
-            </a:pPr>
-            <a:r>
-              <a:rPr lang="fr-FR" sz="2400" dirty="0" smtClean="0">
-                <a:latin typeface="+mj-lt"/>
-              </a:rPr>
-              <a:t>- Console matériel</a:t>
+              <a:t>arduino</a:t>
             </a:r>
             <a:endParaRPr sz="2400" dirty="0">
               <a:latin typeface="+mj-lt"/>
@@ -5679,6 +5634,142 @@
           </a:effectLst>
         </p:spPr>
       </p:pic>
+      <p:sp>
+        <p:nvSpPr>
+          <p:cNvPr id="5" name="Google Shape;221;p34"/>
+          <p:cNvSpPr txBox="1">
+            <a:spLocks noGrp="1"/>
+          </p:cNvSpPr>
+          <p:nvPr>
+            <p:ph type="subTitle" idx="4294967295"/>
+          </p:nvPr>
+        </p:nvSpPr>
+        <p:spPr>
+          <a:xfrm>
+            <a:off x="1011382" y="2277637"/>
+            <a:ext cx="4784729" cy="748146"/>
+          </a:xfrm>
+          <a:prstGeom prst="rect">
+            <a:avLst/>
+          </a:prstGeom>
+        </p:spPr>
+        <p:txBody>
+          <a:bodyPr spcFirstLastPara="1" wrap="square" lIns="91425" tIns="91425" rIns="91425" bIns="91425" anchor="t" anchorCtr="0">
+            <a:noAutofit/>
+          </a:bodyPr>
+          <a:lstStyle/>
+          <a:p>
+            <a:pPr marL="0" lvl="0" indent="0">
+              <a:buClr>
+                <a:schemeClr val="lt1"/>
+              </a:buClr>
+              <a:buSzPts val="1100"/>
+            </a:pPr>
+            <a:r>
+              <a:rPr lang="fr-FR" sz="2400" dirty="0" smtClean="0">
+                <a:latin typeface="+mj-lt"/>
+              </a:rPr>
+              <a:t>- Logiciel Visual Studio Code</a:t>
+            </a:r>
+          </a:p>
+          <a:p>
+            <a:pPr marL="0" lvl="0" indent="0">
+              <a:buClr>
+                <a:schemeClr val="lt1"/>
+              </a:buClr>
+              <a:buSzPts val="1100"/>
+            </a:pPr>
+            <a:endParaRPr lang="fr-FR" sz="2400" dirty="0">
+              <a:latin typeface="+mj-lt"/>
+            </a:endParaRPr>
+          </a:p>
+          <a:p>
+            <a:pPr marL="0" lvl="0" indent="0">
+              <a:buClr>
+                <a:schemeClr val="lt1"/>
+              </a:buClr>
+              <a:buSzPts val="1100"/>
+            </a:pPr>
+            <a:r>
+              <a:rPr lang="fr-FR" sz="2400" dirty="0" smtClean="0">
+                <a:latin typeface="+mj-lt"/>
+              </a:rPr>
+              <a:t>- Lumières </a:t>
+            </a:r>
+            <a:r>
+              <a:rPr lang="fr-FR" sz="2400" dirty="0" err="1" smtClean="0">
+                <a:latin typeface="+mj-lt"/>
+              </a:rPr>
+              <a:t>Saber</a:t>
+            </a:r>
+            <a:r>
+              <a:rPr lang="fr-FR" sz="2400" dirty="0" smtClean="0">
+                <a:latin typeface="+mj-lt"/>
+              </a:rPr>
+              <a:t> avec protocole DMX</a:t>
+            </a:r>
+          </a:p>
+          <a:p>
+            <a:pPr marL="0" lvl="0" indent="0">
+              <a:buClr>
+                <a:schemeClr val="lt1"/>
+              </a:buClr>
+              <a:buSzPts val="1100"/>
+            </a:pPr>
+            <a:endParaRPr lang="fr-FR" sz="2400" dirty="0">
+              <a:latin typeface="+mj-lt"/>
+            </a:endParaRPr>
+          </a:p>
+          <a:p>
+            <a:pPr marL="0" lvl="0" indent="0">
+              <a:buClr>
+                <a:schemeClr val="lt1"/>
+              </a:buClr>
+              <a:buSzPts val="1100"/>
+            </a:pPr>
+            <a:r>
+              <a:rPr lang="fr-FR" sz="2400" dirty="0" smtClean="0">
+                <a:latin typeface="+mj-lt"/>
+              </a:rPr>
+              <a:t>- Console </a:t>
+            </a:r>
+            <a:r>
+              <a:rPr lang="fr-FR" sz="2400" dirty="0" smtClean="0">
+                <a:latin typeface="+mj-lt"/>
+              </a:rPr>
+              <a:t>matériel</a:t>
+            </a:r>
+          </a:p>
+          <a:p>
+            <a:pPr marL="0" lvl="0" indent="0">
+              <a:buClr>
+                <a:schemeClr val="lt1"/>
+              </a:buClr>
+              <a:buSzPts val="1100"/>
+            </a:pPr>
+            <a:endParaRPr lang="fr-FR" sz="2400" dirty="0">
+              <a:latin typeface="+mj-lt"/>
+            </a:endParaRPr>
+          </a:p>
+          <a:p>
+            <a:pPr marL="0" lvl="0" indent="0">
+              <a:buClr>
+                <a:schemeClr val="lt1"/>
+              </a:buClr>
+              <a:buSzPts val="1100"/>
+            </a:pPr>
+            <a:r>
+              <a:rPr lang="fr-FR" sz="2400" dirty="0" smtClean="0">
+                <a:latin typeface="+mj-lt"/>
+              </a:rPr>
+              <a:t>- Propriété DMX ?</a:t>
+            </a:r>
+            <a:endParaRPr sz="2400" dirty="0">
+              <a:latin typeface="+mj-lt"/>
+            </a:endParaRPr>
+          </a:p>
+        </p:txBody>
+      </p:sp>
     </p:spTree>
     <p:extLst>
       <p:ext uri="{BB962C8B-B14F-4D97-AF65-F5344CB8AC3E}">
@@ -7569,8 +7660,15 @@
                   </a:schemeClr>
                 </a:solidFill>
               </a:rPr>
-              <a:t>02</a:t>
-            </a:r>
+              <a:t>04</a:t>
+            </a:r>
+            <a:endParaRPr lang="en" sz="4000" dirty="0" smtClean="0">
+              <a:solidFill>
+                <a:schemeClr val="accent1">
+                  <a:lumMod val="50000"/>
+                </a:schemeClr>
+              </a:solidFill>
+            </a:endParaRPr>
           </a:p>
         </p:txBody>
       </p:sp>
@@ -8597,9 +8695,6 @@
               </a:rPr>
               <a:t>- Modification des jeux de lumière sur un bus professionnel DMX</a:t>
             </a:r>
-            <a:endParaRPr lang="fr-FR" sz="2400" dirty="0">
-              <a:latin typeface="+mj-lt"/>
-            </a:endParaRPr>
           </a:p>
         </p:txBody>
       </p:sp>
@@ -9743,9 +9838,6 @@
               </a:rPr>
               <a:t>+ réadaptation du CRUD de l’IHM pour la table scène</a:t>
             </a:r>
-            <a:endParaRPr lang="fr-FR" sz="2400" dirty="0" smtClean="0">
-              <a:latin typeface="+mj-lt"/>
-            </a:endParaRPr>
           </a:p>
         </p:txBody>
       </p:sp>

</xml_diff>

<commit_message>
excel maj cases figées
</commit_message>
<xml_diff>
--- a/documentation/Diapo projetDMX.pptx
+++ b/documentation/Diapo projetDMX.pptx
@@ -11,8 +11,8 @@
     <p:sldId id="256" r:id="rId2"/>
     <p:sldId id="258" r:id="rId3"/>
     <p:sldId id="260" r:id="rId4"/>
-    <p:sldId id="261" r:id="rId5"/>
-    <p:sldId id="262" r:id="rId6"/>
+    <p:sldId id="262" r:id="rId5"/>
+    <p:sldId id="261" r:id="rId6"/>
     <p:sldId id="279" r:id="rId7"/>
     <p:sldId id="263" r:id="rId8"/>
     <p:sldId id="264" r:id="rId9"/>
@@ -487,6 +487,90 @@
     </a:lvl9pPr>
   </p:notesStyle>
 </p:notesMaster>
+</file>
+
+<file path=ppt/notesSlides/notesSlide1.xml><?xml version="1.0" encoding="utf-8"?>
+<p:notes xmlns:a="http://schemas.openxmlformats.org/drawingml/2006/main" xmlns:r="http://schemas.openxmlformats.org/officeDocument/2006/relationships" xmlns:p="http://schemas.openxmlformats.org/presentationml/2006/main">
+  <p:cSld>
+    <p:spTree>
+      <p:nvGrpSpPr>
+        <p:cNvPr id="1" name=""/>
+        <p:cNvGrpSpPr/>
+        <p:nvPr/>
+      </p:nvGrpSpPr>
+      <p:grpSpPr>
+        <a:xfrm>
+          <a:off x="0" y="0"/>
+          <a:ext cx="0" cy="0"/>
+          <a:chOff x="0" y="0"/>
+          <a:chExt cx="0" cy="0"/>
+        </a:xfrm>
+      </p:grpSpPr>
+      <p:sp>
+        <p:nvSpPr>
+          <p:cNvPr id="2" name="Espace réservé de l'image des diapositives 1"/>
+          <p:cNvSpPr>
+            <a:spLocks noGrp="1" noRot="1" noChangeAspect="1"/>
+          </p:cNvSpPr>
+          <p:nvPr>
+            <p:ph type="sldImg"/>
+          </p:nvPr>
+        </p:nvSpPr>
+        <p:spPr/>
+      </p:sp>
+      <p:sp>
+        <p:nvSpPr>
+          <p:cNvPr id="3" name="Espace réservé des notes 2"/>
+          <p:cNvSpPr>
+            <a:spLocks noGrp="1"/>
+          </p:cNvSpPr>
+          <p:nvPr>
+            <p:ph type="body" idx="1"/>
+          </p:nvPr>
+        </p:nvSpPr>
+        <p:spPr/>
+        <p:txBody>
+          <a:bodyPr/>
+          <a:lstStyle/>
+          <a:p>
+            <a:endParaRPr lang="fr-FR" dirty="0"/>
+          </a:p>
+        </p:txBody>
+      </p:sp>
+      <p:sp>
+        <p:nvSpPr>
+          <p:cNvPr id="4" name="Espace réservé du numéro de diapositive 3"/>
+          <p:cNvSpPr>
+            <a:spLocks noGrp="1"/>
+          </p:cNvSpPr>
+          <p:nvPr>
+            <p:ph type="sldNum" sz="quarter" idx="10"/>
+          </p:nvPr>
+        </p:nvSpPr>
+        <p:spPr/>
+        <p:txBody>
+          <a:bodyPr/>
+          <a:lstStyle/>
+          <a:p>
+            <a:fld id="{B0EE6D08-3B5B-4DAF-816F-77A3A6128370}" type="slidenum">
+              <a:rPr lang="fr-FR" smtClean="0"/>
+              <a:t>1</a:t>
+            </a:fld>
+            <a:endParaRPr lang="fr-FR"/>
+          </a:p>
+        </p:txBody>
+      </p:sp>
+    </p:spTree>
+    <p:extLst>
+      <p:ext uri="{BB962C8B-B14F-4D97-AF65-F5344CB8AC3E}">
+        <p14:creationId xmlns:p14="http://schemas.microsoft.com/office/powerpoint/2010/main" val="1521705046"/>
+      </p:ext>
+    </p:extLst>
+  </p:cSld>
+  <p:clrMapOvr>
+    <a:masterClrMapping/>
+  </p:clrMapOvr>
+</p:notes>
 </file>
 
 <file path=ppt/slideLayouts/slideLayout1.xml><?xml version="1.0" encoding="utf-8"?>
@@ -3356,11 +3440,11 @@
           <p:nvPr/>
         </p:nvPicPr>
         <p:blipFill rotWithShape="1">
-          <a:blip r:embed="rId2">
+          <a:blip r:embed="rId3">
             <a:extLst>
               <a:ext uri="{BEBA8EAE-BF5A-486C-A8C5-ECC9F3942E4B}">
                 <a14:imgProps xmlns:a14="http://schemas.microsoft.com/office/drawing/2010/main">
-                  <a14:imgLayer r:embed="rId3">
+                  <a14:imgLayer r:embed="rId4">
                     <a14:imgEffect>
                       <a14:sharpenSoften amount="-100000"/>
                     </a14:imgEffect>
@@ -3380,8 +3464,8 @@
         </p:blipFill>
         <p:spPr>
           <a:xfrm>
-            <a:off x="2789383" y="3044523"/>
-            <a:ext cx="6650180" cy="3760669"/>
+            <a:off x="0" y="3724866"/>
+            <a:ext cx="5540479" cy="3133134"/>
           </a:xfrm>
           <a:prstGeom prst="rect">
             <a:avLst/>
@@ -3420,7 +3504,7 @@
           <p:nvPr/>
         </p:nvPicPr>
         <p:blipFill>
-          <a:blip r:embed="rId4" cstate="print">
+          <a:blip r:embed="rId5" cstate="print">
             <a:extLst>
               <a:ext uri="{28A0092B-C50C-407E-A947-70E740481C1C}">
                 <a14:useLocalDpi xmlns:a14="http://schemas.microsoft.com/office/drawing/2010/main" val="0"/>
@@ -3524,6 +3608,271 @@
               </a:solidFill>
               <a:latin typeface="Arial Black" panose="020B0A04020102020204" pitchFamily="34" charset="0"/>
               <a:ea typeface="Segoe UI Black" panose="020B0A02040204020203" pitchFamily="34" charset="0"/>
+            </a:endParaRPr>
+          </a:p>
+        </p:txBody>
+      </p:sp>
+      <p:sp>
+        <p:nvSpPr>
+          <p:cNvPr id="10" name="Bouée 9"/>
+          <p:cNvSpPr/>
+          <p:nvPr/>
+        </p:nvSpPr>
+        <p:spPr>
+          <a:xfrm>
+            <a:off x="10686615" y="5257800"/>
+            <a:ext cx="3305907" cy="3569677"/>
+          </a:xfrm>
+          <a:prstGeom prst="donut">
+            <a:avLst/>
+          </a:prstGeom>
+          <a:solidFill>
+            <a:srgbClr val="0029C3"/>
+          </a:solidFill>
+        </p:spPr>
+        <p:style>
+          <a:lnRef idx="2">
+            <a:schemeClr val="accent1">
+              <a:shade val="50000"/>
+            </a:schemeClr>
+          </a:lnRef>
+          <a:fillRef idx="1">
+            <a:schemeClr val="accent1"/>
+          </a:fillRef>
+          <a:effectRef idx="0">
+            <a:schemeClr val="accent1"/>
+          </a:effectRef>
+          <a:fontRef idx="minor">
+            <a:schemeClr val="lt1"/>
+          </a:fontRef>
+        </p:style>
+        <p:txBody>
+          <a:bodyPr rtlCol="0" anchor="ctr"/>
+          <a:lstStyle/>
+          <a:p>
+            <a:pPr algn="ctr"/>
+            <a:endParaRPr lang="fr-FR">
+              <a:solidFill>
+                <a:schemeClr val="tx1"/>
+              </a:solidFill>
+            </a:endParaRPr>
+          </a:p>
+        </p:txBody>
+      </p:sp>
+      <p:sp>
+        <p:nvSpPr>
+          <p:cNvPr id="11" name="Google Shape;221;p34"/>
+          <p:cNvSpPr txBox="1">
+            <a:spLocks/>
+          </p:cNvSpPr>
+          <p:nvPr/>
+        </p:nvSpPr>
+        <p:spPr>
+          <a:xfrm>
+            <a:off x="5660552" y="5699416"/>
+            <a:ext cx="4433747" cy="1313868"/>
+          </a:xfrm>
+          <a:prstGeom prst="rect">
+            <a:avLst/>
+          </a:prstGeom>
+        </p:spPr>
+        <p:txBody>
+          <a:bodyPr spcFirstLastPara="1" vert="horz" wrap="square" lIns="91425" tIns="91425" rIns="91425" bIns="91425" rtlCol="0" anchor="t" anchorCtr="0">
+            <a:noAutofit/>
+          </a:bodyPr>
+          <a:lstStyle>
+            <a:lvl1pPr marL="228600" indent="-228600" algn="l" defTabSz="914400" rtl="0" eaLnBrk="1" latinLnBrk="0" hangingPunct="1">
+              <a:lnSpc>
+                <a:spcPct val="90000"/>
+              </a:lnSpc>
+              <a:spcBef>
+                <a:spcPts val="1000"/>
+              </a:spcBef>
+              <a:buFont typeface="Arial" panose="020B0604020202020204" pitchFamily="34" charset="0"/>
+              <a:buChar char="•"/>
+              <a:defRPr sz="2800" kern="1200">
+                <a:solidFill>
+                  <a:schemeClr val="tx1"/>
+                </a:solidFill>
+                <a:latin typeface="+mn-lt"/>
+                <a:ea typeface="+mn-ea"/>
+                <a:cs typeface="+mn-cs"/>
+              </a:defRPr>
+            </a:lvl1pPr>
+            <a:lvl2pPr marL="685800" indent="-228600" algn="l" defTabSz="914400" rtl="0" eaLnBrk="1" latinLnBrk="0" hangingPunct="1">
+              <a:lnSpc>
+                <a:spcPct val="90000"/>
+              </a:lnSpc>
+              <a:spcBef>
+                <a:spcPts val="500"/>
+              </a:spcBef>
+              <a:buFont typeface="Arial" panose="020B0604020202020204" pitchFamily="34" charset="0"/>
+              <a:buChar char="•"/>
+              <a:defRPr sz="2400" kern="1200">
+                <a:solidFill>
+                  <a:schemeClr val="tx1"/>
+                </a:solidFill>
+                <a:latin typeface="+mn-lt"/>
+                <a:ea typeface="+mn-ea"/>
+                <a:cs typeface="+mn-cs"/>
+              </a:defRPr>
+            </a:lvl2pPr>
+            <a:lvl3pPr marL="1143000" indent="-228600" algn="l" defTabSz="914400" rtl="0" eaLnBrk="1" latinLnBrk="0" hangingPunct="1">
+              <a:lnSpc>
+                <a:spcPct val="90000"/>
+              </a:lnSpc>
+              <a:spcBef>
+                <a:spcPts val="500"/>
+              </a:spcBef>
+              <a:buFont typeface="Arial" panose="020B0604020202020204" pitchFamily="34" charset="0"/>
+              <a:buChar char="•"/>
+              <a:defRPr sz="2000" kern="1200">
+                <a:solidFill>
+                  <a:schemeClr val="tx1"/>
+                </a:solidFill>
+                <a:latin typeface="+mn-lt"/>
+                <a:ea typeface="+mn-ea"/>
+                <a:cs typeface="+mn-cs"/>
+              </a:defRPr>
+            </a:lvl3pPr>
+            <a:lvl4pPr marL="1600200" indent="-228600" algn="l" defTabSz="914400" rtl="0" eaLnBrk="1" latinLnBrk="0" hangingPunct="1">
+              <a:lnSpc>
+                <a:spcPct val="90000"/>
+              </a:lnSpc>
+              <a:spcBef>
+                <a:spcPts val="500"/>
+              </a:spcBef>
+              <a:buFont typeface="Arial" panose="020B0604020202020204" pitchFamily="34" charset="0"/>
+              <a:buChar char="•"/>
+              <a:defRPr sz="1800" kern="1200">
+                <a:solidFill>
+                  <a:schemeClr val="tx1"/>
+                </a:solidFill>
+                <a:latin typeface="+mn-lt"/>
+                <a:ea typeface="+mn-ea"/>
+                <a:cs typeface="+mn-cs"/>
+              </a:defRPr>
+            </a:lvl4pPr>
+            <a:lvl5pPr marL="2057400" indent="-228600" algn="l" defTabSz="914400" rtl="0" eaLnBrk="1" latinLnBrk="0" hangingPunct="1">
+              <a:lnSpc>
+                <a:spcPct val="90000"/>
+              </a:lnSpc>
+              <a:spcBef>
+                <a:spcPts val="500"/>
+              </a:spcBef>
+              <a:buFont typeface="Arial" panose="020B0604020202020204" pitchFamily="34" charset="0"/>
+              <a:buChar char="•"/>
+              <a:defRPr sz="1800" kern="1200">
+                <a:solidFill>
+                  <a:schemeClr val="tx1"/>
+                </a:solidFill>
+                <a:latin typeface="+mn-lt"/>
+                <a:ea typeface="+mn-ea"/>
+                <a:cs typeface="+mn-cs"/>
+              </a:defRPr>
+            </a:lvl5pPr>
+            <a:lvl6pPr marL="2514600" indent="-228600" algn="l" defTabSz="914400" rtl="0" eaLnBrk="1" latinLnBrk="0" hangingPunct="1">
+              <a:lnSpc>
+                <a:spcPct val="90000"/>
+              </a:lnSpc>
+              <a:spcBef>
+                <a:spcPts val="500"/>
+              </a:spcBef>
+              <a:buFont typeface="Arial" panose="020B0604020202020204" pitchFamily="34" charset="0"/>
+              <a:buChar char="•"/>
+              <a:defRPr sz="1800" kern="1200">
+                <a:solidFill>
+                  <a:schemeClr val="tx1"/>
+                </a:solidFill>
+                <a:latin typeface="+mn-lt"/>
+                <a:ea typeface="+mn-ea"/>
+                <a:cs typeface="+mn-cs"/>
+              </a:defRPr>
+            </a:lvl6pPr>
+            <a:lvl7pPr marL="2971800" indent="-228600" algn="l" defTabSz="914400" rtl="0" eaLnBrk="1" latinLnBrk="0" hangingPunct="1">
+              <a:lnSpc>
+                <a:spcPct val="90000"/>
+              </a:lnSpc>
+              <a:spcBef>
+                <a:spcPts val="500"/>
+              </a:spcBef>
+              <a:buFont typeface="Arial" panose="020B0604020202020204" pitchFamily="34" charset="0"/>
+              <a:buChar char="•"/>
+              <a:defRPr sz="1800" kern="1200">
+                <a:solidFill>
+                  <a:schemeClr val="tx1"/>
+                </a:solidFill>
+                <a:latin typeface="+mn-lt"/>
+                <a:ea typeface="+mn-ea"/>
+                <a:cs typeface="+mn-cs"/>
+              </a:defRPr>
+            </a:lvl7pPr>
+            <a:lvl8pPr marL="3429000" indent="-228600" algn="l" defTabSz="914400" rtl="0" eaLnBrk="1" latinLnBrk="0" hangingPunct="1">
+              <a:lnSpc>
+                <a:spcPct val="90000"/>
+              </a:lnSpc>
+              <a:spcBef>
+                <a:spcPts val="500"/>
+              </a:spcBef>
+              <a:buFont typeface="Arial" panose="020B0604020202020204" pitchFamily="34" charset="0"/>
+              <a:buChar char="•"/>
+              <a:defRPr sz="1800" kern="1200">
+                <a:solidFill>
+                  <a:schemeClr val="tx1"/>
+                </a:solidFill>
+                <a:latin typeface="+mn-lt"/>
+                <a:ea typeface="+mn-ea"/>
+                <a:cs typeface="+mn-cs"/>
+              </a:defRPr>
+            </a:lvl8pPr>
+            <a:lvl9pPr marL="3886200" indent="-228600" algn="l" defTabSz="914400" rtl="0" eaLnBrk="1" latinLnBrk="0" hangingPunct="1">
+              <a:lnSpc>
+                <a:spcPct val="90000"/>
+              </a:lnSpc>
+              <a:spcBef>
+                <a:spcPts val="500"/>
+              </a:spcBef>
+              <a:buFont typeface="Arial" panose="020B0604020202020204" pitchFamily="34" charset="0"/>
+              <a:buChar char="•"/>
+              <a:defRPr sz="1800" kern="1200">
+                <a:solidFill>
+                  <a:schemeClr val="tx1"/>
+                </a:solidFill>
+                <a:latin typeface="+mn-lt"/>
+                <a:ea typeface="+mn-ea"/>
+                <a:cs typeface="+mn-cs"/>
+              </a:defRPr>
+            </a:lvl9pPr>
+          </a:lstStyle>
+          <a:p>
+            <a:pPr marL="0" indent="0">
+              <a:buClr>
+                <a:schemeClr val="lt1"/>
+              </a:buClr>
+              <a:buSzPts val="1100"/>
+            </a:pPr>
+            <a:r>
+              <a:rPr lang="fr-FR" sz="2400" dirty="0" smtClean="0">
+                <a:latin typeface="+mj-lt"/>
+              </a:rPr>
+              <a:t>Jean Leduc</a:t>
+            </a:r>
+          </a:p>
+          <a:p>
+            <a:pPr marL="0" indent="0">
+              <a:buClr>
+                <a:schemeClr val="lt1"/>
+              </a:buClr>
+              <a:buSzPts val="1100"/>
+            </a:pPr>
+            <a:r>
+              <a:rPr lang="fr-FR" sz="2400" dirty="0" smtClean="0">
+                <a:latin typeface="+mj-lt"/>
+              </a:rPr>
+              <a:t>BTS SN</a:t>
+            </a:r>
+            <a:endParaRPr lang="fr-FR" sz="2400" dirty="0">
+              <a:latin typeface="+mj-lt"/>
             </a:endParaRPr>
           </a:p>
         </p:txBody>
@@ -5722,7 +6071,50 @@
               <a:rPr lang="fr-FR" sz="2400" dirty="0" smtClean="0">
                 <a:latin typeface="+mj-lt"/>
               </a:rPr>
-              <a:t>- Console Matériel</a:t>
+              <a:t>- Console </a:t>
+            </a:r>
+            <a:r>
+              <a:rPr lang="fr-FR" sz="2400" dirty="0" smtClean="0">
+                <a:latin typeface="+mj-lt"/>
+              </a:rPr>
+              <a:t>Matériel</a:t>
+            </a:r>
+          </a:p>
+          <a:p>
+            <a:pPr marL="0" lvl="0" indent="0">
+              <a:buClr>
+                <a:schemeClr val="lt1"/>
+              </a:buClr>
+              <a:buSzPts val="1100"/>
+            </a:pPr>
+            <a:endParaRPr lang="fr-FR" sz="2400" dirty="0">
+              <a:latin typeface="+mj-lt"/>
+            </a:endParaRPr>
+          </a:p>
+          <a:p>
+            <a:pPr marL="0" lvl="0" indent="0">
+              <a:buClr>
+                <a:schemeClr val="lt1"/>
+              </a:buClr>
+              <a:buSzPts val="1100"/>
+            </a:pPr>
+            <a:r>
+              <a:rPr lang="fr-FR" sz="2400" dirty="0" smtClean="0">
+                <a:latin typeface="+mj-lt"/>
+              </a:rPr>
+              <a:t>- 4 ordinateurs </a:t>
+            </a:r>
+            <a:r>
+              <a:rPr lang="fr-FR" sz="2400" dirty="0" err="1" smtClean="0">
+                <a:latin typeface="+mj-lt"/>
+              </a:rPr>
+              <a:t>windows</a:t>
+            </a:r>
+            <a:r>
+              <a:rPr lang="fr-FR" sz="2400" dirty="0" smtClean="0">
+                <a:latin typeface="+mj-lt"/>
+              </a:rPr>
+              <a:t> et 1 ordinateurs linux</a:t>
             </a:r>
             <a:endParaRPr sz="2400" dirty="0">
               <a:latin typeface="+mj-lt"/>
@@ -8985,13 +9377,6 @@
               </a:rPr>
               <a:t>04</a:t>
             </a:r>
-            <a:endParaRPr lang="en" sz="4000" dirty="0" smtClean="0">
-              <a:solidFill>
-                <a:schemeClr val="accent1">
-                  <a:lumMod val="50000"/>
-                </a:schemeClr>
-              </a:solidFill>
-            </a:endParaRPr>
           </a:p>
         </p:txBody>
       </p:sp>
@@ -10022,9 +10407,6 @@
               </a:rPr>
               <a:t>Nommer les fichiers des modules de tests</a:t>
             </a:r>
-            <a:endParaRPr lang="fr-FR" sz="2400" dirty="0" smtClean="0">
-              <a:latin typeface="+mj-lt"/>
-            </a:endParaRPr>
           </a:p>
         </p:txBody>
       </p:sp>
@@ -10915,6 +11297,389 @@
       </p:grpSpPr>
       <p:sp>
         <p:nvSpPr>
+          <p:cNvPr id="27" name="Google Shape;222;p34"/>
+          <p:cNvSpPr txBox="1">
+            <a:spLocks noGrp="1"/>
+          </p:cNvSpPr>
+          <p:nvPr>
+            <p:ph type="subTitle" idx="4294967295"/>
+          </p:nvPr>
+        </p:nvSpPr>
+        <p:spPr>
+          <a:xfrm>
+            <a:off x="3563996" y="540326"/>
+            <a:ext cx="4721022" cy="938483"/>
+          </a:xfrm>
+          <a:prstGeom prst="rect">
+            <a:avLst/>
+          </a:prstGeom>
+        </p:spPr>
+        <p:txBody>
+          <a:bodyPr spcFirstLastPara="1" wrap="square" lIns="91425" tIns="91425" rIns="91425" bIns="91425" anchor="b" anchorCtr="0">
+            <a:noAutofit/>
+          </a:bodyPr>
+          <a:lstStyle/>
+          <a:p>
+            <a:pPr marL="0" lvl="0" indent="0" algn="l" rtl="0">
+              <a:spcBef>
+                <a:spcPts val="0"/>
+              </a:spcBef>
+              <a:spcAft>
+                <a:spcPts val="0"/>
+              </a:spcAft>
+              <a:buNone/>
+            </a:pPr>
+            <a:r>
+              <a:rPr lang="en" sz="8000" b="1" dirty="0" smtClean="0">
+                <a:solidFill>
+                  <a:srgbClr val="002060"/>
+                </a:solidFill>
+              </a:rPr>
+              <a:t>Le groupe</a:t>
+            </a:r>
+            <a:endParaRPr sz="8000" b="1" dirty="0">
+              <a:solidFill>
+                <a:srgbClr val="002060"/>
+              </a:solidFill>
+            </a:endParaRPr>
+          </a:p>
+        </p:txBody>
+      </p:sp>
+      <p:sp>
+        <p:nvSpPr>
+          <p:cNvPr id="10" name="Google Shape;221;p34"/>
+          <p:cNvSpPr txBox="1">
+            <a:spLocks noGrp="1"/>
+          </p:cNvSpPr>
+          <p:nvPr>
+            <p:ph type="subTitle" idx="4294967295"/>
+          </p:nvPr>
+        </p:nvSpPr>
+        <p:spPr>
+          <a:xfrm>
+            <a:off x="766326" y="1874981"/>
+            <a:ext cx="4784729" cy="748146"/>
+          </a:xfrm>
+          <a:prstGeom prst="rect">
+            <a:avLst/>
+          </a:prstGeom>
+        </p:spPr>
+        <p:txBody>
+          <a:bodyPr spcFirstLastPara="1" wrap="square" lIns="91425" tIns="91425" rIns="91425" bIns="91425" anchor="t" anchorCtr="0">
+            <a:noAutofit/>
+          </a:bodyPr>
+          <a:lstStyle/>
+          <a:p>
+            <a:pPr marL="0" lvl="0" indent="0">
+              <a:buClr>
+                <a:schemeClr val="lt1"/>
+              </a:buClr>
+              <a:buSzPts val="1100"/>
+            </a:pPr>
+            <a:r>
+              <a:rPr lang="fr-FR" sz="2400" dirty="0" smtClean="0">
+                <a:latin typeface="+mj-lt"/>
+              </a:rPr>
+              <a:t>- 4 personnes dans le groupe</a:t>
+            </a:r>
+          </a:p>
+          <a:p>
+            <a:pPr marL="0" lvl="0" indent="0">
+              <a:buClr>
+                <a:schemeClr val="lt1"/>
+              </a:buClr>
+              <a:buSzPts val="1100"/>
+            </a:pPr>
+            <a:endParaRPr lang="fr-FR" sz="2400" dirty="0" smtClean="0">
+              <a:latin typeface="+mj-lt"/>
+            </a:endParaRPr>
+          </a:p>
+          <a:p>
+            <a:pPr marL="0" lvl="0" indent="0">
+              <a:buClr>
+                <a:schemeClr val="lt1"/>
+              </a:buClr>
+              <a:buSzPts val="1100"/>
+            </a:pPr>
+            <a:r>
+              <a:rPr lang="fr-FR" sz="2400" dirty="0" smtClean="0">
+                <a:latin typeface="+mj-lt"/>
+              </a:rPr>
+              <a:t>- 1 personne qui gère le serveur linux (connexion avec le bus DMX, construction de la trame, configuration pour un serveur </a:t>
+            </a:r>
+            <a:r>
+              <a:rPr lang="fr-FR" sz="2400" dirty="0" err="1" smtClean="0">
+                <a:latin typeface="+mj-lt"/>
+              </a:rPr>
+              <a:t>websocket</a:t>
+            </a:r>
+            <a:r>
+              <a:rPr lang="fr-FR" sz="2400" dirty="0" smtClean="0">
+                <a:latin typeface="+mj-lt"/>
+              </a:rPr>
+              <a:t>), </a:t>
+            </a:r>
+            <a:r>
+              <a:rPr lang="fr-FR" sz="2400" dirty="0">
+                <a:latin typeface="+mj-lt"/>
+              </a:rPr>
+              <a:t>l’</a:t>
+            </a:r>
+            <a:r>
+              <a:rPr lang="fr-FR" sz="2400" dirty="0" err="1">
+                <a:latin typeface="+mj-lt"/>
+              </a:rPr>
+              <a:t>ihm</a:t>
+            </a:r>
+            <a:r>
+              <a:rPr lang="fr-FR" sz="2400" dirty="0">
+                <a:latin typeface="+mj-lt"/>
+              </a:rPr>
+              <a:t> C</a:t>
+            </a:r>
+            <a:r>
+              <a:rPr lang="fr-FR" sz="2400" dirty="0" smtClean="0">
+                <a:latin typeface="+mj-lt"/>
+              </a:rPr>
+              <a:t>++ sous </a:t>
+            </a:r>
+            <a:r>
+              <a:rPr lang="fr-FR" sz="2400" dirty="0" err="1" smtClean="0">
+                <a:latin typeface="+mj-lt"/>
+              </a:rPr>
+              <a:t>windows</a:t>
+            </a:r>
+            <a:r>
+              <a:rPr lang="fr-FR" sz="2400" dirty="0" smtClean="0">
+                <a:latin typeface="+mj-lt"/>
+              </a:rPr>
+              <a:t> (gestion des scènes, gestion des champs, canaux, implémentation de la librairie </a:t>
+            </a:r>
+            <a:r>
+              <a:rPr lang="fr-FR" sz="2400" dirty="0" err="1" smtClean="0">
+                <a:latin typeface="+mj-lt"/>
+              </a:rPr>
+              <a:t>arduino</a:t>
+            </a:r>
+            <a:r>
+              <a:rPr lang="fr-FR" sz="2400" dirty="0" smtClean="0">
+                <a:latin typeface="+mj-lt"/>
+              </a:rPr>
+              <a:t>, page pour piloter l’</a:t>
+            </a:r>
+            <a:r>
+              <a:rPr lang="fr-FR" sz="2400" dirty="0" err="1" smtClean="0">
+                <a:latin typeface="+mj-lt"/>
+              </a:rPr>
+              <a:t>arduino</a:t>
+            </a:r>
+            <a:r>
+              <a:rPr lang="fr-FR" sz="2400" dirty="0" smtClean="0">
+                <a:latin typeface="+mj-lt"/>
+              </a:rPr>
+              <a:t>)</a:t>
+            </a:r>
+            <a:endParaRPr sz="2400" dirty="0">
+              <a:latin typeface="+mj-lt"/>
+            </a:endParaRPr>
+          </a:p>
+        </p:txBody>
+      </p:sp>
+      <p:sp>
+        <p:nvSpPr>
+          <p:cNvPr id="12" name="Google Shape;221;p34"/>
+          <p:cNvSpPr txBox="1">
+            <a:spLocks noGrp="1"/>
+          </p:cNvSpPr>
+          <p:nvPr>
+            <p:ph type="subTitle" idx="4294967295"/>
+          </p:nvPr>
+        </p:nvSpPr>
+        <p:spPr>
+          <a:xfrm>
+            <a:off x="6164978" y="1874981"/>
+            <a:ext cx="4784729" cy="748146"/>
+          </a:xfrm>
+          <a:prstGeom prst="rect">
+            <a:avLst/>
+          </a:prstGeom>
+        </p:spPr>
+        <p:txBody>
+          <a:bodyPr spcFirstLastPara="1" wrap="square" lIns="91425" tIns="91425" rIns="91425" bIns="91425" anchor="t" anchorCtr="0">
+            <a:noAutofit/>
+          </a:bodyPr>
+          <a:lstStyle/>
+          <a:p>
+            <a:pPr marL="0" lvl="0" indent="0">
+              <a:buClr>
+                <a:schemeClr val="lt1"/>
+              </a:buClr>
+              <a:buSzPts val="1100"/>
+            </a:pPr>
+            <a:r>
+              <a:rPr lang="fr-FR" sz="2400" dirty="0" smtClean="0">
+                <a:latin typeface="+mj-lt"/>
+              </a:rPr>
+              <a:t>- 1 personne qui a géré les équipements (création, modification et suppression des équipements)</a:t>
+            </a:r>
+            <a:r>
+              <a:rPr lang="fr-FR" sz="2400" dirty="0">
+                <a:latin typeface="+mj-lt"/>
+              </a:rPr>
+              <a:t> </a:t>
+            </a:r>
+            <a:r>
+              <a:rPr lang="fr-FR" sz="2400" dirty="0" smtClean="0">
+                <a:latin typeface="+mj-lt"/>
+              </a:rPr>
+              <a:t>+ réadaptation du CRUD de l’IHM pour la table scène</a:t>
+            </a:r>
+          </a:p>
+        </p:txBody>
+      </p:sp>
+      <p:sp>
+        <p:nvSpPr>
+          <p:cNvPr id="13" name="Google Shape;221;p34"/>
+          <p:cNvSpPr txBox="1">
+            <a:spLocks noGrp="1"/>
+          </p:cNvSpPr>
+          <p:nvPr>
+            <p:ph type="subTitle" idx="4294967295"/>
+          </p:nvPr>
+        </p:nvSpPr>
+        <p:spPr>
+          <a:xfrm>
+            <a:off x="6164978" y="4036291"/>
+            <a:ext cx="4784729" cy="748146"/>
+          </a:xfrm>
+          <a:prstGeom prst="rect">
+            <a:avLst/>
+          </a:prstGeom>
+        </p:spPr>
+        <p:txBody>
+          <a:bodyPr spcFirstLastPara="1" wrap="square" lIns="91425" tIns="91425" rIns="91425" bIns="91425" anchor="t" anchorCtr="0">
+            <a:noAutofit/>
+          </a:bodyPr>
+          <a:lstStyle/>
+          <a:p>
+            <a:pPr marL="0" lvl="0" indent="0">
+              <a:buClr>
+                <a:schemeClr val="lt1"/>
+              </a:buClr>
+              <a:buSzPts val="1100"/>
+            </a:pPr>
+            <a:r>
+              <a:rPr lang="fr-FR" sz="2400" dirty="0" smtClean="0">
+                <a:latin typeface="+mj-lt"/>
+              </a:rPr>
+              <a:t>- 1 personne incompréhension du sujet, création de la librairie </a:t>
+            </a:r>
+            <a:r>
+              <a:rPr lang="fr-FR" sz="2400" dirty="0" err="1" smtClean="0">
+                <a:latin typeface="+mj-lt"/>
+              </a:rPr>
+              <a:t>arduino</a:t>
+            </a:r>
+            <a:r>
+              <a:rPr lang="fr-FR" sz="2400" dirty="0" smtClean="0">
+                <a:latin typeface="+mj-lt"/>
+              </a:rPr>
+              <a:t> pour la partie C++, de la console et du code </a:t>
+            </a:r>
+            <a:r>
+              <a:rPr lang="fr-FR" sz="2400" dirty="0" err="1" smtClean="0">
+                <a:latin typeface="+mj-lt"/>
+              </a:rPr>
+              <a:t>arduino</a:t>
+            </a:r>
+            <a:endParaRPr sz="2400" dirty="0">
+              <a:latin typeface="+mj-lt"/>
+            </a:endParaRPr>
+          </a:p>
+        </p:txBody>
+      </p:sp>
+      <p:pic>
+        <p:nvPicPr>
+          <p:cNvPr id="14" name="Image 13"/>
+          <p:cNvPicPr>
+            <a:picLocks noChangeAspect="1"/>
+          </p:cNvPicPr>
+          <p:nvPr/>
+        </p:nvPicPr>
+        <p:blipFill>
+          <a:blip r:embed="rId2" cstate="print">
+            <a:extLst>
+              <a:ext uri="{28A0092B-C50C-407E-A947-70E740481C1C}">
+                <a14:useLocalDpi xmlns:a14="http://schemas.microsoft.com/office/drawing/2010/main" val="0"/>
+              </a:ext>
+            </a:extLst>
+          </a:blip>
+          <a:stretch>
+            <a:fillRect/>
+          </a:stretch>
+        </p:blipFill>
+        <p:spPr>
+          <a:xfrm>
+            <a:off x="120073" y="6492182"/>
+            <a:ext cx="1477818" cy="248227"/>
+          </a:xfrm>
+          <a:prstGeom prst="rect">
+            <a:avLst/>
+          </a:prstGeom>
+          <a:effectLst>
+            <a:glow rad="127000">
+              <a:schemeClr val="accent1">
+                <a:alpha val="0"/>
+              </a:schemeClr>
+            </a:glow>
+            <a:outerShdw blurRad="50800" dist="50800" dir="5400000" algn="ctr" rotWithShape="0">
+              <a:srgbClr val="000000">
+                <a:alpha val="0"/>
+              </a:srgbClr>
+            </a:outerShdw>
+            <a:reflection endPos="65000" dist="50800" dir="5400000" sy="-100000" algn="bl" rotWithShape="0"/>
+          </a:effectLst>
+        </p:spPr>
+      </p:pic>
+    </p:spTree>
+    <p:extLst>
+      <p:ext uri="{BB962C8B-B14F-4D97-AF65-F5344CB8AC3E}">
+        <p14:creationId xmlns:p14="http://schemas.microsoft.com/office/powerpoint/2010/main" val="1722000770"/>
+      </p:ext>
+    </p:extLst>
+  </p:cSld>
+  <p:clrMapOvr>
+    <a:masterClrMapping/>
+  </p:clrMapOvr>
+  <p:timing>
+    <p:tnLst>
+      <p:par>
+        <p:cTn id="1" dur="indefinite" restart="never" nodeType="tmRoot"/>
+      </p:par>
+    </p:tnLst>
+  </p:timing>
+</p:sld>
+</file>
+
+<file path=ppt/slides/slide5.xml><?xml version="1.0" encoding="utf-8"?>
+<p:sld xmlns:a="http://schemas.openxmlformats.org/drawingml/2006/main" xmlns:r="http://schemas.openxmlformats.org/officeDocument/2006/relationships" xmlns:p="http://schemas.openxmlformats.org/presentationml/2006/main">
+  <p:cSld>
+    <p:spTree>
+      <p:nvGrpSpPr>
+        <p:cNvPr id="1" name=""/>
+        <p:cNvGrpSpPr/>
+        <p:nvPr/>
+      </p:nvGrpSpPr>
+      <p:grpSpPr>
+        <a:xfrm>
+          <a:off x="0" y="0"/>
+          <a:ext cx="0" cy="0"/>
+          <a:chOff x="0" y="0"/>
+          <a:chExt cx="0" cy="0"/>
+        </a:xfrm>
+      </p:grpSpPr>
+      <p:sp>
+        <p:nvSpPr>
           <p:cNvPr id="20" name="Google Shape;188;p31">
             <a:extLst>
               <a:ext uri="{FF2B5EF4-FFF2-40B4-BE49-F238E27FC236}">
@@ -11620,389 +12385,6 @@
     <p:extLst>
       <p:ext uri="{BB962C8B-B14F-4D97-AF65-F5344CB8AC3E}">
         <p14:creationId xmlns:p14="http://schemas.microsoft.com/office/powerpoint/2010/main" val="348471087"/>
-      </p:ext>
-    </p:extLst>
-  </p:cSld>
-  <p:clrMapOvr>
-    <a:masterClrMapping/>
-  </p:clrMapOvr>
-  <p:timing>
-    <p:tnLst>
-      <p:par>
-        <p:cTn id="1" dur="indefinite" restart="never" nodeType="tmRoot"/>
-      </p:par>
-    </p:tnLst>
-  </p:timing>
-</p:sld>
-</file>
-
-<file path=ppt/slides/slide5.xml><?xml version="1.0" encoding="utf-8"?>
-<p:sld xmlns:a="http://schemas.openxmlformats.org/drawingml/2006/main" xmlns:r="http://schemas.openxmlformats.org/officeDocument/2006/relationships" xmlns:p="http://schemas.openxmlformats.org/presentationml/2006/main">
-  <p:cSld>
-    <p:spTree>
-      <p:nvGrpSpPr>
-        <p:cNvPr id="1" name=""/>
-        <p:cNvGrpSpPr/>
-        <p:nvPr/>
-      </p:nvGrpSpPr>
-      <p:grpSpPr>
-        <a:xfrm>
-          <a:off x="0" y="0"/>
-          <a:ext cx="0" cy="0"/>
-          <a:chOff x="0" y="0"/>
-          <a:chExt cx="0" cy="0"/>
-        </a:xfrm>
-      </p:grpSpPr>
-      <p:sp>
-        <p:nvSpPr>
-          <p:cNvPr id="27" name="Google Shape;222;p34"/>
-          <p:cNvSpPr txBox="1">
-            <a:spLocks noGrp="1"/>
-          </p:cNvSpPr>
-          <p:nvPr>
-            <p:ph type="subTitle" idx="4294967295"/>
-          </p:nvPr>
-        </p:nvSpPr>
-        <p:spPr>
-          <a:xfrm>
-            <a:off x="3563996" y="540326"/>
-            <a:ext cx="4721022" cy="938483"/>
-          </a:xfrm>
-          <a:prstGeom prst="rect">
-            <a:avLst/>
-          </a:prstGeom>
-        </p:spPr>
-        <p:txBody>
-          <a:bodyPr spcFirstLastPara="1" wrap="square" lIns="91425" tIns="91425" rIns="91425" bIns="91425" anchor="b" anchorCtr="0">
-            <a:noAutofit/>
-          </a:bodyPr>
-          <a:lstStyle/>
-          <a:p>
-            <a:pPr marL="0" lvl="0" indent="0" algn="l" rtl="0">
-              <a:spcBef>
-                <a:spcPts val="0"/>
-              </a:spcBef>
-              <a:spcAft>
-                <a:spcPts val="0"/>
-              </a:spcAft>
-              <a:buNone/>
-            </a:pPr>
-            <a:r>
-              <a:rPr lang="en" sz="8000" b="1" dirty="0" smtClean="0">
-                <a:solidFill>
-                  <a:srgbClr val="002060"/>
-                </a:solidFill>
-              </a:rPr>
-              <a:t>Le groupe</a:t>
-            </a:r>
-            <a:endParaRPr sz="8000" b="1" dirty="0">
-              <a:solidFill>
-                <a:srgbClr val="002060"/>
-              </a:solidFill>
-            </a:endParaRPr>
-          </a:p>
-        </p:txBody>
-      </p:sp>
-      <p:sp>
-        <p:nvSpPr>
-          <p:cNvPr id="10" name="Google Shape;221;p34"/>
-          <p:cNvSpPr txBox="1">
-            <a:spLocks noGrp="1"/>
-          </p:cNvSpPr>
-          <p:nvPr>
-            <p:ph type="subTitle" idx="4294967295"/>
-          </p:nvPr>
-        </p:nvSpPr>
-        <p:spPr>
-          <a:xfrm>
-            <a:off x="766326" y="1874981"/>
-            <a:ext cx="4784729" cy="748146"/>
-          </a:xfrm>
-          <a:prstGeom prst="rect">
-            <a:avLst/>
-          </a:prstGeom>
-        </p:spPr>
-        <p:txBody>
-          <a:bodyPr spcFirstLastPara="1" wrap="square" lIns="91425" tIns="91425" rIns="91425" bIns="91425" anchor="t" anchorCtr="0">
-            <a:noAutofit/>
-          </a:bodyPr>
-          <a:lstStyle/>
-          <a:p>
-            <a:pPr marL="0" lvl="0" indent="0">
-              <a:buClr>
-                <a:schemeClr val="lt1"/>
-              </a:buClr>
-              <a:buSzPts val="1100"/>
-            </a:pPr>
-            <a:r>
-              <a:rPr lang="fr-FR" sz="2400" dirty="0" smtClean="0">
-                <a:latin typeface="+mj-lt"/>
-              </a:rPr>
-              <a:t>- 4 personnes dans le groupe</a:t>
-            </a:r>
-          </a:p>
-          <a:p>
-            <a:pPr marL="0" lvl="0" indent="0">
-              <a:buClr>
-                <a:schemeClr val="lt1"/>
-              </a:buClr>
-              <a:buSzPts val="1100"/>
-            </a:pPr>
-            <a:endParaRPr lang="fr-FR" sz="2400" dirty="0" smtClean="0">
-              <a:latin typeface="+mj-lt"/>
-            </a:endParaRPr>
-          </a:p>
-          <a:p>
-            <a:pPr marL="0" lvl="0" indent="0">
-              <a:buClr>
-                <a:schemeClr val="lt1"/>
-              </a:buClr>
-              <a:buSzPts val="1100"/>
-            </a:pPr>
-            <a:r>
-              <a:rPr lang="fr-FR" sz="2400" dirty="0" smtClean="0">
-                <a:latin typeface="+mj-lt"/>
-              </a:rPr>
-              <a:t>- 1 personne qui gère le serveur linux (connexion avec le bus DMX, construction de la trame, configuration pour un serveur </a:t>
-            </a:r>
-            <a:r>
-              <a:rPr lang="fr-FR" sz="2400" dirty="0" err="1" smtClean="0">
-                <a:latin typeface="+mj-lt"/>
-              </a:rPr>
-              <a:t>websocket</a:t>
-            </a:r>
-            <a:r>
-              <a:rPr lang="fr-FR" sz="2400" dirty="0" smtClean="0">
-                <a:latin typeface="+mj-lt"/>
-              </a:rPr>
-              <a:t>), </a:t>
-            </a:r>
-            <a:r>
-              <a:rPr lang="fr-FR" sz="2400" dirty="0">
-                <a:latin typeface="+mj-lt"/>
-              </a:rPr>
-              <a:t>l’</a:t>
-            </a:r>
-            <a:r>
-              <a:rPr lang="fr-FR" sz="2400" dirty="0" err="1">
-                <a:latin typeface="+mj-lt"/>
-              </a:rPr>
-              <a:t>ihm</a:t>
-            </a:r>
-            <a:r>
-              <a:rPr lang="fr-FR" sz="2400" dirty="0">
-                <a:latin typeface="+mj-lt"/>
-              </a:rPr>
-              <a:t> C</a:t>
-            </a:r>
-            <a:r>
-              <a:rPr lang="fr-FR" sz="2400" dirty="0" smtClean="0">
-                <a:latin typeface="+mj-lt"/>
-              </a:rPr>
-              <a:t>++ sous </a:t>
-            </a:r>
-            <a:r>
-              <a:rPr lang="fr-FR" sz="2400" dirty="0" err="1" smtClean="0">
-                <a:latin typeface="+mj-lt"/>
-              </a:rPr>
-              <a:t>windows</a:t>
-            </a:r>
-            <a:r>
-              <a:rPr lang="fr-FR" sz="2400" dirty="0" smtClean="0">
-                <a:latin typeface="+mj-lt"/>
-              </a:rPr>
-              <a:t> (gestion des scènes, gestion des champs, canaux, implémentation de la librairie </a:t>
-            </a:r>
-            <a:r>
-              <a:rPr lang="fr-FR" sz="2400" dirty="0" err="1" smtClean="0">
-                <a:latin typeface="+mj-lt"/>
-              </a:rPr>
-              <a:t>arduino</a:t>
-            </a:r>
-            <a:r>
-              <a:rPr lang="fr-FR" sz="2400" dirty="0" smtClean="0">
-                <a:latin typeface="+mj-lt"/>
-              </a:rPr>
-              <a:t>, page pour piloter l’</a:t>
-            </a:r>
-            <a:r>
-              <a:rPr lang="fr-FR" sz="2400" dirty="0" err="1" smtClean="0">
-                <a:latin typeface="+mj-lt"/>
-              </a:rPr>
-              <a:t>arduino</a:t>
-            </a:r>
-            <a:r>
-              <a:rPr lang="fr-FR" sz="2400" dirty="0" smtClean="0">
-                <a:latin typeface="+mj-lt"/>
-              </a:rPr>
-              <a:t>)</a:t>
-            </a:r>
-            <a:endParaRPr sz="2400" dirty="0">
-              <a:latin typeface="+mj-lt"/>
-            </a:endParaRPr>
-          </a:p>
-        </p:txBody>
-      </p:sp>
-      <p:sp>
-        <p:nvSpPr>
-          <p:cNvPr id="12" name="Google Shape;221;p34"/>
-          <p:cNvSpPr txBox="1">
-            <a:spLocks noGrp="1"/>
-          </p:cNvSpPr>
-          <p:nvPr>
-            <p:ph type="subTitle" idx="4294967295"/>
-          </p:nvPr>
-        </p:nvSpPr>
-        <p:spPr>
-          <a:xfrm>
-            <a:off x="6164978" y="1874981"/>
-            <a:ext cx="4784729" cy="748146"/>
-          </a:xfrm>
-          <a:prstGeom prst="rect">
-            <a:avLst/>
-          </a:prstGeom>
-        </p:spPr>
-        <p:txBody>
-          <a:bodyPr spcFirstLastPara="1" wrap="square" lIns="91425" tIns="91425" rIns="91425" bIns="91425" anchor="t" anchorCtr="0">
-            <a:noAutofit/>
-          </a:bodyPr>
-          <a:lstStyle/>
-          <a:p>
-            <a:pPr marL="0" lvl="0" indent="0">
-              <a:buClr>
-                <a:schemeClr val="lt1"/>
-              </a:buClr>
-              <a:buSzPts val="1100"/>
-            </a:pPr>
-            <a:r>
-              <a:rPr lang="fr-FR" sz="2400" dirty="0" smtClean="0">
-                <a:latin typeface="+mj-lt"/>
-              </a:rPr>
-              <a:t>- 1 personne qui a géré les équipements (création, modification et suppression des équipements)</a:t>
-            </a:r>
-            <a:r>
-              <a:rPr lang="fr-FR" sz="2400" dirty="0">
-                <a:latin typeface="+mj-lt"/>
-              </a:rPr>
-              <a:t> </a:t>
-            </a:r>
-            <a:r>
-              <a:rPr lang="fr-FR" sz="2400" dirty="0" smtClean="0">
-                <a:latin typeface="+mj-lt"/>
-              </a:rPr>
-              <a:t>+ réadaptation du CRUD de l’IHM pour la table scène</a:t>
-            </a:r>
-          </a:p>
-        </p:txBody>
-      </p:sp>
-      <p:sp>
-        <p:nvSpPr>
-          <p:cNvPr id="13" name="Google Shape;221;p34"/>
-          <p:cNvSpPr txBox="1">
-            <a:spLocks noGrp="1"/>
-          </p:cNvSpPr>
-          <p:nvPr>
-            <p:ph type="subTitle" idx="4294967295"/>
-          </p:nvPr>
-        </p:nvSpPr>
-        <p:spPr>
-          <a:xfrm>
-            <a:off x="6164978" y="4036291"/>
-            <a:ext cx="4784729" cy="748146"/>
-          </a:xfrm>
-          <a:prstGeom prst="rect">
-            <a:avLst/>
-          </a:prstGeom>
-        </p:spPr>
-        <p:txBody>
-          <a:bodyPr spcFirstLastPara="1" wrap="square" lIns="91425" tIns="91425" rIns="91425" bIns="91425" anchor="t" anchorCtr="0">
-            <a:noAutofit/>
-          </a:bodyPr>
-          <a:lstStyle/>
-          <a:p>
-            <a:pPr marL="0" lvl="0" indent="0">
-              <a:buClr>
-                <a:schemeClr val="lt1"/>
-              </a:buClr>
-              <a:buSzPts val="1100"/>
-            </a:pPr>
-            <a:r>
-              <a:rPr lang="fr-FR" sz="2400" dirty="0" smtClean="0">
-                <a:latin typeface="+mj-lt"/>
-              </a:rPr>
-              <a:t>- 1 personne incompréhension du sujet, création de la librairie </a:t>
-            </a:r>
-            <a:r>
-              <a:rPr lang="fr-FR" sz="2400" dirty="0" err="1" smtClean="0">
-                <a:latin typeface="+mj-lt"/>
-              </a:rPr>
-              <a:t>arduino</a:t>
-            </a:r>
-            <a:r>
-              <a:rPr lang="fr-FR" sz="2400" dirty="0" smtClean="0">
-                <a:latin typeface="+mj-lt"/>
-              </a:rPr>
-              <a:t> pour la partie C++, de la console et du code </a:t>
-            </a:r>
-            <a:r>
-              <a:rPr lang="fr-FR" sz="2400" dirty="0" err="1" smtClean="0">
-                <a:latin typeface="+mj-lt"/>
-              </a:rPr>
-              <a:t>arduino</a:t>
-            </a:r>
-            <a:endParaRPr sz="2400" dirty="0">
-              <a:latin typeface="+mj-lt"/>
-            </a:endParaRPr>
-          </a:p>
-        </p:txBody>
-      </p:sp>
-      <p:pic>
-        <p:nvPicPr>
-          <p:cNvPr id="14" name="Image 13"/>
-          <p:cNvPicPr>
-            <a:picLocks noChangeAspect="1"/>
-          </p:cNvPicPr>
-          <p:nvPr/>
-        </p:nvPicPr>
-        <p:blipFill>
-          <a:blip r:embed="rId2" cstate="print">
-            <a:extLst>
-              <a:ext uri="{28A0092B-C50C-407E-A947-70E740481C1C}">
-                <a14:useLocalDpi xmlns:a14="http://schemas.microsoft.com/office/drawing/2010/main" val="0"/>
-              </a:ext>
-            </a:extLst>
-          </a:blip>
-          <a:stretch>
-            <a:fillRect/>
-          </a:stretch>
-        </p:blipFill>
-        <p:spPr>
-          <a:xfrm>
-            <a:off x="120073" y="6492182"/>
-            <a:ext cx="1477818" cy="248227"/>
-          </a:xfrm>
-          <a:prstGeom prst="rect">
-            <a:avLst/>
-          </a:prstGeom>
-          <a:effectLst>
-            <a:glow rad="127000">
-              <a:schemeClr val="accent1">
-                <a:alpha val="0"/>
-              </a:schemeClr>
-            </a:glow>
-            <a:outerShdw blurRad="50800" dist="50800" dir="5400000" algn="ctr" rotWithShape="0">
-              <a:srgbClr val="000000">
-                <a:alpha val="0"/>
-              </a:srgbClr>
-            </a:outerShdw>
-            <a:reflection endPos="65000" dist="50800" dir="5400000" sy="-100000" algn="bl" rotWithShape="0"/>
-          </a:effectLst>
-        </p:spPr>
-      </p:pic>
-    </p:spTree>
-    <p:extLst>
-      <p:ext uri="{BB962C8B-B14F-4D97-AF65-F5344CB8AC3E}">
-        <p14:creationId xmlns:p14="http://schemas.microsoft.com/office/powerpoint/2010/main" val="1722000770"/>
       </p:ext>
     </p:extLst>
   </p:cSld>

</xml_diff>

<commit_message>
maj commentaire code + diapo + new doc install manuel + new synoptique global
</commit_message>
<xml_diff>
--- a/documentation/Diapo projetDMX.pptx
+++ b/documentation/Diapo projetDMX.pptx
@@ -702,7 +702,7 @@
           <a:bodyPr/>
           <a:lstStyle/>
           <a:p>
-            <a:fld id="{3011C9DC-BC02-4A0C-8946-B0E9BF7F6A3E}" type="datetime1">
+            <a:fld id="{79479AB7-61CF-48E3-A7BE-95954D99C11C}" type="datetime1">
               <a:rPr lang="fr-FR" smtClean="0"/>
               <a:t>07/06/2024</a:t>
             </a:fld>
@@ -872,7 +872,7 @@
           <a:bodyPr/>
           <a:lstStyle/>
           <a:p>
-            <a:fld id="{1B38FB77-ECD4-4F15-9833-8E84FC8A2B90}" type="datetime1">
+            <a:fld id="{AB26CA7E-BB25-4159-813F-EEC0E137ACFE}" type="datetime1">
               <a:rPr lang="fr-FR" smtClean="0"/>
               <a:t>07/06/2024</a:t>
             </a:fld>
@@ -1052,7 +1052,7 @@
           <a:bodyPr/>
           <a:lstStyle/>
           <a:p>
-            <a:fld id="{21EE197A-E270-4B20-A874-A1D64B9422AA}" type="datetime1">
+            <a:fld id="{7B41B395-FD2A-429F-896D-A074F385A12E}" type="datetime1">
               <a:rPr lang="fr-FR" smtClean="0"/>
               <a:t>07/06/2024</a:t>
             </a:fld>
@@ -1222,7 +1222,7 @@
           <a:bodyPr/>
           <a:lstStyle/>
           <a:p>
-            <a:fld id="{656126A7-BB24-4CEA-B438-6727FB68972F}" type="datetime1">
+            <a:fld id="{79DA0F35-CE08-4A46-96BF-A5BB3C8DEC9F}" type="datetime1">
               <a:rPr lang="fr-FR" smtClean="0"/>
               <a:t>07/06/2024</a:t>
             </a:fld>
@@ -1468,7 +1468,7 @@
           <a:bodyPr/>
           <a:lstStyle/>
           <a:p>
-            <a:fld id="{6CF513B6-0AD6-49F4-AB5F-8C2E6FF2A72D}" type="datetime1">
+            <a:fld id="{B1EF5238-A34E-45A8-9EDF-AA3D8312B876}" type="datetime1">
               <a:rPr lang="fr-FR" smtClean="0"/>
               <a:t>07/06/2024</a:t>
             </a:fld>
@@ -1700,7 +1700,7 @@
           <a:bodyPr/>
           <a:lstStyle/>
           <a:p>
-            <a:fld id="{2CADB1C7-2A29-4A67-9CA9-3CC1B83A5A34}" type="datetime1">
+            <a:fld id="{FB1B2711-3353-4B96-9400-99918A178215}" type="datetime1">
               <a:rPr lang="fr-FR" smtClean="0"/>
               <a:t>07/06/2024</a:t>
             </a:fld>
@@ -2067,7 +2067,7 @@
           <a:bodyPr/>
           <a:lstStyle/>
           <a:p>
-            <a:fld id="{6AE7CA86-1909-4F96-A1F0-E50F926DA1C9}" type="datetime1">
+            <a:fld id="{D0784885-9562-4587-9B38-B0A86FA11DC8}" type="datetime1">
               <a:rPr lang="fr-FR" smtClean="0"/>
               <a:t>07/06/2024</a:t>
             </a:fld>
@@ -2185,7 +2185,7 @@
           <a:bodyPr/>
           <a:lstStyle/>
           <a:p>
-            <a:fld id="{EF285892-428A-49F4-A76F-C9039EFCD751}" type="datetime1">
+            <a:fld id="{D012715E-0FF1-4C90-BF36-5D132CC66135}" type="datetime1">
               <a:rPr lang="fr-FR" smtClean="0"/>
               <a:t>07/06/2024</a:t>
             </a:fld>
@@ -2280,7 +2280,7 @@
           <a:bodyPr/>
           <a:lstStyle/>
           <a:p>
-            <a:fld id="{3F6E4972-BAA7-4C60-A6A7-3FED909F80E9}" type="datetime1">
+            <a:fld id="{3EAE3FA9-3614-4389-AF70-49C2F7C662DE}" type="datetime1">
               <a:rPr lang="fr-FR" smtClean="0"/>
               <a:t>07/06/2024</a:t>
             </a:fld>
@@ -2557,7 +2557,7 @@
           <a:bodyPr/>
           <a:lstStyle/>
           <a:p>
-            <a:fld id="{F6BD69F5-ED2C-46F5-9ECE-439B569D2CCD}" type="datetime1">
+            <a:fld id="{80B2F412-96AC-4A8E-BC1B-9C9D63DC472F}" type="datetime1">
               <a:rPr lang="fr-FR" smtClean="0"/>
               <a:t>07/06/2024</a:t>
             </a:fld>
@@ -2810,7 +2810,7 @@
           <a:bodyPr/>
           <a:lstStyle/>
           <a:p>
-            <a:fld id="{640999B8-B54D-42FB-BB87-98F12AD4DB6D}" type="datetime1">
+            <a:fld id="{5A7F0B1E-B93B-4DD9-BE80-ED3303C206B0}" type="datetime1">
               <a:rPr lang="fr-FR" smtClean="0"/>
               <a:t>07/06/2024</a:t>
             </a:fld>
@@ -3023,7 +3023,7 @@
             </a:lvl1pPr>
           </a:lstStyle>
           <a:p>
-            <a:fld id="{D7CC7EB2-00B3-4E08-9448-9B1B24F94944}" type="datetime1">
+            <a:fld id="{64584BD8-F425-437A-B3D4-60A73B57126C}" type="datetime1">
               <a:rPr lang="fr-FR" smtClean="0"/>
               <a:t>07/06/2024</a:t>
             </a:fld>
@@ -3472,29 +3472,6 @@
           </a:prstGeom>
         </p:spPr>
       </p:pic>
-      <p:sp>
-        <p:nvSpPr>
-          <p:cNvPr id="5" name="Espace réservé du numéro de diapositive 4"/>
-          <p:cNvSpPr>
-            <a:spLocks noGrp="1"/>
-          </p:cNvSpPr>
-          <p:nvPr>
-            <p:ph type="sldNum" sz="quarter" idx="12"/>
-          </p:nvPr>
-        </p:nvSpPr>
-        <p:spPr/>
-        <p:txBody>
-          <a:bodyPr/>
-          <a:lstStyle/>
-          <a:p>
-            <a:fld id="{5B7114E8-7C5A-4E0D-8412-C2486C50547C}" type="slidenum">
-              <a:rPr lang="fr-FR" smtClean="0"/>
-              <a:t>1</a:t>
-            </a:fld>
-            <a:endParaRPr lang="fr-FR"/>
-          </a:p>
-        </p:txBody>
-      </p:sp>
       <p:pic>
         <p:nvPicPr>
           <p:cNvPr id="6" name="Image 5"/>
@@ -3874,6 +3851,29 @@
             <a:endParaRPr lang="fr-FR" sz="2400" dirty="0">
               <a:latin typeface="+mj-lt"/>
             </a:endParaRPr>
+          </a:p>
+        </p:txBody>
+      </p:sp>
+      <p:sp>
+        <p:nvSpPr>
+          <p:cNvPr id="7" name="Espace réservé du numéro de diapositive 6"/>
+          <p:cNvSpPr>
+            <a:spLocks noGrp="1"/>
+          </p:cNvSpPr>
+          <p:nvPr>
+            <p:ph type="sldNum" sz="quarter" idx="12"/>
+          </p:nvPr>
+        </p:nvSpPr>
+        <p:spPr/>
+        <p:txBody>
+          <a:bodyPr/>
+          <a:lstStyle/>
+          <a:p>
+            <a:fld id="{5B7114E8-7C5A-4E0D-8412-C2486C50547C}" type="slidenum">
+              <a:rPr lang="fr-FR" smtClean="0"/>
+              <a:t>1</a:t>
+            </a:fld>
+            <a:endParaRPr lang="fr-FR"/>
           </a:p>
         </p:txBody>
       </p:sp>
@@ -4037,6 +4037,29 @@
           </a:prstGeom>
         </p:spPr>
       </p:pic>
+      <p:sp>
+        <p:nvSpPr>
+          <p:cNvPr id="4" name="Espace réservé du numéro de diapositive 3"/>
+          <p:cNvSpPr>
+            <a:spLocks noGrp="1"/>
+          </p:cNvSpPr>
+          <p:nvPr>
+            <p:ph type="sldNum" sz="quarter" idx="12"/>
+          </p:nvPr>
+        </p:nvSpPr>
+        <p:spPr/>
+        <p:txBody>
+          <a:bodyPr/>
+          <a:lstStyle/>
+          <a:p>
+            <a:fld id="{5B7114E8-7C5A-4E0D-8412-C2486C50547C}" type="slidenum">
+              <a:rPr lang="fr-FR" smtClean="0"/>
+              <a:t>10</a:t>
+            </a:fld>
+            <a:endParaRPr lang="fr-FR"/>
+          </a:p>
+        </p:txBody>
+      </p:sp>
     </p:spTree>
     <p:extLst>
       <p:ext uri="{BB962C8B-B14F-4D97-AF65-F5344CB8AC3E}">
@@ -4295,6 +4318,29 @@
           </a:fontRef>
         </p:style>
       </p:cxnSp>
+      <p:sp>
+        <p:nvSpPr>
+          <p:cNvPr id="3" name="Espace réservé du numéro de diapositive 2"/>
+          <p:cNvSpPr>
+            <a:spLocks noGrp="1"/>
+          </p:cNvSpPr>
+          <p:nvPr>
+            <p:ph type="sldNum" sz="quarter" idx="12"/>
+          </p:nvPr>
+        </p:nvSpPr>
+        <p:spPr/>
+        <p:txBody>
+          <a:bodyPr/>
+          <a:lstStyle/>
+          <a:p>
+            <a:fld id="{5B7114E8-7C5A-4E0D-8412-C2486C50547C}" type="slidenum">
+              <a:rPr lang="fr-FR" smtClean="0"/>
+              <a:t>11</a:t>
+            </a:fld>
+            <a:endParaRPr lang="fr-FR"/>
+          </a:p>
+        </p:txBody>
+      </p:sp>
     </p:spTree>
     <p:extLst>
       <p:ext uri="{BB962C8B-B14F-4D97-AF65-F5344CB8AC3E}">
@@ -4454,6 +4500,29 @@
           </a:prstGeom>
         </p:spPr>
       </p:pic>
+      <p:sp>
+        <p:nvSpPr>
+          <p:cNvPr id="4" name="Espace réservé du numéro de diapositive 3"/>
+          <p:cNvSpPr>
+            <a:spLocks noGrp="1"/>
+          </p:cNvSpPr>
+          <p:nvPr>
+            <p:ph type="sldNum" sz="quarter" idx="12"/>
+          </p:nvPr>
+        </p:nvSpPr>
+        <p:spPr/>
+        <p:txBody>
+          <a:bodyPr/>
+          <a:lstStyle/>
+          <a:p>
+            <a:fld id="{5B7114E8-7C5A-4E0D-8412-C2486C50547C}" type="slidenum">
+              <a:rPr lang="fr-FR" smtClean="0"/>
+              <a:t>12</a:t>
+            </a:fld>
+            <a:endParaRPr lang="fr-FR"/>
+          </a:p>
+        </p:txBody>
+      </p:sp>
     </p:spTree>
     <p:extLst>
       <p:ext uri="{BB962C8B-B14F-4D97-AF65-F5344CB8AC3E}">
@@ -4613,6 +4682,29 @@
           </a:prstGeom>
         </p:spPr>
       </p:pic>
+      <p:sp>
+        <p:nvSpPr>
+          <p:cNvPr id="4" name="Espace réservé du numéro de diapositive 3"/>
+          <p:cNvSpPr>
+            <a:spLocks noGrp="1"/>
+          </p:cNvSpPr>
+          <p:nvPr>
+            <p:ph type="sldNum" sz="quarter" idx="12"/>
+          </p:nvPr>
+        </p:nvSpPr>
+        <p:spPr/>
+        <p:txBody>
+          <a:bodyPr/>
+          <a:lstStyle/>
+          <a:p>
+            <a:fld id="{5B7114E8-7C5A-4E0D-8412-C2486C50547C}" type="slidenum">
+              <a:rPr lang="fr-FR" smtClean="0"/>
+              <a:t>13</a:t>
+            </a:fld>
+            <a:endParaRPr lang="fr-FR"/>
+          </a:p>
+        </p:txBody>
+      </p:sp>
     </p:spTree>
     <p:extLst>
       <p:ext uri="{BB962C8B-B14F-4D97-AF65-F5344CB8AC3E}">
@@ -4772,6 +4864,29 @@
           </a:prstGeom>
         </p:spPr>
       </p:pic>
+      <p:sp>
+        <p:nvSpPr>
+          <p:cNvPr id="4" name="Espace réservé du numéro de diapositive 3"/>
+          <p:cNvSpPr>
+            <a:spLocks noGrp="1"/>
+          </p:cNvSpPr>
+          <p:nvPr>
+            <p:ph type="sldNum" sz="quarter" idx="12"/>
+          </p:nvPr>
+        </p:nvSpPr>
+        <p:spPr/>
+        <p:txBody>
+          <a:bodyPr/>
+          <a:lstStyle/>
+          <a:p>
+            <a:fld id="{5B7114E8-7C5A-4E0D-8412-C2486C50547C}" type="slidenum">
+              <a:rPr lang="fr-FR" smtClean="0"/>
+              <a:t>14</a:t>
+            </a:fld>
+            <a:endParaRPr lang="fr-FR"/>
+          </a:p>
+        </p:txBody>
+      </p:sp>
     </p:spTree>
     <p:extLst>
       <p:ext uri="{BB962C8B-B14F-4D97-AF65-F5344CB8AC3E}">
@@ -4918,6 +5033,29 @@
           </a:prstGeom>
         </p:spPr>
       </p:pic>
+      <p:sp>
+        <p:nvSpPr>
+          <p:cNvPr id="3" name="Espace réservé du numéro de diapositive 2"/>
+          <p:cNvSpPr>
+            <a:spLocks noGrp="1"/>
+          </p:cNvSpPr>
+          <p:nvPr>
+            <p:ph type="sldNum" sz="quarter" idx="12"/>
+          </p:nvPr>
+        </p:nvSpPr>
+        <p:spPr/>
+        <p:txBody>
+          <a:bodyPr/>
+          <a:lstStyle/>
+          <a:p>
+            <a:fld id="{5B7114E8-7C5A-4E0D-8412-C2486C50547C}" type="slidenum">
+              <a:rPr lang="fr-FR" smtClean="0"/>
+              <a:t>15</a:t>
+            </a:fld>
+            <a:endParaRPr lang="fr-FR"/>
+          </a:p>
+        </p:txBody>
+      </p:sp>
     </p:spTree>
     <p:extLst>
       <p:ext uri="{BB962C8B-B14F-4D97-AF65-F5344CB8AC3E}">
@@ -5064,6 +5202,29 @@
           </a:prstGeom>
         </p:spPr>
       </p:pic>
+      <p:sp>
+        <p:nvSpPr>
+          <p:cNvPr id="3" name="Espace réservé du numéro de diapositive 2"/>
+          <p:cNvSpPr>
+            <a:spLocks noGrp="1"/>
+          </p:cNvSpPr>
+          <p:nvPr>
+            <p:ph type="sldNum" sz="quarter" idx="12"/>
+          </p:nvPr>
+        </p:nvSpPr>
+        <p:spPr/>
+        <p:txBody>
+          <a:bodyPr/>
+          <a:lstStyle/>
+          <a:p>
+            <a:fld id="{5B7114E8-7C5A-4E0D-8412-C2486C50547C}" type="slidenum">
+              <a:rPr lang="fr-FR" smtClean="0"/>
+              <a:t>16</a:t>
+            </a:fld>
+            <a:endParaRPr lang="fr-FR"/>
+          </a:p>
+        </p:txBody>
+      </p:sp>
     </p:spTree>
     <p:extLst>
       <p:ext uri="{BB962C8B-B14F-4D97-AF65-F5344CB8AC3E}">
@@ -5518,6 +5679,29 @@
           </a:p>
         </p:txBody>
       </p:sp>
+      <p:sp>
+        <p:nvSpPr>
+          <p:cNvPr id="4" name="Espace réservé du numéro de diapositive 3"/>
+          <p:cNvSpPr>
+            <a:spLocks noGrp="1"/>
+          </p:cNvSpPr>
+          <p:nvPr>
+            <p:ph type="sldNum" sz="quarter" idx="12"/>
+          </p:nvPr>
+        </p:nvSpPr>
+        <p:spPr/>
+        <p:txBody>
+          <a:bodyPr/>
+          <a:lstStyle/>
+          <a:p>
+            <a:fld id="{5B7114E8-7C5A-4E0D-8412-C2486C50547C}" type="slidenum">
+              <a:rPr lang="fr-FR" smtClean="0"/>
+              <a:t>17</a:t>
+            </a:fld>
+            <a:endParaRPr lang="fr-FR"/>
+          </a:p>
+        </p:txBody>
+      </p:sp>
     </p:spTree>
     <p:extLst>
       <p:ext uri="{BB962C8B-B14F-4D97-AF65-F5344CB8AC3E}">
@@ -5965,6 +6149,29 @@
           </a:prstGeom>
         </p:spPr>
       </p:pic>
+      <p:sp>
+        <p:nvSpPr>
+          <p:cNvPr id="4" name="Espace réservé du numéro de diapositive 3"/>
+          <p:cNvSpPr>
+            <a:spLocks noGrp="1"/>
+          </p:cNvSpPr>
+          <p:nvPr>
+            <p:ph type="sldNum" sz="quarter" idx="12"/>
+          </p:nvPr>
+        </p:nvSpPr>
+        <p:spPr/>
+        <p:txBody>
+          <a:bodyPr/>
+          <a:lstStyle/>
+          <a:p>
+            <a:fld id="{5B7114E8-7C5A-4E0D-8412-C2486C50547C}" type="slidenum">
+              <a:rPr lang="fr-FR" smtClean="0"/>
+              <a:t>18</a:t>
+            </a:fld>
+            <a:endParaRPr lang="fr-FR"/>
+          </a:p>
+        </p:txBody>
+      </p:sp>
     </p:spTree>
     <p:extLst>
       <p:ext uri="{BB962C8B-B14F-4D97-AF65-F5344CB8AC3E}">
@@ -6071,13 +6278,7 @@
               <a:rPr lang="fr-FR" sz="2400" dirty="0" smtClean="0">
                 <a:latin typeface="+mj-lt"/>
               </a:rPr>
-              <a:t>- Console </a:t>
-            </a:r>
-            <a:r>
-              <a:rPr lang="fr-FR" sz="2400" dirty="0" smtClean="0">
-                <a:latin typeface="+mj-lt"/>
-              </a:rPr>
-              <a:t>Matériel</a:t>
+              <a:t>- Console Matériel</a:t>
             </a:r>
           </a:p>
           <a:p>
@@ -6764,6 +6965,29 @@
           </a:p>
         </p:txBody>
       </p:sp>
+      <p:sp>
+        <p:nvSpPr>
+          <p:cNvPr id="3" name="Espace réservé du numéro de diapositive 2"/>
+          <p:cNvSpPr>
+            <a:spLocks noGrp="1"/>
+          </p:cNvSpPr>
+          <p:nvPr>
+            <p:ph type="sldNum" sz="quarter" idx="12"/>
+          </p:nvPr>
+        </p:nvSpPr>
+        <p:spPr/>
+        <p:txBody>
+          <a:bodyPr/>
+          <a:lstStyle/>
+          <a:p>
+            <a:fld id="{5B7114E8-7C5A-4E0D-8412-C2486C50547C}" type="slidenum">
+              <a:rPr lang="fr-FR" smtClean="0"/>
+              <a:t>19</a:t>
+            </a:fld>
+            <a:endParaRPr lang="fr-FR"/>
+          </a:p>
+        </p:txBody>
+      </p:sp>
     </p:spTree>
     <p:extLst>
       <p:ext uri="{BB962C8B-B14F-4D97-AF65-F5344CB8AC3E}">
@@ -6801,29 +7025,6 @@
           <a:chExt cx="0" cy="0"/>
         </a:xfrm>
       </p:grpSpPr>
-      <p:sp>
-        <p:nvSpPr>
-          <p:cNvPr id="5" name="Espace réservé du numéro de diapositive 4"/>
-          <p:cNvSpPr>
-            <a:spLocks noGrp="1"/>
-          </p:cNvSpPr>
-          <p:nvPr>
-            <p:ph type="sldNum" sz="quarter" idx="12"/>
-          </p:nvPr>
-        </p:nvSpPr>
-        <p:spPr/>
-        <p:txBody>
-          <a:bodyPr/>
-          <a:lstStyle/>
-          <a:p>
-            <a:fld id="{5B7114E8-7C5A-4E0D-8412-C2486C50547C}" type="slidenum">
-              <a:rPr lang="fr-FR" smtClean="0"/>
-              <a:t>2</a:t>
-            </a:fld>
-            <a:endParaRPr lang="fr-FR"/>
-          </a:p>
-        </p:txBody>
-      </p:sp>
       <p:sp>
         <p:nvSpPr>
           <p:cNvPr id="7" name="Sous-titre 2"/>
@@ -9004,6 +9205,29 @@
           </a:effectLst>
         </p:spPr>
       </p:pic>
+      <p:sp>
+        <p:nvSpPr>
+          <p:cNvPr id="2" name="Espace réservé du numéro de diapositive 1"/>
+          <p:cNvSpPr>
+            <a:spLocks noGrp="1"/>
+          </p:cNvSpPr>
+          <p:nvPr>
+            <p:ph type="sldNum" sz="quarter" idx="12"/>
+          </p:nvPr>
+        </p:nvSpPr>
+        <p:spPr/>
+        <p:txBody>
+          <a:bodyPr/>
+          <a:lstStyle/>
+          <a:p>
+            <a:fld id="{5B7114E8-7C5A-4E0D-8412-C2486C50547C}" type="slidenum">
+              <a:rPr lang="fr-FR" smtClean="0"/>
+              <a:t>2</a:t>
+            </a:fld>
+            <a:endParaRPr lang="fr-FR"/>
+          </a:p>
+        </p:txBody>
+      </p:sp>
     </p:spTree>
     <p:extLst>
       <p:ext uri="{BB962C8B-B14F-4D97-AF65-F5344CB8AC3E}">
@@ -9650,6 +9874,29 @@
           </a:effectLst>
         </p:spPr>
       </p:pic>
+      <p:sp>
+        <p:nvSpPr>
+          <p:cNvPr id="4" name="Espace réservé du numéro de diapositive 3"/>
+          <p:cNvSpPr>
+            <a:spLocks noGrp="1"/>
+          </p:cNvSpPr>
+          <p:nvPr>
+            <p:ph type="sldNum" sz="quarter" idx="12"/>
+          </p:nvPr>
+        </p:nvSpPr>
+        <p:spPr/>
+        <p:txBody>
+          <a:bodyPr/>
+          <a:lstStyle/>
+          <a:p>
+            <a:fld id="{5B7114E8-7C5A-4E0D-8412-C2486C50547C}" type="slidenum">
+              <a:rPr lang="fr-FR" smtClean="0"/>
+              <a:t>20</a:t>
+            </a:fld>
+            <a:endParaRPr lang="fr-FR"/>
+          </a:p>
+        </p:txBody>
+      </p:sp>
     </p:spTree>
     <p:extLst>
       <p:ext uri="{BB962C8B-B14F-4D97-AF65-F5344CB8AC3E}">
@@ -9772,6 +10019,29 @@
           </a:effectLst>
         </p:spPr>
       </p:pic>
+      <p:sp>
+        <p:nvSpPr>
+          <p:cNvPr id="3" name="Espace réservé du numéro de diapositive 2"/>
+          <p:cNvSpPr>
+            <a:spLocks noGrp="1"/>
+          </p:cNvSpPr>
+          <p:nvPr>
+            <p:ph type="sldNum" sz="quarter" idx="12"/>
+          </p:nvPr>
+        </p:nvSpPr>
+        <p:spPr/>
+        <p:txBody>
+          <a:bodyPr/>
+          <a:lstStyle/>
+          <a:p>
+            <a:fld id="{5B7114E8-7C5A-4E0D-8412-C2486C50547C}" type="slidenum">
+              <a:rPr lang="fr-FR" smtClean="0"/>
+              <a:t>21</a:t>
+            </a:fld>
+            <a:endParaRPr lang="fr-FR"/>
+          </a:p>
+        </p:txBody>
+      </p:sp>
     </p:spTree>
     <p:extLst>
       <p:ext uri="{BB962C8B-B14F-4D97-AF65-F5344CB8AC3E}">
@@ -9896,6 +10166,29 @@
           </a:effectLst>
         </p:spPr>
       </p:pic>
+      <p:sp>
+        <p:nvSpPr>
+          <p:cNvPr id="4" name="Espace réservé du numéro de diapositive 3"/>
+          <p:cNvSpPr>
+            <a:spLocks noGrp="1"/>
+          </p:cNvSpPr>
+          <p:nvPr>
+            <p:ph type="sldNum" sz="quarter" idx="12"/>
+          </p:nvPr>
+        </p:nvSpPr>
+        <p:spPr/>
+        <p:txBody>
+          <a:bodyPr/>
+          <a:lstStyle/>
+          <a:p>
+            <a:fld id="{5B7114E8-7C5A-4E0D-8412-C2486C50547C}" type="slidenum">
+              <a:rPr lang="fr-FR" smtClean="0"/>
+              <a:t>22</a:t>
+            </a:fld>
+            <a:endParaRPr lang="fr-FR"/>
+          </a:p>
+        </p:txBody>
+      </p:sp>
     </p:spTree>
     <p:extLst>
       <p:ext uri="{BB962C8B-B14F-4D97-AF65-F5344CB8AC3E}">
@@ -10020,6 +10313,29 @@
           </a:effectLst>
         </p:spPr>
       </p:pic>
+      <p:sp>
+        <p:nvSpPr>
+          <p:cNvPr id="4" name="Espace réservé du numéro de diapositive 3"/>
+          <p:cNvSpPr>
+            <a:spLocks noGrp="1"/>
+          </p:cNvSpPr>
+          <p:nvPr>
+            <p:ph type="sldNum" sz="quarter" idx="12"/>
+          </p:nvPr>
+        </p:nvSpPr>
+        <p:spPr/>
+        <p:txBody>
+          <a:bodyPr/>
+          <a:lstStyle/>
+          <a:p>
+            <a:fld id="{5B7114E8-7C5A-4E0D-8412-C2486C50547C}" type="slidenum">
+              <a:rPr lang="fr-FR" smtClean="0"/>
+              <a:t>23</a:t>
+            </a:fld>
+            <a:endParaRPr lang="fr-FR"/>
+          </a:p>
+        </p:txBody>
+      </p:sp>
     </p:spTree>
     <p:extLst>
       <p:ext uri="{BB962C8B-B14F-4D97-AF65-F5344CB8AC3E}">
@@ -10141,6 +10457,29 @@
           </a:effectLst>
         </p:spPr>
       </p:pic>
+      <p:sp>
+        <p:nvSpPr>
+          <p:cNvPr id="4" name="Espace réservé du numéro de diapositive 3"/>
+          <p:cNvSpPr>
+            <a:spLocks noGrp="1"/>
+          </p:cNvSpPr>
+          <p:nvPr>
+            <p:ph type="sldNum" sz="quarter" idx="12"/>
+          </p:nvPr>
+        </p:nvSpPr>
+        <p:spPr/>
+        <p:txBody>
+          <a:bodyPr/>
+          <a:lstStyle/>
+          <a:p>
+            <a:fld id="{5B7114E8-7C5A-4E0D-8412-C2486C50547C}" type="slidenum">
+              <a:rPr lang="fr-FR" smtClean="0"/>
+              <a:t>24</a:t>
+            </a:fld>
+            <a:endParaRPr lang="fr-FR"/>
+          </a:p>
+        </p:txBody>
+      </p:sp>
     </p:spTree>
     <p:extLst>
       <p:ext uri="{BB962C8B-B14F-4D97-AF65-F5344CB8AC3E}">
@@ -10260,11 +10599,26 @@
               <a:buSzPts val="1100"/>
             </a:pPr>
             <a:r>
-              <a:rPr lang="fr-FR" sz="2400" dirty="0" smtClean="0">
+              <a:rPr lang="fr-FR" sz="1200" dirty="0" smtClean="0">
                 <a:latin typeface="+mj-lt"/>
               </a:rPr>
-              <a:t>Imprimer : cahier de recette + synoptique + diagramme déploiement + manuel d’utilisation</a:t>
-            </a:r>
+              <a:t>- Imprimer </a:t>
+            </a:r>
+            <a:r>
+              <a:rPr lang="fr-FR" sz="1200" dirty="0" smtClean="0">
+                <a:latin typeface="+mj-lt"/>
+              </a:rPr>
+              <a:t>: cahier de recette + synoptique + diagramme déploiement + manuel </a:t>
+            </a:r>
+            <a:r>
+              <a:rPr lang="fr-FR" sz="1200" dirty="0" smtClean="0">
+                <a:latin typeface="+mj-lt"/>
+              </a:rPr>
+              <a:t>d’utilisation (de tout le monde) + (scénario ?)</a:t>
+            </a:r>
+            <a:endParaRPr lang="fr-FR" sz="1200" dirty="0">
+              <a:latin typeface="+mj-lt"/>
+            </a:endParaRPr>
           </a:p>
           <a:p>
             <a:pPr marL="0" lvl="0" indent="0">
@@ -10272,8 +10626,57 @@
                 <a:schemeClr val="lt1"/>
               </a:buClr>
               <a:buSzPts val="1100"/>
+              <a:buNone/>
             </a:pPr>
-            <a:endParaRPr lang="fr-FR" sz="2400" dirty="0">
+            <a:r>
+              <a:rPr lang="fr-FR" sz="1200" dirty="0" smtClean="0">
+                <a:latin typeface="+mj-lt"/>
+              </a:rPr>
+              <a:t>- Faire </a:t>
+            </a:r>
+            <a:r>
+              <a:rPr lang="fr-FR" sz="1200" dirty="0" err="1" smtClean="0">
+                <a:latin typeface="+mj-lt"/>
+              </a:rPr>
+              <a:t>gantt</a:t>
+            </a:r>
+            <a:r>
+              <a:rPr lang="fr-FR" sz="1200" dirty="0" smtClean="0">
+                <a:latin typeface="+mj-lt"/>
+              </a:rPr>
+              <a:t> + </a:t>
+            </a:r>
+            <a:r>
+              <a:rPr lang="fr-FR" sz="1200" dirty="0" err="1" smtClean="0">
+                <a:latin typeface="+mj-lt"/>
+              </a:rPr>
+              <a:t>gantt</a:t>
+            </a:r>
+            <a:r>
+              <a:rPr lang="fr-FR" sz="1200" dirty="0" smtClean="0">
+                <a:latin typeface="+mj-lt"/>
+              </a:rPr>
+              <a:t> </a:t>
+            </a:r>
+            <a:r>
+              <a:rPr lang="fr-FR" sz="1200" dirty="0" err="1" smtClean="0">
+                <a:latin typeface="+mj-lt"/>
+              </a:rPr>
+              <a:t>prévi</a:t>
+            </a:r>
+            <a:r>
+              <a:rPr lang="fr-FR" sz="1200" dirty="0" smtClean="0">
+                <a:latin typeface="+mj-lt"/>
+              </a:rPr>
+              <a:t> (que du perso</a:t>
+            </a:r>
+            <a:r>
+              <a:rPr lang="fr-FR" sz="1200" dirty="0" smtClean="0">
+                <a:latin typeface="+mj-lt"/>
+              </a:rPr>
+              <a:t>)</a:t>
+            </a:r>
+            <a:endParaRPr lang="fr-FR" sz="1200" dirty="0">
               <a:latin typeface="+mj-lt"/>
             </a:endParaRPr>
           </a:p>
@@ -10283,49 +10686,41 @@
                 <a:schemeClr val="lt1"/>
               </a:buClr>
               <a:buSzPts val="1100"/>
+              <a:buNone/>
             </a:pPr>
             <a:r>
-              <a:rPr lang="fr-FR" sz="2400" dirty="0" smtClean="0">
+              <a:rPr lang="fr-FR" sz="1200" dirty="0" smtClean="0">
                 <a:latin typeface="+mj-lt"/>
               </a:rPr>
-              <a:t>Faire </a:t>
-            </a:r>
-            <a:r>
-              <a:rPr lang="fr-FR" sz="2400" dirty="0" err="1" smtClean="0">
+              <a:t>- </a:t>
+            </a:r>
+            <a:r>
+              <a:rPr lang="fr-FR" sz="1200" dirty="0" err="1" smtClean="0">
                 <a:latin typeface="+mj-lt"/>
               </a:rPr>
-              <a:t>gantt</a:t>
-            </a:r>
-            <a:r>
-              <a:rPr lang="fr-FR" sz="2400" dirty="0" smtClean="0">
-                <a:latin typeface="+mj-lt"/>
-              </a:rPr>
-              <a:t> + </a:t>
-            </a:r>
-            <a:r>
-              <a:rPr lang="fr-FR" sz="2400" dirty="0" err="1" smtClean="0">
-                <a:latin typeface="+mj-lt"/>
-              </a:rPr>
-              <a:t>gantt</a:t>
-            </a:r>
-            <a:r>
-              <a:rPr lang="fr-FR" sz="2400" dirty="0" smtClean="0">
+              <a:t>Modif</a:t>
+            </a:r>
+            <a:r>
+              <a:rPr lang="fr-FR" sz="1200" dirty="0" smtClean="0">
                 <a:latin typeface="+mj-lt"/>
               </a:rPr>
               <a:t> </a:t>
             </a:r>
             <a:r>
-              <a:rPr lang="fr-FR" sz="2400" dirty="0" err="1" smtClean="0">
+              <a:rPr lang="fr-FR" sz="1200" dirty="0" smtClean="0">
                 <a:latin typeface="+mj-lt"/>
               </a:rPr>
-              <a:t>prévi</a:t>
-            </a:r>
-            <a:r>
-              <a:rPr lang="fr-FR" sz="2400" dirty="0" smtClean="0">
+              <a:t>diagramme de </a:t>
+            </a:r>
+            <a:r>
+              <a:rPr lang="fr-FR" sz="1200" dirty="0" smtClean="0">
                 <a:latin typeface="+mj-lt"/>
               </a:rPr>
-              <a:t> (que du perso)</a:t>
-            </a:r>
+              <a:t>classe</a:t>
+            </a:r>
+            <a:endParaRPr lang="fr-FR" sz="1200" dirty="0">
+              <a:latin typeface="+mj-lt"/>
+            </a:endParaRPr>
           </a:p>
           <a:p>
             <a:pPr marL="0" lvl="0" indent="0">
@@ -10333,8 +10728,27 @@
                 <a:schemeClr val="lt1"/>
               </a:buClr>
               <a:buSzPts val="1100"/>
+              <a:buNone/>
             </a:pPr>
-            <a:endParaRPr lang="fr-FR" sz="2400" dirty="0">
+            <a:r>
+              <a:rPr lang="fr-FR" sz="1200" dirty="0" smtClean="0">
+                <a:latin typeface="+mj-lt"/>
+              </a:rPr>
+              <a:t>- Finir </a:t>
+            </a:r>
+            <a:r>
+              <a:rPr lang="fr-FR" sz="1200" dirty="0" smtClean="0">
+                <a:latin typeface="+mj-lt"/>
+              </a:rPr>
+              <a:t>design </a:t>
+            </a:r>
+            <a:r>
+              <a:rPr lang="fr-FR" sz="1200" dirty="0" smtClean="0">
+                <a:latin typeface="+mj-lt"/>
+              </a:rPr>
+              <a:t>diapo</a:t>
+            </a:r>
+            <a:endParaRPr lang="fr-FR" sz="1200" dirty="0">
               <a:latin typeface="+mj-lt"/>
             </a:endParaRPr>
           </a:p>
@@ -10344,19 +10758,29 @@
                 <a:schemeClr val="lt1"/>
               </a:buClr>
               <a:buSzPts val="1100"/>
+              <a:buNone/>
             </a:pPr>
             <a:r>
-              <a:rPr lang="fr-FR" sz="2400" dirty="0" err="1" smtClean="0">
+              <a:rPr lang="fr-FR" sz="1200" dirty="0" smtClean="0">
                 <a:latin typeface="+mj-lt"/>
               </a:rPr>
-              <a:t>Modif</a:t>
-            </a:r>
-            <a:r>
-              <a:rPr lang="fr-FR" sz="2400" dirty="0" smtClean="0">
+              <a:t>- Nommer </a:t>
+            </a:r>
+            <a:r>
+              <a:rPr lang="fr-FR" sz="1200" dirty="0" smtClean="0">
                 <a:latin typeface="+mj-lt"/>
               </a:rPr>
-              <a:t> diagramme de classe</a:t>
-            </a:r>
+              <a:t>les fichiers des modules de </a:t>
+            </a:r>
+            <a:r>
+              <a:rPr lang="fr-FR" sz="1200" dirty="0" smtClean="0">
+                <a:latin typeface="+mj-lt"/>
+              </a:rPr>
+              <a:t>tests</a:t>
+            </a:r>
+            <a:endParaRPr lang="fr-FR" sz="1200" dirty="0">
+              <a:latin typeface="+mj-lt"/>
+            </a:endParaRPr>
           </a:p>
           <a:p>
             <a:pPr marL="0" lvl="0" indent="0">
@@ -10364,10 +10788,14 @@
                 <a:schemeClr val="lt1"/>
               </a:buClr>
               <a:buSzPts val="1100"/>
+              <a:buNone/>
             </a:pPr>
-            <a:endParaRPr lang="fr-FR" sz="2400" dirty="0">
-              <a:latin typeface="+mj-lt"/>
-            </a:endParaRPr>
+            <a:r>
+              <a:rPr lang="fr-FR" sz="1200" dirty="0" smtClean="0">
+                <a:latin typeface="+mj-lt"/>
+              </a:rPr>
+              <a:t>- Changer scénario</a:t>
+            </a:r>
           </a:p>
           <a:p>
             <a:pPr marL="0" lvl="0" indent="0">
@@ -10375,12 +10803,13 @@
                 <a:schemeClr val="lt1"/>
               </a:buClr>
               <a:buSzPts val="1100"/>
+              <a:buNone/>
             </a:pPr>
             <a:r>
-              <a:rPr lang="fr-FR" sz="2400" dirty="0" smtClean="0">
+              <a:rPr lang="fr-FR" sz="1200" dirty="0" smtClean="0">
                 <a:latin typeface="+mj-lt"/>
               </a:rPr>
-              <a:t>Finir design diapo</a:t>
+              <a:t>- Finir CRA</a:t>
             </a:r>
           </a:p>
           <a:p>
@@ -10389,23 +10818,13 @@
                 <a:schemeClr val="lt1"/>
               </a:buClr>
               <a:buSzPts val="1100"/>
+              <a:buNone/>
             </a:pPr>
-            <a:endParaRPr lang="fr-FR" sz="2400" dirty="0">
-              <a:latin typeface="+mj-lt"/>
-            </a:endParaRPr>
-          </a:p>
-          <a:p>
-            <a:pPr marL="0" lvl="0" indent="0">
-              <a:buClr>
-                <a:schemeClr val="lt1"/>
-              </a:buClr>
-              <a:buSzPts val="1100"/>
-            </a:pPr>
-            <a:r>
-              <a:rPr lang="fr-FR" sz="2400" dirty="0" smtClean="0">
+            <a:r>
+              <a:rPr lang="fr-FR" sz="1200" dirty="0" smtClean="0">
                 <a:latin typeface="+mj-lt"/>
               </a:rPr>
-              <a:t>Nommer les fichiers des modules de tests</a:t>
+              <a:t>- Refaire le synoptique</a:t>
             </a:r>
           </a:p>
         </p:txBody>
@@ -10453,6 +10872,29 @@
           </a:effectLst>
         </p:spPr>
       </p:pic>
+      <p:sp>
+        <p:nvSpPr>
+          <p:cNvPr id="3" name="Espace réservé du numéro de diapositive 2"/>
+          <p:cNvSpPr>
+            <a:spLocks noGrp="1"/>
+          </p:cNvSpPr>
+          <p:nvPr>
+            <p:ph type="sldNum" sz="quarter" idx="12"/>
+          </p:nvPr>
+        </p:nvSpPr>
+        <p:spPr/>
+        <p:txBody>
+          <a:bodyPr/>
+          <a:lstStyle/>
+          <a:p>
+            <a:fld id="{5B7114E8-7C5A-4E0D-8412-C2486C50547C}" type="slidenum">
+              <a:rPr lang="fr-FR" smtClean="0"/>
+              <a:t>25</a:t>
+            </a:fld>
+            <a:endParaRPr lang="fr-FR"/>
+          </a:p>
+        </p:txBody>
+      </p:sp>
     </p:spTree>
     <p:extLst>
       <p:ext uri="{BB962C8B-B14F-4D97-AF65-F5344CB8AC3E}">
@@ -11254,6 +11696,29 @@
           <a:lstStyle/>
           <a:p>
             <a:pPr algn="ctr"/>
+            <a:endParaRPr lang="fr-FR"/>
+          </a:p>
+        </p:txBody>
+      </p:sp>
+      <p:sp>
+        <p:nvSpPr>
+          <p:cNvPr id="4" name="Espace réservé du numéro de diapositive 3"/>
+          <p:cNvSpPr>
+            <a:spLocks noGrp="1"/>
+          </p:cNvSpPr>
+          <p:nvPr>
+            <p:ph type="sldNum" sz="quarter" idx="12"/>
+          </p:nvPr>
+        </p:nvSpPr>
+        <p:spPr/>
+        <p:txBody>
+          <a:bodyPr/>
+          <a:lstStyle/>
+          <a:p>
+            <a:fld id="{5B7114E8-7C5A-4E0D-8412-C2486C50547C}" type="slidenum">
+              <a:rPr lang="fr-FR" smtClean="0"/>
+              <a:t>3</a:t>
+            </a:fld>
             <a:endParaRPr lang="fr-FR"/>
           </a:p>
         </p:txBody>
@@ -11641,6 +12106,29 @@
           </a:effectLst>
         </p:spPr>
       </p:pic>
+      <p:sp>
+        <p:nvSpPr>
+          <p:cNvPr id="3" name="Espace réservé du numéro de diapositive 2"/>
+          <p:cNvSpPr>
+            <a:spLocks noGrp="1"/>
+          </p:cNvSpPr>
+          <p:nvPr>
+            <p:ph type="sldNum" sz="quarter" idx="12"/>
+          </p:nvPr>
+        </p:nvSpPr>
+        <p:spPr/>
+        <p:txBody>
+          <a:bodyPr/>
+          <a:lstStyle/>
+          <a:p>
+            <a:fld id="{5B7114E8-7C5A-4E0D-8412-C2486C50547C}" type="slidenum">
+              <a:rPr lang="fr-FR" smtClean="0"/>
+              <a:t>4</a:t>
+            </a:fld>
+            <a:endParaRPr lang="fr-FR"/>
+          </a:p>
+        </p:txBody>
+      </p:sp>
     </p:spTree>
     <p:extLst>
       <p:ext uri="{BB962C8B-B14F-4D97-AF65-F5344CB8AC3E}">
@@ -11678,503 +12166,9 @@
           <a:chExt cx="0" cy="0"/>
         </a:xfrm>
       </p:grpSpPr>
-      <p:sp>
-        <p:nvSpPr>
-          <p:cNvPr id="20" name="Google Shape;188;p31">
-            <a:extLst>
-              <a:ext uri="{FF2B5EF4-FFF2-40B4-BE49-F238E27FC236}">
-                <a16:creationId xmlns:a16="http://schemas.microsoft.com/office/drawing/2014/main" id="{1EE455DA-87D3-77FF-0CEF-E1F804EA9888}"/>
-              </a:ext>
-            </a:extLst>
-          </p:cNvPr>
-          <p:cNvSpPr txBox="1">
-            <a:spLocks/>
-          </p:cNvSpPr>
-          <p:nvPr/>
-        </p:nvSpPr>
-        <p:spPr>
-          <a:xfrm>
-            <a:off x="4248726" y="480813"/>
-            <a:ext cx="1160024" cy="896876"/>
-          </a:xfrm>
-          <a:prstGeom prst="rect">
-            <a:avLst/>
-          </a:prstGeom>
-          <a:solidFill>
-            <a:schemeClr val="accent4">
-              <a:lumMod val="20000"/>
-              <a:lumOff val="80000"/>
-            </a:schemeClr>
-          </a:solidFill>
-          <a:ln>
-            <a:noFill/>
-          </a:ln>
-        </p:spPr>
-        <p:txBody>
-          <a:bodyPr spcFirstLastPara="1" wrap="square" lIns="91425" tIns="91425" rIns="91425" bIns="91425" anchor="ctr" anchorCtr="0">
-            <a:noAutofit/>
-          </a:bodyPr>
-          <a:lstStyle>
-            <a:defPPr marR="0" lvl="0" algn="l" rtl="0">
-              <a:lnSpc>
-                <a:spcPct val="100000"/>
-              </a:lnSpc>
-              <a:spcBef>
-                <a:spcPts val="0"/>
-              </a:spcBef>
-              <a:spcAft>
-                <a:spcPts val="0"/>
-              </a:spcAft>
-            </a:defPPr>
-            <a:lvl1pPr marR="0" lvl="0" algn="ctr" rtl="0">
-              <a:lnSpc>
-                <a:spcPct val="100000"/>
-              </a:lnSpc>
-              <a:spcBef>
-                <a:spcPts val="0"/>
-              </a:spcBef>
-              <a:spcAft>
-                <a:spcPts val="0"/>
-              </a:spcAft>
-              <a:buClr>
-                <a:schemeClr val="dk1"/>
-              </a:buClr>
-              <a:buSzPts val="3000"/>
-              <a:buFont typeface="Doppio One"/>
-              <a:buNone/>
-              <a:defRPr sz="3000" b="1" i="0" u="none" strike="noStrike" cap="none">
-                <a:solidFill>
-                  <a:schemeClr val="accent2"/>
-                </a:solidFill>
-                <a:latin typeface="Doppio One"/>
-                <a:ea typeface="Doppio One"/>
-                <a:cs typeface="Doppio One"/>
-                <a:sym typeface="Doppio One"/>
-              </a:defRPr>
-            </a:lvl1pPr>
-            <a:lvl2pPr marR="0" lvl="1" algn="l" rtl="0">
-              <a:lnSpc>
-                <a:spcPct val="100000"/>
-              </a:lnSpc>
-              <a:spcBef>
-                <a:spcPts val="0"/>
-              </a:spcBef>
-              <a:spcAft>
-                <a:spcPts val="0"/>
-              </a:spcAft>
-              <a:buClr>
-                <a:schemeClr val="dk1"/>
-              </a:buClr>
-              <a:buSzPts val="3000"/>
-              <a:buFont typeface="Doppio One"/>
-              <a:buNone/>
-              <a:defRPr sz="3000" b="1" i="0" u="none" strike="noStrike" cap="none">
-                <a:solidFill>
-                  <a:schemeClr val="dk1"/>
-                </a:solidFill>
-                <a:latin typeface="Doppio One"/>
-                <a:ea typeface="Doppio One"/>
-                <a:cs typeface="Doppio One"/>
-                <a:sym typeface="Doppio One"/>
-              </a:defRPr>
-            </a:lvl2pPr>
-            <a:lvl3pPr marR="0" lvl="2" algn="l" rtl="0">
-              <a:lnSpc>
-                <a:spcPct val="100000"/>
-              </a:lnSpc>
-              <a:spcBef>
-                <a:spcPts val="0"/>
-              </a:spcBef>
-              <a:spcAft>
-                <a:spcPts val="0"/>
-              </a:spcAft>
-              <a:buClr>
-                <a:schemeClr val="dk1"/>
-              </a:buClr>
-              <a:buSzPts val="3000"/>
-              <a:buFont typeface="Doppio One"/>
-              <a:buNone/>
-              <a:defRPr sz="3000" b="1" i="0" u="none" strike="noStrike" cap="none">
-                <a:solidFill>
-                  <a:schemeClr val="dk1"/>
-                </a:solidFill>
-                <a:latin typeface="Doppio One"/>
-                <a:ea typeface="Doppio One"/>
-                <a:cs typeface="Doppio One"/>
-                <a:sym typeface="Doppio One"/>
-              </a:defRPr>
-            </a:lvl3pPr>
-            <a:lvl4pPr marR="0" lvl="3" algn="l" rtl="0">
-              <a:lnSpc>
-                <a:spcPct val="100000"/>
-              </a:lnSpc>
-              <a:spcBef>
-                <a:spcPts val="0"/>
-              </a:spcBef>
-              <a:spcAft>
-                <a:spcPts val="0"/>
-              </a:spcAft>
-              <a:buClr>
-                <a:schemeClr val="dk1"/>
-              </a:buClr>
-              <a:buSzPts val="3000"/>
-              <a:buFont typeface="Doppio One"/>
-              <a:buNone/>
-              <a:defRPr sz="3000" b="1" i="0" u="none" strike="noStrike" cap="none">
-                <a:solidFill>
-                  <a:schemeClr val="dk1"/>
-                </a:solidFill>
-                <a:latin typeface="Doppio One"/>
-                <a:ea typeface="Doppio One"/>
-                <a:cs typeface="Doppio One"/>
-                <a:sym typeface="Doppio One"/>
-              </a:defRPr>
-            </a:lvl4pPr>
-            <a:lvl5pPr marR="0" lvl="4" algn="l" rtl="0">
-              <a:lnSpc>
-                <a:spcPct val="100000"/>
-              </a:lnSpc>
-              <a:spcBef>
-                <a:spcPts val="0"/>
-              </a:spcBef>
-              <a:spcAft>
-                <a:spcPts val="0"/>
-              </a:spcAft>
-              <a:buClr>
-                <a:schemeClr val="dk1"/>
-              </a:buClr>
-              <a:buSzPts val="3000"/>
-              <a:buFont typeface="Doppio One"/>
-              <a:buNone/>
-              <a:defRPr sz="3000" b="1" i="0" u="none" strike="noStrike" cap="none">
-                <a:solidFill>
-                  <a:schemeClr val="dk1"/>
-                </a:solidFill>
-                <a:latin typeface="Doppio One"/>
-                <a:ea typeface="Doppio One"/>
-                <a:cs typeface="Doppio One"/>
-                <a:sym typeface="Doppio One"/>
-              </a:defRPr>
-            </a:lvl5pPr>
-            <a:lvl6pPr marR="0" lvl="5" algn="l" rtl="0">
-              <a:lnSpc>
-                <a:spcPct val="100000"/>
-              </a:lnSpc>
-              <a:spcBef>
-                <a:spcPts val="0"/>
-              </a:spcBef>
-              <a:spcAft>
-                <a:spcPts val="0"/>
-              </a:spcAft>
-              <a:buClr>
-                <a:schemeClr val="dk1"/>
-              </a:buClr>
-              <a:buSzPts val="3000"/>
-              <a:buFont typeface="Doppio One"/>
-              <a:buNone/>
-              <a:defRPr sz="3000" b="1" i="0" u="none" strike="noStrike" cap="none">
-                <a:solidFill>
-                  <a:schemeClr val="dk1"/>
-                </a:solidFill>
-                <a:latin typeface="Doppio One"/>
-                <a:ea typeface="Doppio One"/>
-                <a:cs typeface="Doppio One"/>
-                <a:sym typeface="Doppio One"/>
-              </a:defRPr>
-            </a:lvl6pPr>
-            <a:lvl7pPr marR="0" lvl="6" algn="l" rtl="0">
-              <a:lnSpc>
-                <a:spcPct val="100000"/>
-              </a:lnSpc>
-              <a:spcBef>
-                <a:spcPts val="0"/>
-              </a:spcBef>
-              <a:spcAft>
-                <a:spcPts val="0"/>
-              </a:spcAft>
-              <a:buClr>
-                <a:schemeClr val="dk1"/>
-              </a:buClr>
-              <a:buSzPts val="3000"/>
-              <a:buFont typeface="Doppio One"/>
-              <a:buNone/>
-              <a:defRPr sz="3000" b="1" i="0" u="none" strike="noStrike" cap="none">
-                <a:solidFill>
-                  <a:schemeClr val="dk1"/>
-                </a:solidFill>
-                <a:latin typeface="Doppio One"/>
-                <a:ea typeface="Doppio One"/>
-                <a:cs typeface="Doppio One"/>
-                <a:sym typeface="Doppio One"/>
-              </a:defRPr>
-            </a:lvl7pPr>
-            <a:lvl8pPr marR="0" lvl="7" algn="l" rtl="0">
-              <a:lnSpc>
-                <a:spcPct val="100000"/>
-              </a:lnSpc>
-              <a:spcBef>
-                <a:spcPts val="0"/>
-              </a:spcBef>
-              <a:spcAft>
-                <a:spcPts val="0"/>
-              </a:spcAft>
-              <a:buClr>
-                <a:schemeClr val="dk1"/>
-              </a:buClr>
-              <a:buSzPts val="3000"/>
-              <a:buFont typeface="Doppio One"/>
-              <a:buNone/>
-              <a:defRPr sz="3000" b="1" i="0" u="none" strike="noStrike" cap="none">
-                <a:solidFill>
-                  <a:schemeClr val="dk1"/>
-                </a:solidFill>
-                <a:latin typeface="Doppio One"/>
-                <a:ea typeface="Doppio One"/>
-                <a:cs typeface="Doppio One"/>
-                <a:sym typeface="Doppio One"/>
-              </a:defRPr>
-            </a:lvl8pPr>
-            <a:lvl9pPr marR="0" lvl="8" algn="l" rtl="0">
-              <a:lnSpc>
-                <a:spcPct val="100000"/>
-              </a:lnSpc>
-              <a:spcBef>
-                <a:spcPts val="0"/>
-              </a:spcBef>
-              <a:spcAft>
-                <a:spcPts val="0"/>
-              </a:spcAft>
-              <a:buClr>
-                <a:schemeClr val="dk1"/>
-              </a:buClr>
-              <a:buSzPts val="3000"/>
-              <a:buFont typeface="Doppio One"/>
-              <a:buNone/>
-              <a:defRPr sz="3000" b="1" i="0" u="none" strike="noStrike" cap="none">
-                <a:solidFill>
-                  <a:schemeClr val="dk1"/>
-                </a:solidFill>
-                <a:latin typeface="Doppio One"/>
-                <a:ea typeface="Doppio One"/>
-                <a:cs typeface="Doppio One"/>
-                <a:sym typeface="Doppio One"/>
-              </a:defRPr>
-            </a:lvl9pPr>
-          </a:lstStyle>
-          <a:p>
-            <a:r>
-              <a:rPr lang="en" sz="4000" dirty="0" smtClean="0">
-                <a:solidFill>
-                  <a:schemeClr val="accent1">
-                    <a:lumMod val="50000"/>
-                  </a:schemeClr>
-                </a:solidFill>
-              </a:rPr>
-              <a:t>02</a:t>
-            </a:r>
-          </a:p>
-        </p:txBody>
-      </p:sp>
-      <p:sp>
-        <p:nvSpPr>
-          <p:cNvPr id="21" name="Google Shape;194;p31"/>
-          <p:cNvSpPr txBox="1">
-            <a:spLocks/>
-          </p:cNvSpPr>
-          <p:nvPr/>
-        </p:nvSpPr>
-        <p:spPr>
-          <a:xfrm>
-            <a:off x="5408750" y="182363"/>
-            <a:ext cx="3744486" cy="596900"/>
-          </a:xfrm>
-          <a:prstGeom prst="rect">
-            <a:avLst/>
-          </a:prstGeom>
-        </p:spPr>
-        <p:txBody>
-          <a:bodyPr spcFirstLastPara="1" wrap="square" lIns="91425" tIns="91425" rIns="91425" bIns="91425" anchor="t" anchorCtr="0">
-            <a:noAutofit/>
-          </a:bodyPr>
-          <a:lstStyle>
-            <a:lvl1pPr marL="228600" indent="-228600" algn="l" defTabSz="914400" rtl="0" eaLnBrk="1" latinLnBrk="0" hangingPunct="1">
-              <a:lnSpc>
-                <a:spcPct val="90000"/>
-              </a:lnSpc>
-              <a:spcBef>
-                <a:spcPts val="1000"/>
-              </a:spcBef>
-              <a:buFont typeface="Arial" panose="020B0604020202020204" pitchFamily="34" charset="0"/>
-              <a:buChar char="•"/>
-              <a:defRPr sz="2800" kern="1200">
-                <a:solidFill>
-                  <a:schemeClr val="tx1"/>
-                </a:solidFill>
-                <a:latin typeface="+mn-lt"/>
-                <a:ea typeface="+mn-ea"/>
-                <a:cs typeface="+mn-cs"/>
-              </a:defRPr>
-            </a:lvl1pPr>
-            <a:lvl2pPr marL="685800" indent="-228600" algn="l" defTabSz="914400" rtl="0" eaLnBrk="1" latinLnBrk="0" hangingPunct="1">
-              <a:lnSpc>
-                <a:spcPct val="90000"/>
-              </a:lnSpc>
-              <a:spcBef>
-                <a:spcPts val="500"/>
-              </a:spcBef>
-              <a:buFont typeface="Arial" panose="020B0604020202020204" pitchFamily="34" charset="0"/>
-              <a:buChar char="•"/>
-              <a:defRPr sz="2400" kern="1200">
-                <a:solidFill>
-                  <a:schemeClr val="tx1"/>
-                </a:solidFill>
-                <a:latin typeface="+mn-lt"/>
-                <a:ea typeface="+mn-ea"/>
-                <a:cs typeface="+mn-cs"/>
-              </a:defRPr>
-            </a:lvl2pPr>
-            <a:lvl3pPr marL="1143000" indent="-228600" algn="l" defTabSz="914400" rtl="0" eaLnBrk="1" latinLnBrk="0" hangingPunct="1">
-              <a:lnSpc>
-                <a:spcPct val="90000"/>
-              </a:lnSpc>
-              <a:spcBef>
-                <a:spcPts val="500"/>
-              </a:spcBef>
-              <a:buFont typeface="Arial" panose="020B0604020202020204" pitchFamily="34" charset="0"/>
-              <a:buChar char="•"/>
-              <a:defRPr sz="2000" kern="1200">
-                <a:solidFill>
-                  <a:schemeClr val="tx1"/>
-                </a:solidFill>
-                <a:latin typeface="+mn-lt"/>
-                <a:ea typeface="+mn-ea"/>
-                <a:cs typeface="+mn-cs"/>
-              </a:defRPr>
-            </a:lvl3pPr>
-            <a:lvl4pPr marL="1600200" indent="-228600" algn="l" defTabSz="914400" rtl="0" eaLnBrk="1" latinLnBrk="0" hangingPunct="1">
-              <a:lnSpc>
-                <a:spcPct val="90000"/>
-              </a:lnSpc>
-              <a:spcBef>
-                <a:spcPts val="500"/>
-              </a:spcBef>
-              <a:buFont typeface="Arial" panose="020B0604020202020204" pitchFamily="34" charset="0"/>
-              <a:buChar char="•"/>
-              <a:defRPr sz="1800" kern="1200">
-                <a:solidFill>
-                  <a:schemeClr val="tx1"/>
-                </a:solidFill>
-                <a:latin typeface="+mn-lt"/>
-                <a:ea typeface="+mn-ea"/>
-                <a:cs typeface="+mn-cs"/>
-              </a:defRPr>
-            </a:lvl4pPr>
-            <a:lvl5pPr marL="2057400" indent="-228600" algn="l" defTabSz="914400" rtl="0" eaLnBrk="1" latinLnBrk="0" hangingPunct="1">
-              <a:lnSpc>
-                <a:spcPct val="90000"/>
-              </a:lnSpc>
-              <a:spcBef>
-                <a:spcPts val="500"/>
-              </a:spcBef>
-              <a:buFont typeface="Arial" panose="020B0604020202020204" pitchFamily="34" charset="0"/>
-              <a:buChar char="•"/>
-              <a:defRPr sz="1800" kern="1200">
-                <a:solidFill>
-                  <a:schemeClr val="tx1"/>
-                </a:solidFill>
-                <a:latin typeface="+mn-lt"/>
-                <a:ea typeface="+mn-ea"/>
-                <a:cs typeface="+mn-cs"/>
-              </a:defRPr>
-            </a:lvl5pPr>
-            <a:lvl6pPr marL="2514600" indent="-228600" algn="l" defTabSz="914400" rtl="0" eaLnBrk="1" latinLnBrk="0" hangingPunct="1">
-              <a:lnSpc>
-                <a:spcPct val="90000"/>
-              </a:lnSpc>
-              <a:spcBef>
-                <a:spcPts val="500"/>
-              </a:spcBef>
-              <a:buFont typeface="Arial" panose="020B0604020202020204" pitchFamily="34" charset="0"/>
-              <a:buChar char="•"/>
-              <a:defRPr sz="1800" kern="1200">
-                <a:solidFill>
-                  <a:schemeClr val="tx1"/>
-                </a:solidFill>
-                <a:latin typeface="+mn-lt"/>
-                <a:ea typeface="+mn-ea"/>
-                <a:cs typeface="+mn-cs"/>
-              </a:defRPr>
-            </a:lvl6pPr>
-            <a:lvl7pPr marL="2971800" indent="-228600" algn="l" defTabSz="914400" rtl="0" eaLnBrk="1" latinLnBrk="0" hangingPunct="1">
-              <a:lnSpc>
-                <a:spcPct val="90000"/>
-              </a:lnSpc>
-              <a:spcBef>
-                <a:spcPts val="500"/>
-              </a:spcBef>
-              <a:buFont typeface="Arial" panose="020B0604020202020204" pitchFamily="34" charset="0"/>
-              <a:buChar char="•"/>
-              <a:defRPr sz="1800" kern="1200">
-                <a:solidFill>
-                  <a:schemeClr val="tx1"/>
-                </a:solidFill>
-                <a:latin typeface="+mn-lt"/>
-                <a:ea typeface="+mn-ea"/>
-                <a:cs typeface="+mn-cs"/>
-              </a:defRPr>
-            </a:lvl7pPr>
-            <a:lvl8pPr marL="3429000" indent="-228600" algn="l" defTabSz="914400" rtl="0" eaLnBrk="1" latinLnBrk="0" hangingPunct="1">
-              <a:lnSpc>
-                <a:spcPct val="90000"/>
-              </a:lnSpc>
-              <a:spcBef>
-                <a:spcPts val="500"/>
-              </a:spcBef>
-              <a:buFont typeface="Arial" panose="020B0604020202020204" pitchFamily="34" charset="0"/>
-              <a:buChar char="•"/>
-              <a:defRPr sz="1800" kern="1200">
-                <a:solidFill>
-                  <a:schemeClr val="tx1"/>
-                </a:solidFill>
-                <a:latin typeface="+mn-lt"/>
-                <a:ea typeface="+mn-ea"/>
-                <a:cs typeface="+mn-cs"/>
-              </a:defRPr>
-            </a:lvl8pPr>
-            <a:lvl9pPr marL="3886200" indent="-228600" algn="l" defTabSz="914400" rtl="0" eaLnBrk="1" latinLnBrk="0" hangingPunct="1">
-              <a:lnSpc>
-                <a:spcPct val="90000"/>
-              </a:lnSpc>
-              <a:spcBef>
-                <a:spcPts val="500"/>
-              </a:spcBef>
-              <a:buFont typeface="Arial" panose="020B0604020202020204" pitchFamily="34" charset="0"/>
-              <a:buChar char="•"/>
-              <a:defRPr sz="1800" kern="1200">
-                <a:solidFill>
-                  <a:schemeClr val="tx1"/>
-                </a:solidFill>
-                <a:latin typeface="+mn-lt"/>
-                <a:ea typeface="+mn-ea"/>
-                <a:cs typeface="+mn-cs"/>
-              </a:defRPr>
-            </a:lvl9pPr>
-          </a:lstStyle>
-          <a:p>
-            <a:pPr marL="0" indent="0">
-              <a:buNone/>
-            </a:pPr>
-            <a:r>
-              <a:rPr lang="fr-FR" sz="4000" b="1" dirty="0" smtClean="0"/>
-              <a:t>Les Documentations</a:t>
-            </a:r>
-            <a:endParaRPr lang="fr-FR" sz="4000" b="1" dirty="0"/>
-          </a:p>
-        </p:txBody>
-      </p:sp>
       <p:pic>
         <p:nvPicPr>
-          <p:cNvPr id="4" name="Image 3"/>
+          <p:cNvPr id="3" name="Image 2"/>
           <p:cNvPicPr>
             <a:picLocks noChangeAspect="1"/>
           </p:cNvPicPr>
@@ -12194,8 +12188,8 @@
         </p:blipFill>
         <p:spPr>
           <a:xfrm>
-            <a:off x="4436595" y="1377689"/>
-            <a:ext cx="7755405" cy="5614238"/>
+            <a:off x="3684495" y="1651914"/>
+            <a:ext cx="8507506" cy="5206086"/>
           </a:xfrm>
           <a:prstGeom prst="rect">
             <a:avLst/>
@@ -12204,6 +12198,500 @@
       </p:pic>
       <p:sp>
         <p:nvSpPr>
+          <p:cNvPr id="20" name="Google Shape;188;p31">
+            <a:extLst>
+              <a:ext uri="{FF2B5EF4-FFF2-40B4-BE49-F238E27FC236}">
+                <a16:creationId xmlns:a16="http://schemas.microsoft.com/office/drawing/2014/main" id="{1EE455DA-87D3-77FF-0CEF-E1F804EA9888}"/>
+              </a:ext>
+            </a:extLst>
+          </p:cNvPr>
+          <p:cNvSpPr txBox="1">
+            <a:spLocks/>
+          </p:cNvSpPr>
+          <p:nvPr/>
+        </p:nvSpPr>
+        <p:spPr>
+          <a:xfrm>
+            <a:off x="4248726" y="480813"/>
+            <a:ext cx="1160024" cy="896876"/>
+          </a:xfrm>
+          <a:prstGeom prst="rect">
+            <a:avLst/>
+          </a:prstGeom>
+          <a:solidFill>
+            <a:schemeClr val="accent4">
+              <a:lumMod val="20000"/>
+              <a:lumOff val="80000"/>
+            </a:schemeClr>
+          </a:solidFill>
+          <a:ln>
+            <a:noFill/>
+          </a:ln>
+        </p:spPr>
+        <p:txBody>
+          <a:bodyPr spcFirstLastPara="1" wrap="square" lIns="91425" tIns="91425" rIns="91425" bIns="91425" anchor="ctr" anchorCtr="0">
+            <a:noAutofit/>
+          </a:bodyPr>
+          <a:lstStyle>
+            <a:defPPr marR="0" lvl="0" algn="l" rtl="0">
+              <a:lnSpc>
+                <a:spcPct val="100000"/>
+              </a:lnSpc>
+              <a:spcBef>
+                <a:spcPts val="0"/>
+              </a:spcBef>
+              <a:spcAft>
+                <a:spcPts val="0"/>
+              </a:spcAft>
+            </a:defPPr>
+            <a:lvl1pPr marR="0" lvl="0" algn="ctr" rtl="0">
+              <a:lnSpc>
+                <a:spcPct val="100000"/>
+              </a:lnSpc>
+              <a:spcBef>
+                <a:spcPts val="0"/>
+              </a:spcBef>
+              <a:spcAft>
+                <a:spcPts val="0"/>
+              </a:spcAft>
+              <a:buClr>
+                <a:schemeClr val="dk1"/>
+              </a:buClr>
+              <a:buSzPts val="3000"/>
+              <a:buFont typeface="Doppio One"/>
+              <a:buNone/>
+              <a:defRPr sz="3000" b="1" i="0" u="none" strike="noStrike" cap="none">
+                <a:solidFill>
+                  <a:schemeClr val="accent2"/>
+                </a:solidFill>
+                <a:latin typeface="Doppio One"/>
+                <a:ea typeface="Doppio One"/>
+                <a:cs typeface="Doppio One"/>
+                <a:sym typeface="Doppio One"/>
+              </a:defRPr>
+            </a:lvl1pPr>
+            <a:lvl2pPr marR="0" lvl="1" algn="l" rtl="0">
+              <a:lnSpc>
+                <a:spcPct val="100000"/>
+              </a:lnSpc>
+              <a:spcBef>
+                <a:spcPts val="0"/>
+              </a:spcBef>
+              <a:spcAft>
+                <a:spcPts val="0"/>
+              </a:spcAft>
+              <a:buClr>
+                <a:schemeClr val="dk1"/>
+              </a:buClr>
+              <a:buSzPts val="3000"/>
+              <a:buFont typeface="Doppio One"/>
+              <a:buNone/>
+              <a:defRPr sz="3000" b="1" i="0" u="none" strike="noStrike" cap="none">
+                <a:solidFill>
+                  <a:schemeClr val="dk1"/>
+                </a:solidFill>
+                <a:latin typeface="Doppio One"/>
+                <a:ea typeface="Doppio One"/>
+                <a:cs typeface="Doppio One"/>
+                <a:sym typeface="Doppio One"/>
+              </a:defRPr>
+            </a:lvl2pPr>
+            <a:lvl3pPr marR="0" lvl="2" algn="l" rtl="0">
+              <a:lnSpc>
+                <a:spcPct val="100000"/>
+              </a:lnSpc>
+              <a:spcBef>
+                <a:spcPts val="0"/>
+              </a:spcBef>
+              <a:spcAft>
+                <a:spcPts val="0"/>
+              </a:spcAft>
+              <a:buClr>
+                <a:schemeClr val="dk1"/>
+              </a:buClr>
+              <a:buSzPts val="3000"/>
+              <a:buFont typeface="Doppio One"/>
+              <a:buNone/>
+              <a:defRPr sz="3000" b="1" i="0" u="none" strike="noStrike" cap="none">
+                <a:solidFill>
+                  <a:schemeClr val="dk1"/>
+                </a:solidFill>
+                <a:latin typeface="Doppio One"/>
+                <a:ea typeface="Doppio One"/>
+                <a:cs typeface="Doppio One"/>
+                <a:sym typeface="Doppio One"/>
+              </a:defRPr>
+            </a:lvl3pPr>
+            <a:lvl4pPr marR="0" lvl="3" algn="l" rtl="0">
+              <a:lnSpc>
+                <a:spcPct val="100000"/>
+              </a:lnSpc>
+              <a:spcBef>
+                <a:spcPts val="0"/>
+              </a:spcBef>
+              <a:spcAft>
+                <a:spcPts val="0"/>
+              </a:spcAft>
+              <a:buClr>
+                <a:schemeClr val="dk1"/>
+              </a:buClr>
+              <a:buSzPts val="3000"/>
+              <a:buFont typeface="Doppio One"/>
+              <a:buNone/>
+              <a:defRPr sz="3000" b="1" i="0" u="none" strike="noStrike" cap="none">
+                <a:solidFill>
+                  <a:schemeClr val="dk1"/>
+                </a:solidFill>
+                <a:latin typeface="Doppio One"/>
+                <a:ea typeface="Doppio One"/>
+                <a:cs typeface="Doppio One"/>
+                <a:sym typeface="Doppio One"/>
+              </a:defRPr>
+            </a:lvl4pPr>
+            <a:lvl5pPr marR="0" lvl="4" algn="l" rtl="0">
+              <a:lnSpc>
+                <a:spcPct val="100000"/>
+              </a:lnSpc>
+              <a:spcBef>
+                <a:spcPts val="0"/>
+              </a:spcBef>
+              <a:spcAft>
+                <a:spcPts val="0"/>
+              </a:spcAft>
+              <a:buClr>
+                <a:schemeClr val="dk1"/>
+              </a:buClr>
+              <a:buSzPts val="3000"/>
+              <a:buFont typeface="Doppio One"/>
+              <a:buNone/>
+              <a:defRPr sz="3000" b="1" i="0" u="none" strike="noStrike" cap="none">
+                <a:solidFill>
+                  <a:schemeClr val="dk1"/>
+                </a:solidFill>
+                <a:latin typeface="Doppio One"/>
+                <a:ea typeface="Doppio One"/>
+                <a:cs typeface="Doppio One"/>
+                <a:sym typeface="Doppio One"/>
+              </a:defRPr>
+            </a:lvl5pPr>
+            <a:lvl6pPr marR="0" lvl="5" algn="l" rtl="0">
+              <a:lnSpc>
+                <a:spcPct val="100000"/>
+              </a:lnSpc>
+              <a:spcBef>
+                <a:spcPts val="0"/>
+              </a:spcBef>
+              <a:spcAft>
+                <a:spcPts val="0"/>
+              </a:spcAft>
+              <a:buClr>
+                <a:schemeClr val="dk1"/>
+              </a:buClr>
+              <a:buSzPts val="3000"/>
+              <a:buFont typeface="Doppio One"/>
+              <a:buNone/>
+              <a:defRPr sz="3000" b="1" i="0" u="none" strike="noStrike" cap="none">
+                <a:solidFill>
+                  <a:schemeClr val="dk1"/>
+                </a:solidFill>
+                <a:latin typeface="Doppio One"/>
+                <a:ea typeface="Doppio One"/>
+                <a:cs typeface="Doppio One"/>
+                <a:sym typeface="Doppio One"/>
+              </a:defRPr>
+            </a:lvl6pPr>
+            <a:lvl7pPr marR="0" lvl="6" algn="l" rtl="0">
+              <a:lnSpc>
+                <a:spcPct val="100000"/>
+              </a:lnSpc>
+              <a:spcBef>
+                <a:spcPts val="0"/>
+              </a:spcBef>
+              <a:spcAft>
+                <a:spcPts val="0"/>
+              </a:spcAft>
+              <a:buClr>
+                <a:schemeClr val="dk1"/>
+              </a:buClr>
+              <a:buSzPts val="3000"/>
+              <a:buFont typeface="Doppio One"/>
+              <a:buNone/>
+              <a:defRPr sz="3000" b="1" i="0" u="none" strike="noStrike" cap="none">
+                <a:solidFill>
+                  <a:schemeClr val="dk1"/>
+                </a:solidFill>
+                <a:latin typeface="Doppio One"/>
+                <a:ea typeface="Doppio One"/>
+                <a:cs typeface="Doppio One"/>
+                <a:sym typeface="Doppio One"/>
+              </a:defRPr>
+            </a:lvl7pPr>
+            <a:lvl8pPr marR="0" lvl="7" algn="l" rtl="0">
+              <a:lnSpc>
+                <a:spcPct val="100000"/>
+              </a:lnSpc>
+              <a:spcBef>
+                <a:spcPts val="0"/>
+              </a:spcBef>
+              <a:spcAft>
+                <a:spcPts val="0"/>
+              </a:spcAft>
+              <a:buClr>
+                <a:schemeClr val="dk1"/>
+              </a:buClr>
+              <a:buSzPts val="3000"/>
+              <a:buFont typeface="Doppio One"/>
+              <a:buNone/>
+              <a:defRPr sz="3000" b="1" i="0" u="none" strike="noStrike" cap="none">
+                <a:solidFill>
+                  <a:schemeClr val="dk1"/>
+                </a:solidFill>
+                <a:latin typeface="Doppio One"/>
+                <a:ea typeface="Doppio One"/>
+                <a:cs typeface="Doppio One"/>
+                <a:sym typeface="Doppio One"/>
+              </a:defRPr>
+            </a:lvl8pPr>
+            <a:lvl9pPr marR="0" lvl="8" algn="l" rtl="0">
+              <a:lnSpc>
+                <a:spcPct val="100000"/>
+              </a:lnSpc>
+              <a:spcBef>
+                <a:spcPts val="0"/>
+              </a:spcBef>
+              <a:spcAft>
+                <a:spcPts val="0"/>
+              </a:spcAft>
+              <a:buClr>
+                <a:schemeClr val="dk1"/>
+              </a:buClr>
+              <a:buSzPts val="3000"/>
+              <a:buFont typeface="Doppio One"/>
+              <a:buNone/>
+              <a:defRPr sz="3000" b="1" i="0" u="none" strike="noStrike" cap="none">
+                <a:solidFill>
+                  <a:schemeClr val="dk1"/>
+                </a:solidFill>
+                <a:latin typeface="Doppio One"/>
+                <a:ea typeface="Doppio One"/>
+                <a:cs typeface="Doppio One"/>
+                <a:sym typeface="Doppio One"/>
+              </a:defRPr>
+            </a:lvl9pPr>
+          </a:lstStyle>
+          <a:p>
+            <a:r>
+              <a:rPr lang="en" sz="4000" dirty="0" smtClean="0">
+                <a:solidFill>
+                  <a:schemeClr val="accent1">
+                    <a:lumMod val="50000"/>
+                  </a:schemeClr>
+                </a:solidFill>
+              </a:rPr>
+              <a:t>02</a:t>
+            </a:r>
+          </a:p>
+        </p:txBody>
+      </p:sp>
+      <p:sp>
+        <p:nvSpPr>
+          <p:cNvPr id="21" name="Google Shape;194;p31"/>
+          <p:cNvSpPr txBox="1">
+            <a:spLocks/>
+          </p:cNvSpPr>
+          <p:nvPr/>
+        </p:nvSpPr>
+        <p:spPr>
+          <a:xfrm>
+            <a:off x="5408750" y="182363"/>
+            <a:ext cx="3744486" cy="596900"/>
+          </a:xfrm>
+          <a:prstGeom prst="rect">
+            <a:avLst/>
+          </a:prstGeom>
+        </p:spPr>
+        <p:txBody>
+          <a:bodyPr spcFirstLastPara="1" wrap="square" lIns="91425" tIns="91425" rIns="91425" bIns="91425" anchor="t" anchorCtr="0">
+            <a:noAutofit/>
+          </a:bodyPr>
+          <a:lstStyle>
+            <a:lvl1pPr marL="228600" indent="-228600" algn="l" defTabSz="914400" rtl="0" eaLnBrk="1" latinLnBrk="0" hangingPunct="1">
+              <a:lnSpc>
+                <a:spcPct val="90000"/>
+              </a:lnSpc>
+              <a:spcBef>
+                <a:spcPts val="1000"/>
+              </a:spcBef>
+              <a:buFont typeface="Arial" panose="020B0604020202020204" pitchFamily="34" charset="0"/>
+              <a:buChar char="•"/>
+              <a:defRPr sz="2800" kern="1200">
+                <a:solidFill>
+                  <a:schemeClr val="tx1"/>
+                </a:solidFill>
+                <a:latin typeface="+mn-lt"/>
+                <a:ea typeface="+mn-ea"/>
+                <a:cs typeface="+mn-cs"/>
+              </a:defRPr>
+            </a:lvl1pPr>
+            <a:lvl2pPr marL="685800" indent="-228600" algn="l" defTabSz="914400" rtl="0" eaLnBrk="1" latinLnBrk="0" hangingPunct="1">
+              <a:lnSpc>
+                <a:spcPct val="90000"/>
+              </a:lnSpc>
+              <a:spcBef>
+                <a:spcPts val="500"/>
+              </a:spcBef>
+              <a:buFont typeface="Arial" panose="020B0604020202020204" pitchFamily="34" charset="0"/>
+              <a:buChar char="•"/>
+              <a:defRPr sz="2400" kern="1200">
+                <a:solidFill>
+                  <a:schemeClr val="tx1"/>
+                </a:solidFill>
+                <a:latin typeface="+mn-lt"/>
+                <a:ea typeface="+mn-ea"/>
+                <a:cs typeface="+mn-cs"/>
+              </a:defRPr>
+            </a:lvl2pPr>
+            <a:lvl3pPr marL="1143000" indent="-228600" algn="l" defTabSz="914400" rtl="0" eaLnBrk="1" latinLnBrk="0" hangingPunct="1">
+              <a:lnSpc>
+                <a:spcPct val="90000"/>
+              </a:lnSpc>
+              <a:spcBef>
+                <a:spcPts val="500"/>
+              </a:spcBef>
+              <a:buFont typeface="Arial" panose="020B0604020202020204" pitchFamily="34" charset="0"/>
+              <a:buChar char="•"/>
+              <a:defRPr sz="2000" kern="1200">
+                <a:solidFill>
+                  <a:schemeClr val="tx1"/>
+                </a:solidFill>
+                <a:latin typeface="+mn-lt"/>
+                <a:ea typeface="+mn-ea"/>
+                <a:cs typeface="+mn-cs"/>
+              </a:defRPr>
+            </a:lvl3pPr>
+            <a:lvl4pPr marL="1600200" indent="-228600" algn="l" defTabSz="914400" rtl="0" eaLnBrk="1" latinLnBrk="0" hangingPunct="1">
+              <a:lnSpc>
+                <a:spcPct val="90000"/>
+              </a:lnSpc>
+              <a:spcBef>
+                <a:spcPts val="500"/>
+              </a:spcBef>
+              <a:buFont typeface="Arial" panose="020B0604020202020204" pitchFamily="34" charset="0"/>
+              <a:buChar char="•"/>
+              <a:defRPr sz="1800" kern="1200">
+                <a:solidFill>
+                  <a:schemeClr val="tx1"/>
+                </a:solidFill>
+                <a:latin typeface="+mn-lt"/>
+                <a:ea typeface="+mn-ea"/>
+                <a:cs typeface="+mn-cs"/>
+              </a:defRPr>
+            </a:lvl4pPr>
+            <a:lvl5pPr marL="2057400" indent="-228600" algn="l" defTabSz="914400" rtl="0" eaLnBrk="1" latinLnBrk="0" hangingPunct="1">
+              <a:lnSpc>
+                <a:spcPct val="90000"/>
+              </a:lnSpc>
+              <a:spcBef>
+                <a:spcPts val="500"/>
+              </a:spcBef>
+              <a:buFont typeface="Arial" panose="020B0604020202020204" pitchFamily="34" charset="0"/>
+              <a:buChar char="•"/>
+              <a:defRPr sz="1800" kern="1200">
+                <a:solidFill>
+                  <a:schemeClr val="tx1"/>
+                </a:solidFill>
+                <a:latin typeface="+mn-lt"/>
+                <a:ea typeface="+mn-ea"/>
+                <a:cs typeface="+mn-cs"/>
+              </a:defRPr>
+            </a:lvl5pPr>
+            <a:lvl6pPr marL="2514600" indent="-228600" algn="l" defTabSz="914400" rtl="0" eaLnBrk="1" latinLnBrk="0" hangingPunct="1">
+              <a:lnSpc>
+                <a:spcPct val="90000"/>
+              </a:lnSpc>
+              <a:spcBef>
+                <a:spcPts val="500"/>
+              </a:spcBef>
+              <a:buFont typeface="Arial" panose="020B0604020202020204" pitchFamily="34" charset="0"/>
+              <a:buChar char="•"/>
+              <a:defRPr sz="1800" kern="1200">
+                <a:solidFill>
+                  <a:schemeClr val="tx1"/>
+                </a:solidFill>
+                <a:latin typeface="+mn-lt"/>
+                <a:ea typeface="+mn-ea"/>
+                <a:cs typeface="+mn-cs"/>
+              </a:defRPr>
+            </a:lvl6pPr>
+            <a:lvl7pPr marL="2971800" indent="-228600" algn="l" defTabSz="914400" rtl="0" eaLnBrk="1" latinLnBrk="0" hangingPunct="1">
+              <a:lnSpc>
+                <a:spcPct val="90000"/>
+              </a:lnSpc>
+              <a:spcBef>
+                <a:spcPts val="500"/>
+              </a:spcBef>
+              <a:buFont typeface="Arial" panose="020B0604020202020204" pitchFamily="34" charset="0"/>
+              <a:buChar char="•"/>
+              <a:defRPr sz="1800" kern="1200">
+                <a:solidFill>
+                  <a:schemeClr val="tx1"/>
+                </a:solidFill>
+                <a:latin typeface="+mn-lt"/>
+                <a:ea typeface="+mn-ea"/>
+                <a:cs typeface="+mn-cs"/>
+              </a:defRPr>
+            </a:lvl7pPr>
+            <a:lvl8pPr marL="3429000" indent="-228600" algn="l" defTabSz="914400" rtl="0" eaLnBrk="1" latinLnBrk="0" hangingPunct="1">
+              <a:lnSpc>
+                <a:spcPct val="90000"/>
+              </a:lnSpc>
+              <a:spcBef>
+                <a:spcPts val="500"/>
+              </a:spcBef>
+              <a:buFont typeface="Arial" panose="020B0604020202020204" pitchFamily="34" charset="0"/>
+              <a:buChar char="•"/>
+              <a:defRPr sz="1800" kern="1200">
+                <a:solidFill>
+                  <a:schemeClr val="tx1"/>
+                </a:solidFill>
+                <a:latin typeface="+mn-lt"/>
+                <a:ea typeface="+mn-ea"/>
+                <a:cs typeface="+mn-cs"/>
+              </a:defRPr>
+            </a:lvl8pPr>
+            <a:lvl9pPr marL="3886200" indent="-228600" algn="l" defTabSz="914400" rtl="0" eaLnBrk="1" latinLnBrk="0" hangingPunct="1">
+              <a:lnSpc>
+                <a:spcPct val="90000"/>
+              </a:lnSpc>
+              <a:spcBef>
+                <a:spcPts val="500"/>
+              </a:spcBef>
+              <a:buFont typeface="Arial" panose="020B0604020202020204" pitchFamily="34" charset="0"/>
+              <a:buChar char="•"/>
+              <a:defRPr sz="1800" kern="1200">
+                <a:solidFill>
+                  <a:schemeClr val="tx1"/>
+                </a:solidFill>
+                <a:latin typeface="+mn-lt"/>
+                <a:ea typeface="+mn-ea"/>
+                <a:cs typeface="+mn-cs"/>
+              </a:defRPr>
+            </a:lvl9pPr>
+          </a:lstStyle>
+          <a:p>
+            <a:pPr marL="0" indent="0">
+              <a:buNone/>
+            </a:pPr>
+            <a:r>
+              <a:rPr lang="fr-FR" sz="4000" b="1" dirty="0" smtClean="0"/>
+              <a:t>Les Documentations</a:t>
+            </a:r>
+            <a:endParaRPr lang="fr-FR" sz="4000" b="1" dirty="0"/>
+          </a:p>
+        </p:txBody>
+      </p:sp>
+      <p:sp>
+        <p:nvSpPr>
           <p:cNvPr id="27" name="Google Shape;222;p34"/>
           <p:cNvSpPr txBox="1">
             <a:spLocks noGrp="1"/>
@@ -12214,7 +12702,7 @@
         </p:nvSpPr>
         <p:spPr>
           <a:xfrm>
-            <a:off x="691486" y="2605829"/>
+            <a:off x="98170" y="2623160"/>
             <a:ext cx="3935931" cy="1642185"/>
           </a:xfrm>
           <a:prstGeom prst="rect">
@@ -12381,6 +12869,29 @@
           </a:effectLst>
         </p:spPr>
       </p:pic>
+      <p:sp>
+        <p:nvSpPr>
+          <p:cNvPr id="5" name="Espace réservé du numéro de diapositive 4"/>
+          <p:cNvSpPr>
+            <a:spLocks noGrp="1"/>
+          </p:cNvSpPr>
+          <p:nvPr>
+            <p:ph type="sldNum" sz="quarter" idx="12"/>
+          </p:nvPr>
+        </p:nvSpPr>
+        <p:spPr/>
+        <p:txBody>
+          <a:bodyPr/>
+          <a:lstStyle/>
+          <a:p>
+            <a:fld id="{5B7114E8-7C5A-4E0D-8412-C2486C50547C}" type="slidenum">
+              <a:rPr lang="fr-FR" smtClean="0"/>
+              <a:t>5</a:t>
+            </a:fld>
+            <a:endParaRPr lang="fr-FR" dirty="0"/>
+          </a:p>
+        </p:txBody>
+      </p:sp>
     </p:spTree>
     <p:extLst>
       <p:ext uri="{BB962C8B-B14F-4D97-AF65-F5344CB8AC3E}">
@@ -12457,6 +12968,29 @@
               <a:t>GANTT prévi</a:t>
             </a:r>
             <a:endParaRPr sz="5400" b="1" dirty="0"/>
+          </a:p>
+        </p:txBody>
+      </p:sp>
+      <p:sp>
+        <p:nvSpPr>
+          <p:cNvPr id="3" name="Espace réservé du numéro de diapositive 2"/>
+          <p:cNvSpPr>
+            <a:spLocks noGrp="1"/>
+          </p:cNvSpPr>
+          <p:nvPr>
+            <p:ph type="sldNum" sz="quarter" idx="12"/>
+          </p:nvPr>
+        </p:nvSpPr>
+        <p:spPr/>
+        <p:txBody>
+          <a:bodyPr/>
+          <a:lstStyle/>
+          <a:p>
+            <a:fld id="{5B7114E8-7C5A-4E0D-8412-C2486C50547C}" type="slidenum">
+              <a:rPr lang="fr-FR" smtClean="0"/>
+              <a:t>6</a:t>
+            </a:fld>
+            <a:endParaRPr lang="fr-FR"/>
           </a:p>
         </p:txBody>
       </p:sp>
@@ -12619,6 +13153,29 @@
           </a:effectLst>
         </p:spPr>
       </p:pic>
+      <p:sp>
+        <p:nvSpPr>
+          <p:cNvPr id="3" name="Espace réservé du numéro de diapositive 2"/>
+          <p:cNvSpPr>
+            <a:spLocks noGrp="1"/>
+          </p:cNvSpPr>
+          <p:nvPr>
+            <p:ph type="sldNum" sz="quarter" idx="12"/>
+          </p:nvPr>
+        </p:nvSpPr>
+        <p:spPr/>
+        <p:txBody>
+          <a:bodyPr/>
+          <a:lstStyle/>
+          <a:p>
+            <a:fld id="{5B7114E8-7C5A-4E0D-8412-C2486C50547C}" type="slidenum">
+              <a:rPr lang="fr-FR" smtClean="0"/>
+              <a:t>7</a:t>
+            </a:fld>
+            <a:endParaRPr lang="fr-FR"/>
+          </a:p>
+        </p:txBody>
+      </p:sp>
     </p:spTree>
     <p:extLst>
       <p:ext uri="{BB962C8B-B14F-4D97-AF65-F5344CB8AC3E}">
@@ -12936,6 +13493,29 @@
           </a:fontRef>
         </p:style>
       </p:cxnSp>
+      <p:sp>
+        <p:nvSpPr>
+          <p:cNvPr id="6" name="Espace réservé du numéro de diapositive 5"/>
+          <p:cNvSpPr>
+            <a:spLocks noGrp="1"/>
+          </p:cNvSpPr>
+          <p:nvPr>
+            <p:ph type="sldNum" sz="quarter" idx="12"/>
+          </p:nvPr>
+        </p:nvSpPr>
+        <p:spPr/>
+        <p:txBody>
+          <a:bodyPr/>
+          <a:lstStyle/>
+          <a:p>
+            <a:fld id="{5B7114E8-7C5A-4E0D-8412-C2486C50547C}" type="slidenum">
+              <a:rPr lang="fr-FR" smtClean="0"/>
+              <a:t>8</a:t>
+            </a:fld>
+            <a:endParaRPr lang="fr-FR"/>
+          </a:p>
+        </p:txBody>
+      </p:sp>
     </p:spTree>
     <p:extLst>
       <p:ext uri="{BB962C8B-B14F-4D97-AF65-F5344CB8AC3E}">
@@ -13139,6 +13719,29 @@
             <a:endParaRPr sz="2000" dirty="0">
               <a:latin typeface="+mj-lt"/>
             </a:endParaRPr>
+          </a:p>
+        </p:txBody>
+      </p:sp>
+      <p:sp>
+        <p:nvSpPr>
+          <p:cNvPr id="3" name="Espace réservé du numéro de diapositive 2"/>
+          <p:cNvSpPr>
+            <a:spLocks noGrp="1"/>
+          </p:cNvSpPr>
+          <p:nvPr>
+            <p:ph type="sldNum" sz="quarter" idx="12"/>
+          </p:nvPr>
+        </p:nvSpPr>
+        <p:spPr/>
+        <p:txBody>
+          <a:bodyPr/>
+          <a:lstStyle/>
+          <a:p>
+            <a:fld id="{5B7114E8-7C5A-4E0D-8412-C2486C50547C}" type="slidenum">
+              <a:rPr lang="fr-FR" smtClean="0"/>
+              <a:t>9</a:t>
+            </a:fld>
+            <a:endParaRPr lang="fr-FR"/>
           </a:p>
         </p:txBody>
       </p:sp>

</xml_diff>

<commit_message>
gantt fini + maj diapo projet
</commit_message>
<xml_diff>
--- a/documentation/Diapo projetDMX.pptx
+++ b/documentation/Diapo projetDMX.pptx
@@ -13,7 +13,7 @@
     <p:sldId id="260" r:id="rId4"/>
     <p:sldId id="262" r:id="rId5"/>
     <p:sldId id="261" r:id="rId6"/>
-    <p:sldId id="279" r:id="rId7"/>
+    <p:sldId id="285" r:id="rId7"/>
     <p:sldId id="263" r:id="rId8"/>
     <p:sldId id="264" r:id="rId9"/>
     <p:sldId id="265" r:id="rId10"/>
@@ -221,7 +221,7 @@
           <a:p>
             <a:fld id="{C43CA5D6-B217-4820-9038-2C8B0AF91CFA}" type="datetimeFigureOut">
               <a:rPr lang="fr-FR" smtClean="0"/>
-              <a:t>07/06/2024</a:t>
+              <a:t>08/06/2024</a:t>
             </a:fld>
             <a:endParaRPr lang="fr-FR"/>
           </a:p>
@@ -285,38 +285,37 @@
           <a:p>
             <a:pPr lvl="0"/>
             <a:r>
-              <a:rPr lang="fr-FR" smtClean="0"/>
+              <a:rPr lang="fr-FR"/>
               <a:t>Modifier les styles du texte du masque</a:t>
             </a:r>
           </a:p>
           <a:p>
             <a:pPr lvl="1"/>
             <a:r>
-              <a:rPr lang="fr-FR" smtClean="0"/>
+              <a:rPr lang="fr-FR"/>
               <a:t>Deuxième niveau</a:t>
             </a:r>
           </a:p>
           <a:p>
             <a:pPr lvl="2"/>
             <a:r>
-              <a:rPr lang="fr-FR" smtClean="0"/>
+              <a:rPr lang="fr-FR"/>
               <a:t>Troisième niveau</a:t>
             </a:r>
           </a:p>
           <a:p>
             <a:pPr lvl="3"/>
             <a:r>
-              <a:rPr lang="fr-FR" smtClean="0"/>
+              <a:rPr lang="fr-FR"/>
               <a:t>Quatrième niveau</a:t>
             </a:r>
           </a:p>
           <a:p>
             <a:pPr lvl="4"/>
             <a:r>
-              <a:rPr lang="fr-FR" smtClean="0"/>
+              <a:rPr lang="fr-FR"/>
               <a:t>Cinquième niveau</a:t>
             </a:r>
-            <a:endParaRPr lang="fr-FR"/>
           </a:p>
         </p:txBody>
       </p:sp>
@@ -615,10 +614,9 @@
           </a:lstStyle>
           <a:p>
             <a:r>
-              <a:rPr lang="fr-FR" smtClean="0"/>
+              <a:rPr lang="fr-FR"/>
               <a:t>Modifiez le style du titre</a:t>
             </a:r>
-            <a:endParaRPr lang="fr-FR"/>
           </a:p>
         </p:txBody>
       </p:sp>
@@ -680,10 +678,9 @@
           </a:lstStyle>
           <a:p>
             <a:r>
-              <a:rPr lang="fr-FR" smtClean="0"/>
+              <a:rPr lang="fr-FR"/>
               <a:t>Modifier le style des sous-titres du masque</a:t>
             </a:r>
-            <a:endParaRPr lang="fr-FR"/>
           </a:p>
         </p:txBody>
       </p:sp>
@@ -704,7 +701,7 @@
           <a:p>
             <a:fld id="{79479AB7-61CF-48E3-A7BE-95954D99C11C}" type="datetime1">
               <a:rPr lang="fr-FR" smtClean="0"/>
-              <a:t>07/06/2024</a:t>
+              <a:t>08/06/2024</a:t>
             </a:fld>
             <a:endParaRPr lang="fr-FR"/>
           </a:p>
@@ -798,10 +795,9 @@
           <a:lstStyle/>
           <a:p>
             <a:r>
-              <a:rPr lang="fr-FR" smtClean="0"/>
+              <a:rPr lang="fr-FR"/>
               <a:t>Modifiez le style du titre</a:t>
             </a:r>
-            <a:endParaRPr lang="fr-FR"/>
           </a:p>
         </p:txBody>
       </p:sp>
@@ -822,38 +818,37 @@
           <a:p>
             <a:pPr lvl="0"/>
             <a:r>
-              <a:rPr lang="fr-FR" smtClean="0"/>
+              <a:rPr lang="fr-FR"/>
               <a:t>Modifier les styles du texte du masque</a:t>
             </a:r>
           </a:p>
           <a:p>
             <a:pPr lvl="1"/>
             <a:r>
-              <a:rPr lang="fr-FR" smtClean="0"/>
+              <a:rPr lang="fr-FR"/>
               <a:t>Deuxième niveau</a:t>
             </a:r>
           </a:p>
           <a:p>
             <a:pPr lvl="2"/>
             <a:r>
-              <a:rPr lang="fr-FR" smtClean="0"/>
+              <a:rPr lang="fr-FR"/>
               <a:t>Troisième niveau</a:t>
             </a:r>
           </a:p>
           <a:p>
             <a:pPr lvl="3"/>
             <a:r>
-              <a:rPr lang="fr-FR" smtClean="0"/>
+              <a:rPr lang="fr-FR"/>
               <a:t>Quatrième niveau</a:t>
             </a:r>
           </a:p>
           <a:p>
             <a:pPr lvl="4"/>
             <a:r>
-              <a:rPr lang="fr-FR" smtClean="0"/>
+              <a:rPr lang="fr-FR"/>
               <a:t>Cinquième niveau</a:t>
             </a:r>
-            <a:endParaRPr lang="fr-FR"/>
           </a:p>
         </p:txBody>
       </p:sp>
@@ -874,7 +869,7 @@
           <a:p>
             <a:fld id="{AB26CA7E-BB25-4159-813F-EEC0E137ACFE}" type="datetime1">
               <a:rPr lang="fr-FR" smtClean="0"/>
-              <a:t>07/06/2024</a:t>
+              <a:t>08/06/2024</a:t>
             </a:fld>
             <a:endParaRPr lang="fr-FR"/>
           </a:p>
@@ -973,10 +968,9 @@
           <a:lstStyle/>
           <a:p>
             <a:r>
-              <a:rPr lang="fr-FR" smtClean="0"/>
+              <a:rPr lang="fr-FR"/>
               <a:t>Modifiez le style du titre</a:t>
             </a:r>
-            <a:endParaRPr lang="fr-FR"/>
           </a:p>
         </p:txBody>
       </p:sp>
@@ -1002,38 +996,37 @@
           <a:p>
             <a:pPr lvl="0"/>
             <a:r>
-              <a:rPr lang="fr-FR" smtClean="0"/>
+              <a:rPr lang="fr-FR"/>
               <a:t>Modifier les styles du texte du masque</a:t>
             </a:r>
           </a:p>
           <a:p>
             <a:pPr lvl="1"/>
             <a:r>
-              <a:rPr lang="fr-FR" smtClean="0"/>
+              <a:rPr lang="fr-FR"/>
               <a:t>Deuxième niveau</a:t>
             </a:r>
           </a:p>
           <a:p>
             <a:pPr lvl="2"/>
             <a:r>
-              <a:rPr lang="fr-FR" smtClean="0"/>
+              <a:rPr lang="fr-FR"/>
               <a:t>Troisième niveau</a:t>
             </a:r>
           </a:p>
           <a:p>
             <a:pPr lvl="3"/>
             <a:r>
-              <a:rPr lang="fr-FR" smtClean="0"/>
+              <a:rPr lang="fr-FR"/>
               <a:t>Quatrième niveau</a:t>
             </a:r>
           </a:p>
           <a:p>
             <a:pPr lvl="4"/>
             <a:r>
-              <a:rPr lang="fr-FR" smtClean="0"/>
+              <a:rPr lang="fr-FR"/>
               <a:t>Cinquième niveau</a:t>
             </a:r>
-            <a:endParaRPr lang="fr-FR"/>
           </a:p>
         </p:txBody>
       </p:sp>
@@ -1054,7 +1047,7 @@
           <a:p>
             <a:fld id="{7B41B395-FD2A-429F-896D-A074F385A12E}" type="datetime1">
               <a:rPr lang="fr-FR" smtClean="0"/>
-              <a:t>07/06/2024</a:t>
+              <a:t>08/06/2024</a:t>
             </a:fld>
             <a:endParaRPr lang="fr-FR"/>
           </a:p>
@@ -1148,10 +1141,9 @@
           <a:lstStyle/>
           <a:p>
             <a:r>
-              <a:rPr lang="fr-FR" smtClean="0"/>
+              <a:rPr lang="fr-FR"/>
               <a:t>Modifiez le style du titre</a:t>
             </a:r>
-            <a:endParaRPr lang="fr-FR"/>
           </a:p>
         </p:txBody>
       </p:sp>
@@ -1172,38 +1164,37 @@
           <a:p>
             <a:pPr lvl="0"/>
             <a:r>
-              <a:rPr lang="fr-FR" smtClean="0"/>
+              <a:rPr lang="fr-FR"/>
               <a:t>Modifier les styles du texte du masque</a:t>
             </a:r>
           </a:p>
           <a:p>
             <a:pPr lvl="1"/>
             <a:r>
-              <a:rPr lang="fr-FR" smtClean="0"/>
+              <a:rPr lang="fr-FR"/>
               <a:t>Deuxième niveau</a:t>
             </a:r>
           </a:p>
           <a:p>
             <a:pPr lvl="2"/>
             <a:r>
-              <a:rPr lang="fr-FR" smtClean="0"/>
+              <a:rPr lang="fr-FR"/>
               <a:t>Troisième niveau</a:t>
             </a:r>
           </a:p>
           <a:p>
             <a:pPr lvl="3"/>
             <a:r>
-              <a:rPr lang="fr-FR" smtClean="0"/>
+              <a:rPr lang="fr-FR"/>
               <a:t>Quatrième niveau</a:t>
             </a:r>
           </a:p>
           <a:p>
             <a:pPr lvl="4"/>
             <a:r>
-              <a:rPr lang="fr-FR" smtClean="0"/>
+              <a:rPr lang="fr-FR"/>
               <a:t>Cinquième niveau</a:t>
             </a:r>
-            <a:endParaRPr lang="fr-FR"/>
           </a:p>
         </p:txBody>
       </p:sp>
@@ -1224,7 +1215,7 @@
           <a:p>
             <a:fld id="{79DA0F35-CE08-4A46-96BF-A5BB3C8DEC9F}" type="datetime1">
               <a:rPr lang="fr-FR" smtClean="0"/>
-              <a:t>07/06/2024</a:t>
+              <a:t>08/06/2024</a:t>
             </a:fld>
             <a:endParaRPr lang="fr-FR"/>
           </a:p>
@@ -1327,10 +1318,9 @@
           </a:lstStyle>
           <a:p>
             <a:r>
-              <a:rPr lang="fr-FR" smtClean="0"/>
+              <a:rPr lang="fr-FR"/>
               <a:t>Modifiez le style du titre</a:t>
             </a:r>
-            <a:endParaRPr lang="fr-FR"/>
           </a:p>
         </p:txBody>
       </p:sp>
@@ -1447,7 +1437,7 @@
           <a:p>
             <a:pPr lvl="0"/>
             <a:r>
-              <a:rPr lang="fr-FR" smtClean="0"/>
+              <a:rPr lang="fr-FR"/>
               <a:t>Modifier les styles du texte du masque</a:t>
             </a:r>
           </a:p>
@@ -1470,7 +1460,7 @@
           <a:p>
             <a:fld id="{B1EF5238-A34E-45A8-9EDF-AA3D8312B876}" type="datetime1">
               <a:rPr lang="fr-FR" smtClean="0"/>
-              <a:t>07/06/2024</a:t>
+              <a:t>08/06/2024</a:t>
             </a:fld>
             <a:endParaRPr lang="fr-FR"/>
           </a:p>
@@ -1564,10 +1554,9 @@
           <a:lstStyle/>
           <a:p>
             <a:r>
-              <a:rPr lang="fr-FR" smtClean="0"/>
+              <a:rPr lang="fr-FR"/>
               <a:t>Modifiez le style du titre</a:t>
             </a:r>
-            <a:endParaRPr lang="fr-FR"/>
           </a:p>
         </p:txBody>
       </p:sp>
@@ -1593,38 +1582,37 @@
           <a:p>
             <a:pPr lvl="0"/>
             <a:r>
-              <a:rPr lang="fr-FR" smtClean="0"/>
+              <a:rPr lang="fr-FR"/>
               <a:t>Modifier les styles du texte du masque</a:t>
             </a:r>
           </a:p>
           <a:p>
             <a:pPr lvl="1"/>
             <a:r>
-              <a:rPr lang="fr-FR" smtClean="0"/>
+              <a:rPr lang="fr-FR"/>
               <a:t>Deuxième niveau</a:t>
             </a:r>
           </a:p>
           <a:p>
             <a:pPr lvl="2"/>
             <a:r>
-              <a:rPr lang="fr-FR" smtClean="0"/>
+              <a:rPr lang="fr-FR"/>
               <a:t>Troisième niveau</a:t>
             </a:r>
           </a:p>
           <a:p>
             <a:pPr lvl="3"/>
             <a:r>
-              <a:rPr lang="fr-FR" smtClean="0"/>
+              <a:rPr lang="fr-FR"/>
               <a:t>Quatrième niveau</a:t>
             </a:r>
           </a:p>
           <a:p>
             <a:pPr lvl="4"/>
             <a:r>
-              <a:rPr lang="fr-FR" smtClean="0"/>
+              <a:rPr lang="fr-FR"/>
               <a:t>Cinquième niveau</a:t>
             </a:r>
-            <a:endParaRPr lang="fr-FR"/>
           </a:p>
         </p:txBody>
       </p:sp>
@@ -1650,38 +1638,37 @@
           <a:p>
             <a:pPr lvl="0"/>
             <a:r>
-              <a:rPr lang="fr-FR" smtClean="0"/>
+              <a:rPr lang="fr-FR"/>
               <a:t>Modifier les styles du texte du masque</a:t>
             </a:r>
           </a:p>
           <a:p>
             <a:pPr lvl="1"/>
             <a:r>
-              <a:rPr lang="fr-FR" smtClean="0"/>
+              <a:rPr lang="fr-FR"/>
               <a:t>Deuxième niveau</a:t>
             </a:r>
           </a:p>
           <a:p>
             <a:pPr lvl="2"/>
             <a:r>
-              <a:rPr lang="fr-FR" smtClean="0"/>
+              <a:rPr lang="fr-FR"/>
               <a:t>Troisième niveau</a:t>
             </a:r>
           </a:p>
           <a:p>
             <a:pPr lvl="3"/>
             <a:r>
-              <a:rPr lang="fr-FR" smtClean="0"/>
+              <a:rPr lang="fr-FR"/>
               <a:t>Quatrième niveau</a:t>
             </a:r>
           </a:p>
           <a:p>
             <a:pPr lvl="4"/>
             <a:r>
-              <a:rPr lang="fr-FR" smtClean="0"/>
+              <a:rPr lang="fr-FR"/>
               <a:t>Cinquième niveau</a:t>
             </a:r>
-            <a:endParaRPr lang="fr-FR"/>
           </a:p>
         </p:txBody>
       </p:sp>
@@ -1702,7 +1689,7 @@
           <a:p>
             <a:fld id="{FB1B2711-3353-4B96-9400-99918A178215}" type="datetime1">
               <a:rPr lang="fr-FR" smtClean="0"/>
-              <a:t>07/06/2024</a:t>
+              <a:t>08/06/2024</a:t>
             </a:fld>
             <a:endParaRPr lang="fr-FR"/>
           </a:p>
@@ -1801,10 +1788,9 @@
           <a:lstStyle/>
           <a:p>
             <a:r>
-              <a:rPr lang="fr-FR" smtClean="0"/>
+              <a:rPr lang="fr-FR"/>
               <a:t>Modifiez le style du titre</a:t>
             </a:r>
-            <a:endParaRPr lang="fr-FR"/>
           </a:p>
         </p:txBody>
       </p:sp>
@@ -1867,7 +1853,7 @@
           <a:p>
             <a:pPr lvl="0"/>
             <a:r>
-              <a:rPr lang="fr-FR" smtClean="0"/>
+              <a:rPr lang="fr-FR"/>
               <a:t>Modifier les styles du texte du masque</a:t>
             </a:r>
           </a:p>
@@ -1895,38 +1881,37 @@
           <a:p>
             <a:pPr lvl="0"/>
             <a:r>
-              <a:rPr lang="fr-FR" smtClean="0"/>
+              <a:rPr lang="fr-FR"/>
               <a:t>Modifier les styles du texte du masque</a:t>
             </a:r>
           </a:p>
           <a:p>
             <a:pPr lvl="1"/>
             <a:r>
-              <a:rPr lang="fr-FR" smtClean="0"/>
+              <a:rPr lang="fr-FR"/>
               <a:t>Deuxième niveau</a:t>
             </a:r>
           </a:p>
           <a:p>
             <a:pPr lvl="2"/>
             <a:r>
-              <a:rPr lang="fr-FR" smtClean="0"/>
+              <a:rPr lang="fr-FR"/>
               <a:t>Troisième niveau</a:t>
             </a:r>
           </a:p>
           <a:p>
             <a:pPr lvl="3"/>
             <a:r>
-              <a:rPr lang="fr-FR" smtClean="0"/>
+              <a:rPr lang="fr-FR"/>
               <a:t>Quatrième niveau</a:t>
             </a:r>
           </a:p>
           <a:p>
             <a:pPr lvl="4"/>
             <a:r>
-              <a:rPr lang="fr-FR" smtClean="0"/>
+              <a:rPr lang="fr-FR"/>
               <a:t>Cinquième niveau</a:t>
             </a:r>
-            <a:endParaRPr lang="fr-FR"/>
           </a:p>
         </p:txBody>
       </p:sp>
@@ -1989,7 +1974,7 @@
           <a:p>
             <a:pPr lvl="0"/>
             <a:r>
-              <a:rPr lang="fr-FR" smtClean="0"/>
+              <a:rPr lang="fr-FR"/>
               <a:t>Modifier les styles du texte du masque</a:t>
             </a:r>
           </a:p>
@@ -2017,38 +2002,37 @@
           <a:p>
             <a:pPr lvl="0"/>
             <a:r>
-              <a:rPr lang="fr-FR" smtClean="0"/>
+              <a:rPr lang="fr-FR"/>
               <a:t>Modifier les styles du texte du masque</a:t>
             </a:r>
           </a:p>
           <a:p>
             <a:pPr lvl="1"/>
             <a:r>
-              <a:rPr lang="fr-FR" smtClean="0"/>
+              <a:rPr lang="fr-FR"/>
               <a:t>Deuxième niveau</a:t>
             </a:r>
           </a:p>
           <a:p>
             <a:pPr lvl="2"/>
             <a:r>
-              <a:rPr lang="fr-FR" smtClean="0"/>
+              <a:rPr lang="fr-FR"/>
               <a:t>Troisième niveau</a:t>
             </a:r>
           </a:p>
           <a:p>
             <a:pPr lvl="3"/>
             <a:r>
-              <a:rPr lang="fr-FR" smtClean="0"/>
+              <a:rPr lang="fr-FR"/>
               <a:t>Quatrième niveau</a:t>
             </a:r>
           </a:p>
           <a:p>
             <a:pPr lvl="4"/>
             <a:r>
-              <a:rPr lang="fr-FR" smtClean="0"/>
+              <a:rPr lang="fr-FR"/>
               <a:t>Cinquième niveau</a:t>
             </a:r>
-            <a:endParaRPr lang="fr-FR"/>
           </a:p>
         </p:txBody>
       </p:sp>
@@ -2069,7 +2053,7 @@
           <a:p>
             <a:fld id="{D0784885-9562-4587-9B38-B0A86FA11DC8}" type="datetime1">
               <a:rPr lang="fr-FR" smtClean="0"/>
-              <a:t>07/06/2024</a:t>
+              <a:t>08/06/2024</a:t>
             </a:fld>
             <a:endParaRPr lang="fr-FR"/>
           </a:p>
@@ -2163,10 +2147,9 @@
           <a:lstStyle/>
           <a:p>
             <a:r>
-              <a:rPr lang="fr-FR" smtClean="0"/>
+              <a:rPr lang="fr-FR"/>
               <a:t>Modifiez le style du titre</a:t>
             </a:r>
-            <a:endParaRPr lang="fr-FR"/>
           </a:p>
         </p:txBody>
       </p:sp>
@@ -2187,7 +2170,7 @@
           <a:p>
             <a:fld id="{D012715E-0FF1-4C90-BF36-5D132CC66135}" type="datetime1">
               <a:rPr lang="fr-FR" smtClean="0"/>
-              <a:t>07/06/2024</a:t>
+              <a:t>08/06/2024</a:t>
             </a:fld>
             <a:endParaRPr lang="fr-FR"/>
           </a:p>
@@ -2282,7 +2265,7 @@
           <a:p>
             <a:fld id="{3EAE3FA9-3614-4389-AF70-49C2F7C662DE}" type="datetime1">
               <a:rPr lang="fr-FR" smtClean="0"/>
-              <a:t>07/06/2024</a:t>
+              <a:t>08/06/2024</a:t>
             </a:fld>
             <a:endParaRPr lang="fr-FR"/>
           </a:p>
@@ -2385,10 +2368,9 @@
           </a:lstStyle>
           <a:p>
             <a:r>
-              <a:rPr lang="fr-FR" smtClean="0"/>
+              <a:rPr lang="fr-FR"/>
               <a:t>Modifiez le style du titre</a:t>
             </a:r>
-            <a:endParaRPr lang="fr-FR"/>
           </a:p>
         </p:txBody>
       </p:sp>
@@ -2442,38 +2424,37 @@
           <a:p>
             <a:pPr lvl="0"/>
             <a:r>
-              <a:rPr lang="fr-FR" smtClean="0"/>
+              <a:rPr lang="fr-FR"/>
               <a:t>Modifier les styles du texte du masque</a:t>
             </a:r>
           </a:p>
           <a:p>
             <a:pPr lvl="1"/>
             <a:r>
-              <a:rPr lang="fr-FR" smtClean="0"/>
+              <a:rPr lang="fr-FR"/>
               <a:t>Deuxième niveau</a:t>
             </a:r>
           </a:p>
           <a:p>
             <a:pPr lvl="2"/>
             <a:r>
-              <a:rPr lang="fr-FR" smtClean="0"/>
+              <a:rPr lang="fr-FR"/>
               <a:t>Troisième niveau</a:t>
             </a:r>
           </a:p>
           <a:p>
             <a:pPr lvl="3"/>
             <a:r>
-              <a:rPr lang="fr-FR" smtClean="0"/>
+              <a:rPr lang="fr-FR"/>
               <a:t>Quatrième niveau</a:t>
             </a:r>
           </a:p>
           <a:p>
             <a:pPr lvl="4"/>
             <a:r>
-              <a:rPr lang="fr-FR" smtClean="0"/>
+              <a:rPr lang="fr-FR"/>
               <a:t>Cinquième niveau</a:t>
             </a:r>
-            <a:endParaRPr lang="fr-FR"/>
           </a:p>
         </p:txBody>
       </p:sp>
@@ -2536,7 +2517,7 @@
           <a:p>
             <a:pPr lvl="0"/>
             <a:r>
-              <a:rPr lang="fr-FR" smtClean="0"/>
+              <a:rPr lang="fr-FR"/>
               <a:t>Modifier les styles du texte du masque</a:t>
             </a:r>
           </a:p>
@@ -2559,7 +2540,7 @@
           <a:p>
             <a:fld id="{80B2F412-96AC-4A8E-BC1B-9C9D63DC472F}" type="datetime1">
               <a:rPr lang="fr-FR" smtClean="0"/>
-              <a:t>07/06/2024</a:t>
+              <a:t>08/06/2024</a:t>
             </a:fld>
             <a:endParaRPr lang="fr-FR"/>
           </a:p>
@@ -2662,10 +2643,9 @@
           </a:lstStyle>
           <a:p>
             <a:r>
-              <a:rPr lang="fr-FR" smtClean="0"/>
+              <a:rPr lang="fr-FR"/>
               <a:t>Modifiez le style du titre</a:t>
             </a:r>
-            <a:endParaRPr lang="fr-FR"/>
           </a:p>
         </p:txBody>
       </p:sp>
@@ -2789,7 +2769,7 @@
           <a:p>
             <a:pPr lvl="0"/>
             <a:r>
-              <a:rPr lang="fr-FR" smtClean="0"/>
+              <a:rPr lang="fr-FR"/>
               <a:t>Modifier les styles du texte du masque</a:t>
             </a:r>
           </a:p>
@@ -2812,7 +2792,7 @@
           <a:p>
             <a:fld id="{5A7F0B1E-B93B-4DD9-BE80-ED3303C206B0}" type="datetime1">
               <a:rPr lang="fr-FR" smtClean="0"/>
-              <a:t>07/06/2024</a:t>
+              <a:t>08/06/2024</a:t>
             </a:fld>
             <a:endParaRPr lang="fr-FR"/>
           </a:p>
@@ -2921,10 +2901,9 @@
           <a:lstStyle/>
           <a:p>
             <a:r>
-              <a:rPr lang="fr-FR" smtClean="0"/>
+              <a:rPr lang="fr-FR"/>
               <a:t>Modifiez le style du titre</a:t>
             </a:r>
-            <a:endParaRPr lang="fr-FR"/>
           </a:p>
         </p:txBody>
       </p:sp>
@@ -2955,38 +2934,37 @@
           <a:p>
             <a:pPr lvl="0"/>
             <a:r>
-              <a:rPr lang="fr-FR" smtClean="0"/>
+              <a:rPr lang="fr-FR"/>
               <a:t>Modifier les styles du texte du masque</a:t>
             </a:r>
           </a:p>
           <a:p>
             <a:pPr lvl="1"/>
             <a:r>
-              <a:rPr lang="fr-FR" smtClean="0"/>
+              <a:rPr lang="fr-FR"/>
               <a:t>Deuxième niveau</a:t>
             </a:r>
           </a:p>
           <a:p>
             <a:pPr lvl="2"/>
             <a:r>
-              <a:rPr lang="fr-FR" smtClean="0"/>
+              <a:rPr lang="fr-FR"/>
               <a:t>Troisième niveau</a:t>
             </a:r>
           </a:p>
           <a:p>
             <a:pPr lvl="3"/>
             <a:r>
-              <a:rPr lang="fr-FR" smtClean="0"/>
+              <a:rPr lang="fr-FR"/>
               <a:t>Quatrième niveau</a:t>
             </a:r>
           </a:p>
           <a:p>
             <a:pPr lvl="4"/>
             <a:r>
-              <a:rPr lang="fr-FR" smtClean="0"/>
+              <a:rPr lang="fr-FR"/>
               <a:t>Cinquième niveau</a:t>
             </a:r>
-            <a:endParaRPr lang="fr-FR"/>
           </a:p>
         </p:txBody>
       </p:sp>
@@ -3025,7 +3003,7 @@
           <a:p>
             <a:fld id="{64584BD8-F425-437A-B3D4-60A73B57126C}" type="datetime1">
               <a:rPr lang="fr-FR" smtClean="0"/>
-              <a:t>07/06/2024</a:t>
+              <a:t>08/06/2024</a:t>
             </a:fld>
             <a:endParaRPr lang="fr-FR"/>
           </a:p>
@@ -3536,14 +3514,11 @@
           <a:lstStyle/>
           <a:p>
             <a:r>
-              <a:rPr lang="fr-FR" b="1" dirty="0" smtClean="0">
+              <a:rPr lang="fr-FR" b="1" dirty="0">
                 <a:latin typeface="+mn-lt"/>
               </a:rPr>
               <a:t>Gestion de lumières pour les créateurs de contenu</a:t>
             </a:r>
-            <a:endParaRPr lang="fr-FR" b="1" dirty="0">
-              <a:latin typeface="+mn-lt"/>
-            </a:endParaRPr>
           </a:p>
         </p:txBody>
       </p:sp>
@@ -3570,7 +3545,7 @@
           <a:lstStyle/>
           <a:p>
             <a:r>
-              <a:rPr lang="fr-FR" sz="4400" dirty="0" smtClean="0">
+              <a:rPr lang="fr-FR" sz="4400" dirty="0">
                 <a:solidFill>
                   <a:srgbClr val="0029C3"/>
                 </a:solidFill>
@@ -3579,13 +3554,6 @@
               </a:rPr>
               <a:t>Projet BTS</a:t>
             </a:r>
-            <a:endParaRPr lang="fr-FR" sz="4400" dirty="0">
-              <a:solidFill>
-                <a:srgbClr val="0029C3"/>
-              </a:solidFill>
-              <a:latin typeface="Arial Black" panose="020B0A04020102020204" pitchFamily="34" charset="0"/>
-              <a:ea typeface="Segoe UI Black" panose="020B0A02040204020203" pitchFamily="34" charset="0"/>
-            </a:endParaRPr>
           </a:p>
         </p:txBody>
       </p:sp>
@@ -3829,7 +3797,7 @@
               <a:buSzPts val="1100"/>
             </a:pPr>
             <a:r>
-              <a:rPr lang="fr-FR" sz="2400" dirty="0" smtClean="0">
+              <a:rPr lang="fr-FR" sz="2400" dirty="0">
                 <a:latin typeface="+mj-lt"/>
               </a:rPr>
               <a:t>Jean Leduc</a:t>
@@ -3843,14 +3811,11 @@
               <a:buSzPts val="1100"/>
             </a:pPr>
             <a:r>
-              <a:rPr lang="fr-FR" sz="2400" dirty="0" smtClean="0">
+              <a:rPr lang="fr-FR" sz="2400" dirty="0">
                 <a:latin typeface="+mj-lt"/>
               </a:rPr>
               <a:t>BTS SN</a:t>
             </a:r>
-            <a:endParaRPr lang="fr-FR" sz="2400" dirty="0">
-              <a:latin typeface="+mj-lt"/>
-            </a:endParaRPr>
           </a:p>
         </p:txBody>
       </p:sp>
@@ -3887,13 +3852,6 @@
   <p:clrMapOvr>
     <a:masterClrMapping/>
   </p:clrMapOvr>
-  <p:timing>
-    <p:tnLst>
-      <p:par>
-        <p:cTn id="1" dur="indefinite" restart="never" nodeType="tmRoot"/>
-      </p:par>
-    </p:tnLst>
-  </p:timing>
 </p:sld>
 </file>
 
@@ -3949,7 +3907,7 @@
               <a:buNone/>
             </a:pPr>
             <a:r>
-              <a:rPr lang="en" sz="5400" b="1" dirty="0" smtClean="0">
+              <a:rPr lang="en" sz="5400" b="1" dirty="0">
                 <a:solidFill>
                   <a:srgbClr val="002060"/>
                 </a:solidFill>
@@ -4070,13 +4028,6 @@
   <p:clrMapOvr>
     <a:masterClrMapping/>
   </p:clrMapOvr>
-  <p:timing>
-    <p:tnLst>
-      <p:par>
-        <p:cTn id="1" dur="indefinite" restart="never" nodeType="tmRoot"/>
-      </p:par>
-    </p:tnLst>
-  </p:timing>
 </p:sld>
 </file>
 
@@ -4132,7 +4083,7 @@
               <a:buNone/>
             </a:pPr>
             <a:r>
-              <a:rPr lang="en" sz="5400" b="1" dirty="0" smtClean="0">
+              <a:rPr lang="en" sz="5400" b="1" dirty="0">
                 <a:solidFill>
                   <a:srgbClr val="002060"/>
                 </a:solidFill>
@@ -4351,13 +4302,6 @@
   <p:clrMapOvr>
     <a:masterClrMapping/>
   </p:clrMapOvr>
-  <p:timing>
-    <p:tnLst>
-      <p:par>
-        <p:cTn id="1" dur="indefinite" restart="never" nodeType="tmRoot"/>
-      </p:par>
-    </p:tnLst>
-  </p:timing>
 </p:sld>
 </file>
 
@@ -4413,7 +4357,7 @@
               <a:buNone/>
             </a:pPr>
             <a:r>
-              <a:rPr lang="en" sz="5400" b="1" dirty="0" smtClean="0">
+              <a:rPr lang="en" sz="5400" b="1" dirty="0">
                 <a:solidFill>
                   <a:srgbClr val="002060"/>
                 </a:solidFill>
@@ -4533,13 +4477,6 @@
   <p:clrMapOvr>
     <a:masterClrMapping/>
   </p:clrMapOvr>
-  <p:timing>
-    <p:tnLst>
-      <p:par>
-        <p:cTn id="1" dur="indefinite" restart="never" nodeType="tmRoot"/>
-      </p:par>
-    </p:tnLst>
-  </p:timing>
 </p:sld>
 </file>
 
@@ -4595,7 +4532,7 @@
               <a:buNone/>
             </a:pPr>
             <a:r>
-              <a:rPr lang="en" sz="5400" b="1" dirty="0" smtClean="0">
+              <a:rPr lang="en" sz="5400" b="1" dirty="0">
                 <a:solidFill>
                   <a:srgbClr val="002060"/>
                 </a:solidFill>
@@ -4715,13 +4652,6 @@
   <p:clrMapOvr>
     <a:masterClrMapping/>
   </p:clrMapOvr>
-  <p:timing>
-    <p:tnLst>
-      <p:par>
-        <p:cTn id="1" dur="indefinite" restart="never" nodeType="tmRoot"/>
-      </p:par>
-    </p:tnLst>
-  </p:timing>
 </p:sld>
 </file>
 
@@ -4777,7 +4707,7 @@
               <a:buNone/>
             </a:pPr>
             <a:r>
-              <a:rPr lang="en" sz="5400" b="1" dirty="0" smtClean="0">
+              <a:rPr lang="en" sz="5400" b="1" dirty="0">
                 <a:solidFill>
                   <a:srgbClr val="002060"/>
                 </a:solidFill>
@@ -4897,13 +4827,6 @@
   <p:clrMapOvr>
     <a:masterClrMapping/>
   </p:clrMapOvr>
-  <p:timing>
-    <p:tnLst>
-      <p:par>
-        <p:cTn id="1" dur="indefinite" restart="never" nodeType="tmRoot"/>
-      </p:par>
-    </p:tnLst>
-  </p:timing>
 </p:sld>
 </file>
 
@@ -4959,7 +4882,7 @@
               <a:buNone/>
             </a:pPr>
             <a:r>
-              <a:rPr lang="en" sz="3600" b="1" dirty="0" smtClean="0">
+              <a:rPr lang="en" sz="3600" b="1" dirty="0">
                 <a:solidFill>
                   <a:srgbClr val="002060"/>
                 </a:solidFill>
@@ -5066,13 +4989,6 @@
   <p:clrMapOvr>
     <a:masterClrMapping/>
   </p:clrMapOvr>
-  <p:timing>
-    <p:tnLst>
-      <p:par>
-        <p:cTn id="1" dur="indefinite" restart="never" nodeType="tmRoot"/>
-      </p:par>
-    </p:tnLst>
-  </p:timing>
 </p:sld>
 </file>
 
@@ -5128,7 +5044,7 @@
               <a:buNone/>
             </a:pPr>
             <a:r>
-              <a:rPr lang="en" sz="3600" b="1" dirty="0" smtClean="0">
+              <a:rPr lang="en" sz="3600" b="1" dirty="0">
                 <a:solidFill>
                   <a:srgbClr val="002060"/>
                 </a:solidFill>
@@ -5235,13 +5151,6 @@
   <p:clrMapOvr>
     <a:masterClrMapping/>
   </p:clrMapOvr>
-  <p:timing>
-    <p:tnLst>
-      <p:par>
-        <p:cTn id="1" dur="indefinite" restart="never" nodeType="tmRoot"/>
-      </p:par>
-    </p:tnLst>
-  </p:timing>
 </p:sld>
 </file>
 
@@ -5297,7 +5206,7 @@
               <a:buNone/>
             </a:pPr>
             <a:r>
-              <a:rPr lang="en" sz="5400" b="1" dirty="0" smtClean="0">
+              <a:rPr lang="en" sz="5400" b="1" dirty="0">
                 <a:solidFill>
                   <a:srgbClr val="002060"/>
                 </a:solidFill>
@@ -5712,13 +5621,6 @@
   <p:clrMapOvr>
     <a:masterClrMapping/>
   </p:clrMapOvr>
-  <p:timing>
-    <p:tnLst>
-      <p:par>
-        <p:cTn id="1" dur="indefinite" restart="never" nodeType="tmRoot"/>
-      </p:par>
-    </p:tnLst>
-  </p:timing>
 </p:sld>
 </file>
 
@@ -5774,7 +5676,7 @@
               <a:buNone/>
             </a:pPr>
             <a:r>
-              <a:rPr lang="en" sz="5400" b="1" dirty="0" smtClean="0">
+              <a:rPr lang="en" sz="5400" b="1" dirty="0">
                 <a:solidFill>
                   <a:srgbClr val="002060"/>
                 </a:solidFill>
@@ -6112,10 +6014,9 @@
           </a:lstStyle>
           <a:p>
             <a:r>
-              <a:rPr lang="fr-FR" sz="3200" dirty="0" smtClean="0"/>
+              <a:rPr lang="fr-FR" sz="3200" dirty="0"/>
               <a:t>Activer la scène</a:t>
             </a:r>
-            <a:endParaRPr lang="fr-FR" sz="3200" dirty="0"/>
           </a:p>
         </p:txBody>
       </p:sp>
@@ -6182,13 +6083,6 @@
   <p:clrMapOvr>
     <a:masterClrMapping/>
   </p:clrMapOvr>
-  <p:timing>
-    <p:tnLst>
-      <p:par>
-        <p:cTn id="1" dur="indefinite" restart="never" nodeType="tmRoot"/>
-      </p:par>
-    </p:tnLst>
-  </p:timing>
 </p:sld>
 </file>
 
@@ -6241,18 +6135,18 @@
               <a:buSzPts val="1100"/>
             </a:pPr>
             <a:r>
-              <a:rPr lang="fr-FR" sz="2400" dirty="0" smtClean="0">
+              <a:rPr lang="fr-FR" sz="2400" dirty="0">
                 <a:latin typeface="+mj-lt"/>
               </a:rPr>
               <a:t>- Logiciel </a:t>
             </a:r>
             <a:r>
-              <a:rPr lang="fr-FR" sz="2400" dirty="0" err="1" smtClean="0">
+              <a:rPr lang="fr-FR" sz="2400" dirty="0" err="1">
                 <a:latin typeface="+mj-lt"/>
               </a:rPr>
               <a:t>arduino</a:t>
             </a:r>
-            <a:endParaRPr lang="fr-FR" sz="2400" dirty="0" smtClean="0">
+            <a:endParaRPr lang="fr-FR" sz="2400" dirty="0">
               <a:latin typeface="+mj-lt"/>
             </a:endParaRPr>
           </a:p>
@@ -6275,7 +6169,7 @@
               <a:buSzPts val="1100"/>
             </a:pPr>
             <a:r>
-              <a:rPr lang="fr-FR" sz="2400" dirty="0" smtClean="0">
+              <a:rPr lang="fr-FR" sz="2400" dirty="0">
                 <a:latin typeface="+mj-lt"/>
               </a:rPr>
               <a:t>- Console Matériel</a:t>
@@ -6300,19 +6194,19 @@
               <a:buSzPts val="1100"/>
             </a:pPr>
             <a:r>
-              <a:rPr lang="fr-FR" sz="2400" dirty="0" smtClean="0">
+              <a:rPr lang="fr-FR" sz="2400" dirty="0">
                 <a:latin typeface="+mj-lt"/>
               </a:rPr>
               <a:t>- 4 ordinateurs </a:t>
             </a:r>
             <a:r>
-              <a:rPr lang="fr-FR" sz="2400" dirty="0" err="1" smtClean="0">
+              <a:rPr lang="fr-FR" sz="2400" dirty="0" err="1">
                 <a:latin typeface="+mj-lt"/>
               </a:rPr>
               <a:t>windows</a:t>
             </a:r>
             <a:r>
-              <a:rPr lang="fr-FR" sz="2400" dirty="0" smtClean="0">
+              <a:rPr lang="fr-FR" sz="2400" dirty="0">
                 <a:latin typeface="+mj-lt"/>
               </a:rPr>
               <a:t> et 1 ordinateurs linux</a:t>
@@ -6398,7 +6292,7 @@
               <a:buSzPts val="1100"/>
             </a:pPr>
             <a:r>
-              <a:rPr lang="fr-FR" sz="2400" dirty="0" smtClean="0">
+              <a:rPr lang="fr-FR" sz="2400" dirty="0">
                 <a:latin typeface="+mj-lt"/>
               </a:rPr>
               <a:t>- Logiciel Visual Studio Code</a:t>
@@ -6423,19 +6317,19 @@
               <a:buSzPts val="1100"/>
             </a:pPr>
             <a:r>
-              <a:rPr lang="fr-FR" sz="2400" dirty="0" smtClean="0">
+              <a:rPr lang="fr-FR" sz="2400" dirty="0">
                 <a:latin typeface="+mj-lt"/>
               </a:rPr>
               <a:t>- Lumières </a:t>
             </a:r>
             <a:r>
-              <a:rPr lang="fr-FR" sz="2400" dirty="0" err="1" smtClean="0">
+              <a:rPr lang="fr-FR" sz="2400" dirty="0" err="1">
                 <a:latin typeface="+mj-lt"/>
               </a:rPr>
               <a:t>Saber</a:t>
             </a:r>
             <a:r>
-              <a:rPr lang="fr-FR" sz="2400" dirty="0" smtClean="0">
+              <a:rPr lang="fr-FR" sz="2400" dirty="0">
                 <a:latin typeface="+mj-lt"/>
               </a:rPr>
               <a:t> avec protocole DMX</a:t>
@@ -6460,7 +6354,7 @@
               <a:buSzPts val="1100"/>
             </a:pPr>
             <a:r>
-              <a:rPr lang="fr-FR" sz="2400" dirty="0" smtClean="0">
+              <a:rPr lang="fr-FR" sz="2400" dirty="0">
                 <a:latin typeface="+mj-lt"/>
               </a:rPr>
               <a:t>- Propriété DMX ?</a:t>
@@ -6756,7 +6650,7 @@
           </a:lstStyle>
           <a:p>
             <a:r>
-              <a:rPr lang="en" sz="4000" dirty="0" smtClean="0">
+              <a:rPr lang="en" sz="4000" dirty="0">
                 <a:solidFill>
                   <a:schemeClr val="accent1">
                     <a:lumMod val="50000"/>
@@ -6958,10 +6852,9 @@
               <a:buNone/>
             </a:pPr>
             <a:r>
-              <a:rPr lang="fr-FR" sz="4000" b="1" dirty="0" smtClean="0"/>
+              <a:rPr lang="fr-FR" sz="4000" b="1" dirty="0"/>
               <a:t>Le matériel utilisé</a:t>
             </a:r>
-            <a:endParaRPr lang="fr-FR" sz="4000" b="1" dirty="0"/>
           </a:p>
         </p:txBody>
       </p:sp>
@@ -6998,13 +6891,6 @@
   <p:clrMapOvr>
     <a:masterClrMapping/>
   </p:clrMapOvr>
-  <p:timing>
-    <p:tnLst>
-      <p:par>
-        <p:cTn id="1" dur="indefinite" restart="never" nodeType="tmRoot"/>
-      </p:par>
-    </p:tnLst>
-  </p:timing>
 </p:sld>
 </file>
 
@@ -7048,7 +6934,7 @@
           <a:lstStyle/>
           <a:p>
             <a:r>
-              <a:rPr lang="fr-FR" sz="4400" dirty="0" smtClean="0">
+              <a:rPr lang="fr-FR" sz="4400" dirty="0">
                 <a:solidFill>
                   <a:srgbClr val="0029C3"/>
                 </a:solidFill>
@@ -7064,20 +6950,6 @@
               </a:rPr>
               <a:t>Sommaire</a:t>
             </a:r>
-            <a:endParaRPr lang="fr-FR" sz="4400" dirty="0">
-              <a:solidFill>
-                <a:srgbClr val="0029C3"/>
-              </a:solidFill>
-              <a:effectLst>
-                <a:outerShdw blurRad="38100" dist="38100" dir="2700000" algn="tl">
-                  <a:srgbClr val="000000">
-                    <a:alpha val="43137"/>
-                  </a:srgbClr>
-                </a:outerShdw>
-              </a:effectLst>
-              <a:latin typeface="Segoe UI Black" panose="020B0A02040204020203" pitchFamily="34" charset="0"/>
-              <a:ea typeface="Segoe UI Black" panose="020B0A02040204020203" pitchFamily="34" charset="0"/>
-            </a:endParaRPr>
           </a:p>
         </p:txBody>
       </p:sp>
@@ -7366,7 +7238,7 @@
           </a:lstStyle>
           <a:p>
             <a:r>
-              <a:rPr lang="en" sz="4000" dirty="0" smtClean="0">
+              <a:rPr lang="en" sz="4000" dirty="0">
                 <a:solidFill>
                   <a:schemeClr val="accent1">
                     <a:lumMod val="50000"/>
@@ -7568,10 +7440,9 @@
               <a:buNone/>
             </a:pPr>
             <a:r>
-              <a:rPr lang="fr-FR" sz="4000" b="1" dirty="0" smtClean="0"/>
+              <a:rPr lang="fr-FR" sz="4000" b="1" dirty="0"/>
               <a:t>Présentation du projet</a:t>
             </a:r>
-            <a:endParaRPr lang="fr-FR" sz="4000" b="1" dirty="0"/>
           </a:p>
         </p:txBody>
       </p:sp>
@@ -7860,7 +7731,7 @@
           </a:lstStyle>
           <a:p>
             <a:r>
-              <a:rPr lang="en" sz="4000" dirty="0" smtClean="0">
+              <a:rPr lang="en" sz="4000" dirty="0">
                 <a:solidFill>
                   <a:schemeClr val="accent1">
                     <a:lumMod val="50000"/>
@@ -8062,10 +7933,9 @@
               <a:buNone/>
             </a:pPr>
             <a:r>
-              <a:rPr lang="fr-FR" sz="4000" b="1" dirty="0" smtClean="0"/>
+              <a:rPr lang="fr-FR" sz="4000" b="1" dirty="0"/>
               <a:t>Documentation</a:t>
             </a:r>
-            <a:endParaRPr lang="fr-FR" sz="4000" b="1" dirty="0"/>
           </a:p>
         </p:txBody>
       </p:sp>
@@ -8354,7 +8224,7 @@
           </a:lstStyle>
           <a:p>
             <a:r>
-              <a:rPr lang="en" sz="4000" dirty="0" smtClean="0">
+              <a:rPr lang="en" sz="4000" dirty="0">
                 <a:solidFill>
                   <a:schemeClr val="accent1">
                     <a:lumMod val="50000"/>
@@ -8556,10 +8426,9 @@
               <a:buNone/>
             </a:pPr>
             <a:r>
-              <a:rPr lang="fr-FR" sz="4000" b="1" dirty="0" smtClean="0"/>
+              <a:rPr lang="fr-FR" sz="4000" b="1" dirty="0"/>
               <a:t>Le matériel utilisé</a:t>
             </a:r>
-            <a:endParaRPr lang="fr-FR" sz="4000" b="1" dirty="0"/>
           </a:p>
         </p:txBody>
       </p:sp>
@@ -8848,7 +8717,7 @@
           </a:lstStyle>
           <a:p>
             <a:r>
-              <a:rPr lang="en" sz="4000" dirty="0" smtClean="0">
+              <a:rPr lang="en" sz="4000" dirty="0">
                 <a:solidFill>
                   <a:schemeClr val="accent1">
                     <a:lumMod val="50000"/>
@@ -9050,10 +8919,9 @@
               <a:buNone/>
             </a:pPr>
             <a:r>
-              <a:rPr lang="fr-FR" sz="4000" b="1" dirty="0" smtClean="0"/>
+              <a:rPr lang="fr-FR" sz="4000" b="1" dirty="0"/>
               <a:t>Conclusion</a:t>
             </a:r>
-            <a:endParaRPr lang="fr-FR" sz="4000" b="1" dirty="0"/>
           </a:p>
         </p:txBody>
       </p:sp>
@@ -9238,13 +9106,6 @@
   <p:clrMapOvr>
     <a:masterClrMapping/>
   </p:clrMapOvr>
-  <p:timing>
-    <p:tnLst>
-      <p:par>
-        <p:cTn id="1" dur="indefinite" restart="never" nodeType="tmRoot"/>
-      </p:par>
-    </p:tnLst>
-  </p:timing>
 </p:sld>
 </file>
 
@@ -9265,545 +9126,15 @@
           <a:chExt cx="0" cy="0"/>
         </a:xfrm>
       </p:grpSpPr>
-      <p:sp>
-        <p:nvSpPr>
-          <p:cNvPr id="19" name="Google Shape;222;p34"/>
-          <p:cNvSpPr txBox="1">
-            <a:spLocks noGrp="1"/>
-          </p:cNvSpPr>
-          <p:nvPr>
-            <p:ph type="subTitle" idx="4294967295"/>
-          </p:nvPr>
-        </p:nvSpPr>
-        <p:spPr>
-          <a:xfrm>
-            <a:off x="957984" y="4060453"/>
-            <a:ext cx="3185905" cy="661244"/>
-          </a:xfrm>
-          <a:prstGeom prst="rect">
-            <a:avLst/>
-          </a:prstGeom>
-        </p:spPr>
-        <p:txBody>
-          <a:bodyPr spcFirstLastPara="1" wrap="square" lIns="91425" tIns="91425" rIns="91425" bIns="91425" anchor="b" anchorCtr="0">
-            <a:noAutofit/>
-          </a:bodyPr>
-          <a:lstStyle/>
-          <a:p>
-            <a:pPr marL="0" lvl="0" indent="0" algn="l" rtl="0">
-              <a:spcBef>
-                <a:spcPts val="0"/>
-              </a:spcBef>
-              <a:spcAft>
-                <a:spcPts val="0"/>
-              </a:spcAft>
-              <a:buNone/>
-            </a:pPr>
-            <a:r>
-              <a:rPr lang="en" sz="5400" b="1" dirty="0" smtClean="0"/>
-              <a:t>Compte rendu des activités</a:t>
-            </a:r>
-            <a:endParaRPr sz="5400" b="1" dirty="0"/>
-          </a:p>
-        </p:txBody>
-      </p:sp>
-      <p:sp>
-        <p:nvSpPr>
-          <p:cNvPr id="20" name="Google Shape;188;p31">
+      <p:pic>
+        <p:nvPicPr>
+          <p:cNvPr id="5" name="Image 4">
             <a:extLst>
               <a:ext uri="{FF2B5EF4-FFF2-40B4-BE49-F238E27FC236}">
-                <a16:creationId xmlns:a16="http://schemas.microsoft.com/office/drawing/2014/main" id="{1EE455DA-87D3-77FF-0CEF-E1F804EA9888}"/>
+                <a16:creationId xmlns:a16="http://schemas.microsoft.com/office/drawing/2014/main" id="{7A12AE36-3763-1914-4970-D88EDED93E1C}"/>
               </a:ext>
             </a:extLst>
           </p:cNvPr>
-          <p:cNvSpPr txBox="1">
-            <a:spLocks/>
-          </p:cNvSpPr>
-          <p:nvPr/>
-        </p:nvSpPr>
-        <p:spPr>
-          <a:xfrm>
-            <a:off x="4248726" y="480813"/>
-            <a:ext cx="1160024" cy="896876"/>
-          </a:xfrm>
-          <a:prstGeom prst="rect">
-            <a:avLst/>
-          </a:prstGeom>
-          <a:solidFill>
-            <a:schemeClr val="accent4">
-              <a:lumMod val="20000"/>
-              <a:lumOff val="80000"/>
-            </a:schemeClr>
-          </a:solidFill>
-          <a:ln>
-            <a:noFill/>
-          </a:ln>
-        </p:spPr>
-        <p:txBody>
-          <a:bodyPr spcFirstLastPara="1" wrap="square" lIns="91425" tIns="91425" rIns="91425" bIns="91425" anchor="ctr" anchorCtr="0">
-            <a:noAutofit/>
-          </a:bodyPr>
-          <a:lstStyle>
-            <a:defPPr marR="0" lvl="0" algn="l" rtl="0">
-              <a:lnSpc>
-                <a:spcPct val="100000"/>
-              </a:lnSpc>
-              <a:spcBef>
-                <a:spcPts val="0"/>
-              </a:spcBef>
-              <a:spcAft>
-                <a:spcPts val="0"/>
-              </a:spcAft>
-            </a:defPPr>
-            <a:lvl1pPr marR="0" lvl="0" algn="ctr" rtl="0">
-              <a:lnSpc>
-                <a:spcPct val="100000"/>
-              </a:lnSpc>
-              <a:spcBef>
-                <a:spcPts val="0"/>
-              </a:spcBef>
-              <a:spcAft>
-                <a:spcPts val="0"/>
-              </a:spcAft>
-              <a:buClr>
-                <a:schemeClr val="dk1"/>
-              </a:buClr>
-              <a:buSzPts val="3000"/>
-              <a:buFont typeface="Doppio One"/>
-              <a:buNone/>
-              <a:defRPr sz="3000" b="1" i="0" u="none" strike="noStrike" cap="none">
-                <a:solidFill>
-                  <a:schemeClr val="accent2"/>
-                </a:solidFill>
-                <a:latin typeface="Doppio One"/>
-                <a:ea typeface="Doppio One"/>
-                <a:cs typeface="Doppio One"/>
-                <a:sym typeface="Doppio One"/>
-              </a:defRPr>
-            </a:lvl1pPr>
-            <a:lvl2pPr marR="0" lvl="1" algn="l" rtl="0">
-              <a:lnSpc>
-                <a:spcPct val="100000"/>
-              </a:lnSpc>
-              <a:spcBef>
-                <a:spcPts val="0"/>
-              </a:spcBef>
-              <a:spcAft>
-                <a:spcPts val="0"/>
-              </a:spcAft>
-              <a:buClr>
-                <a:schemeClr val="dk1"/>
-              </a:buClr>
-              <a:buSzPts val="3000"/>
-              <a:buFont typeface="Doppio One"/>
-              <a:buNone/>
-              <a:defRPr sz="3000" b="1" i="0" u="none" strike="noStrike" cap="none">
-                <a:solidFill>
-                  <a:schemeClr val="dk1"/>
-                </a:solidFill>
-                <a:latin typeface="Doppio One"/>
-                <a:ea typeface="Doppio One"/>
-                <a:cs typeface="Doppio One"/>
-                <a:sym typeface="Doppio One"/>
-              </a:defRPr>
-            </a:lvl2pPr>
-            <a:lvl3pPr marR="0" lvl="2" algn="l" rtl="0">
-              <a:lnSpc>
-                <a:spcPct val="100000"/>
-              </a:lnSpc>
-              <a:spcBef>
-                <a:spcPts val="0"/>
-              </a:spcBef>
-              <a:spcAft>
-                <a:spcPts val="0"/>
-              </a:spcAft>
-              <a:buClr>
-                <a:schemeClr val="dk1"/>
-              </a:buClr>
-              <a:buSzPts val="3000"/>
-              <a:buFont typeface="Doppio One"/>
-              <a:buNone/>
-              <a:defRPr sz="3000" b="1" i="0" u="none" strike="noStrike" cap="none">
-                <a:solidFill>
-                  <a:schemeClr val="dk1"/>
-                </a:solidFill>
-                <a:latin typeface="Doppio One"/>
-                <a:ea typeface="Doppio One"/>
-                <a:cs typeface="Doppio One"/>
-                <a:sym typeface="Doppio One"/>
-              </a:defRPr>
-            </a:lvl3pPr>
-            <a:lvl4pPr marR="0" lvl="3" algn="l" rtl="0">
-              <a:lnSpc>
-                <a:spcPct val="100000"/>
-              </a:lnSpc>
-              <a:spcBef>
-                <a:spcPts val="0"/>
-              </a:spcBef>
-              <a:spcAft>
-                <a:spcPts val="0"/>
-              </a:spcAft>
-              <a:buClr>
-                <a:schemeClr val="dk1"/>
-              </a:buClr>
-              <a:buSzPts val="3000"/>
-              <a:buFont typeface="Doppio One"/>
-              <a:buNone/>
-              <a:defRPr sz="3000" b="1" i="0" u="none" strike="noStrike" cap="none">
-                <a:solidFill>
-                  <a:schemeClr val="dk1"/>
-                </a:solidFill>
-                <a:latin typeface="Doppio One"/>
-                <a:ea typeface="Doppio One"/>
-                <a:cs typeface="Doppio One"/>
-                <a:sym typeface="Doppio One"/>
-              </a:defRPr>
-            </a:lvl4pPr>
-            <a:lvl5pPr marR="0" lvl="4" algn="l" rtl="0">
-              <a:lnSpc>
-                <a:spcPct val="100000"/>
-              </a:lnSpc>
-              <a:spcBef>
-                <a:spcPts val="0"/>
-              </a:spcBef>
-              <a:spcAft>
-                <a:spcPts val="0"/>
-              </a:spcAft>
-              <a:buClr>
-                <a:schemeClr val="dk1"/>
-              </a:buClr>
-              <a:buSzPts val="3000"/>
-              <a:buFont typeface="Doppio One"/>
-              <a:buNone/>
-              <a:defRPr sz="3000" b="1" i="0" u="none" strike="noStrike" cap="none">
-                <a:solidFill>
-                  <a:schemeClr val="dk1"/>
-                </a:solidFill>
-                <a:latin typeface="Doppio One"/>
-                <a:ea typeface="Doppio One"/>
-                <a:cs typeface="Doppio One"/>
-                <a:sym typeface="Doppio One"/>
-              </a:defRPr>
-            </a:lvl5pPr>
-            <a:lvl6pPr marR="0" lvl="5" algn="l" rtl="0">
-              <a:lnSpc>
-                <a:spcPct val="100000"/>
-              </a:lnSpc>
-              <a:spcBef>
-                <a:spcPts val="0"/>
-              </a:spcBef>
-              <a:spcAft>
-                <a:spcPts val="0"/>
-              </a:spcAft>
-              <a:buClr>
-                <a:schemeClr val="dk1"/>
-              </a:buClr>
-              <a:buSzPts val="3000"/>
-              <a:buFont typeface="Doppio One"/>
-              <a:buNone/>
-              <a:defRPr sz="3000" b="1" i="0" u="none" strike="noStrike" cap="none">
-                <a:solidFill>
-                  <a:schemeClr val="dk1"/>
-                </a:solidFill>
-                <a:latin typeface="Doppio One"/>
-                <a:ea typeface="Doppio One"/>
-                <a:cs typeface="Doppio One"/>
-                <a:sym typeface="Doppio One"/>
-              </a:defRPr>
-            </a:lvl6pPr>
-            <a:lvl7pPr marR="0" lvl="6" algn="l" rtl="0">
-              <a:lnSpc>
-                <a:spcPct val="100000"/>
-              </a:lnSpc>
-              <a:spcBef>
-                <a:spcPts val="0"/>
-              </a:spcBef>
-              <a:spcAft>
-                <a:spcPts val="0"/>
-              </a:spcAft>
-              <a:buClr>
-                <a:schemeClr val="dk1"/>
-              </a:buClr>
-              <a:buSzPts val="3000"/>
-              <a:buFont typeface="Doppio One"/>
-              <a:buNone/>
-              <a:defRPr sz="3000" b="1" i="0" u="none" strike="noStrike" cap="none">
-                <a:solidFill>
-                  <a:schemeClr val="dk1"/>
-                </a:solidFill>
-                <a:latin typeface="Doppio One"/>
-                <a:ea typeface="Doppio One"/>
-                <a:cs typeface="Doppio One"/>
-                <a:sym typeface="Doppio One"/>
-              </a:defRPr>
-            </a:lvl7pPr>
-            <a:lvl8pPr marR="0" lvl="7" algn="l" rtl="0">
-              <a:lnSpc>
-                <a:spcPct val="100000"/>
-              </a:lnSpc>
-              <a:spcBef>
-                <a:spcPts val="0"/>
-              </a:spcBef>
-              <a:spcAft>
-                <a:spcPts val="0"/>
-              </a:spcAft>
-              <a:buClr>
-                <a:schemeClr val="dk1"/>
-              </a:buClr>
-              <a:buSzPts val="3000"/>
-              <a:buFont typeface="Doppio One"/>
-              <a:buNone/>
-              <a:defRPr sz="3000" b="1" i="0" u="none" strike="noStrike" cap="none">
-                <a:solidFill>
-                  <a:schemeClr val="dk1"/>
-                </a:solidFill>
-                <a:latin typeface="Doppio One"/>
-                <a:ea typeface="Doppio One"/>
-                <a:cs typeface="Doppio One"/>
-                <a:sym typeface="Doppio One"/>
-              </a:defRPr>
-            </a:lvl8pPr>
-            <a:lvl9pPr marR="0" lvl="8" algn="l" rtl="0">
-              <a:lnSpc>
-                <a:spcPct val="100000"/>
-              </a:lnSpc>
-              <a:spcBef>
-                <a:spcPts val="0"/>
-              </a:spcBef>
-              <a:spcAft>
-                <a:spcPts val="0"/>
-              </a:spcAft>
-              <a:buClr>
-                <a:schemeClr val="dk1"/>
-              </a:buClr>
-              <a:buSzPts val="3000"/>
-              <a:buFont typeface="Doppio One"/>
-              <a:buNone/>
-              <a:defRPr sz="3000" b="1" i="0" u="none" strike="noStrike" cap="none">
-                <a:solidFill>
-                  <a:schemeClr val="dk1"/>
-                </a:solidFill>
-                <a:latin typeface="Doppio One"/>
-                <a:ea typeface="Doppio One"/>
-                <a:cs typeface="Doppio One"/>
-                <a:sym typeface="Doppio One"/>
-              </a:defRPr>
-            </a:lvl9pPr>
-          </a:lstStyle>
-          <a:p>
-            <a:r>
-              <a:rPr lang="en" sz="4000" dirty="0" smtClean="0">
-                <a:solidFill>
-                  <a:schemeClr val="accent1">
-                    <a:lumMod val="50000"/>
-                  </a:schemeClr>
-                </a:solidFill>
-              </a:rPr>
-              <a:t>04</a:t>
-            </a:r>
-          </a:p>
-        </p:txBody>
-      </p:sp>
-      <p:sp>
-        <p:nvSpPr>
-          <p:cNvPr id="21" name="Google Shape;194;p31"/>
-          <p:cNvSpPr txBox="1">
-            <a:spLocks/>
-          </p:cNvSpPr>
-          <p:nvPr/>
-        </p:nvSpPr>
-        <p:spPr>
-          <a:xfrm>
-            <a:off x="5408750" y="480813"/>
-            <a:ext cx="3067080" cy="596900"/>
-          </a:xfrm>
-          <a:prstGeom prst="rect">
-            <a:avLst/>
-          </a:prstGeom>
-        </p:spPr>
-        <p:txBody>
-          <a:bodyPr spcFirstLastPara="1" wrap="square" lIns="91425" tIns="91425" rIns="91425" bIns="91425" anchor="t" anchorCtr="0">
-            <a:noAutofit/>
-          </a:bodyPr>
-          <a:lstStyle>
-            <a:lvl1pPr marL="228600" indent="-228600" algn="l" defTabSz="914400" rtl="0" eaLnBrk="1" latinLnBrk="0" hangingPunct="1">
-              <a:lnSpc>
-                <a:spcPct val="90000"/>
-              </a:lnSpc>
-              <a:spcBef>
-                <a:spcPts val="1000"/>
-              </a:spcBef>
-              <a:buFont typeface="Arial" panose="020B0604020202020204" pitchFamily="34" charset="0"/>
-              <a:buChar char="•"/>
-              <a:defRPr sz="2800" kern="1200">
-                <a:solidFill>
-                  <a:schemeClr val="tx1"/>
-                </a:solidFill>
-                <a:latin typeface="+mn-lt"/>
-                <a:ea typeface="+mn-ea"/>
-                <a:cs typeface="+mn-cs"/>
-              </a:defRPr>
-            </a:lvl1pPr>
-            <a:lvl2pPr marL="685800" indent="-228600" algn="l" defTabSz="914400" rtl="0" eaLnBrk="1" latinLnBrk="0" hangingPunct="1">
-              <a:lnSpc>
-                <a:spcPct val="90000"/>
-              </a:lnSpc>
-              <a:spcBef>
-                <a:spcPts val="500"/>
-              </a:spcBef>
-              <a:buFont typeface="Arial" panose="020B0604020202020204" pitchFamily="34" charset="0"/>
-              <a:buChar char="•"/>
-              <a:defRPr sz="2400" kern="1200">
-                <a:solidFill>
-                  <a:schemeClr val="tx1"/>
-                </a:solidFill>
-                <a:latin typeface="+mn-lt"/>
-                <a:ea typeface="+mn-ea"/>
-                <a:cs typeface="+mn-cs"/>
-              </a:defRPr>
-            </a:lvl2pPr>
-            <a:lvl3pPr marL="1143000" indent="-228600" algn="l" defTabSz="914400" rtl="0" eaLnBrk="1" latinLnBrk="0" hangingPunct="1">
-              <a:lnSpc>
-                <a:spcPct val="90000"/>
-              </a:lnSpc>
-              <a:spcBef>
-                <a:spcPts val="500"/>
-              </a:spcBef>
-              <a:buFont typeface="Arial" panose="020B0604020202020204" pitchFamily="34" charset="0"/>
-              <a:buChar char="•"/>
-              <a:defRPr sz="2000" kern="1200">
-                <a:solidFill>
-                  <a:schemeClr val="tx1"/>
-                </a:solidFill>
-                <a:latin typeface="+mn-lt"/>
-                <a:ea typeface="+mn-ea"/>
-                <a:cs typeface="+mn-cs"/>
-              </a:defRPr>
-            </a:lvl3pPr>
-            <a:lvl4pPr marL="1600200" indent="-228600" algn="l" defTabSz="914400" rtl="0" eaLnBrk="1" latinLnBrk="0" hangingPunct="1">
-              <a:lnSpc>
-                <a:spcPct val="90000"/>
-              </a:lnSpc>
-              <a:spcBef>
-                <a:spcPts val="500"/>
-              </a:spcBef>
-              <a:buFont typeface="Arial" panose="020B0604020202020204" pitchFamily="34" charset="0"/>
-              <a:buChar char="•"/>
-              <a:defRPr sz="1800" kern="1200">
-                <a:solidFill>
-                  <a:schemeClr val="tx1"/>
-                </a:solidFill>
-                <a:latin typeface="+mn-lt"/>
-                <a:ea typeface="+mn-ea"/>
-                <a:cs typeface="+mn-cs"/>
-              </a:defRPr>
-            </a:lvl4pPr>
-            <a:lvl5pPr marL="2057400" indent="-228600" algn="l" defTabSz="914400" rtl="0" eaLnBrk="1" latinLnBrk="0" hangingPunct="1">
-              <a:lnSpc>
-                <a:spcPct val="90000"/>
-              </a:lnSpc>
-              <a:spcBef>
-                <a:spcPts val="500"/>
-              </a:spcBef>
-              <a:buFont typeface="Arial" panose="020B0604020202020204" pitchFamily="34" charset="0"/>
-              <a:buChar char="•"/>
-              <a:defRPr sz="1800" kern="1200">
-                <a:solidFill>
-                  <a:schemeClr val="tx1"/>
-                </a:solidFill>
-                <a:latin typeface="+mn-lt"/>
-                <a:ea typeface="+mn-ea"/>
-                <a:cs typeface="+mn-cs"/>
-              </a:defRPr>
-            </a:lvl5pPr>
-            <a:lvl6pPr marL="2514600" indent="-228600" algn="l" defTabSz="914400" rtl="0" eaLnBrk="1" latinLnBrk="0" hangingPunct="1">
-              <a:lnSpc>
-                <a:spcPct val="90000"/>
-              </a:lnSpc>
-              <a:spcBef>
-                <a:spcPts val="500"/>
-              </a:spcBef>
-              <a:buFont typeface="Arial" panose="020B0604020202020204" pitchFamily="34" charset="0"/>
-              <a:buChar char="•"/>
-              <a:defRPr sz="1800" kern="1200">
-                <a:solidFill>
-                  <a:schemeClr val="tx1"/>
-                </a:solidFill>
-                <a:latin typeface="+mn-lt"/>
-                <a:ea typeface="+mn-ea"/>
-                <a:cs typeface="+mn-cs"/>
-              </a:defRPr>
-            </a:lvl6pPr>
-            <a:lvl7pPr marL="2971800" indent="-228600" algn="l" defTabSz="914400" rtl="0" eaLnBrk="1" latinLnBrk="0" hangingPunct="1">
-              <a:lnSpc>
-                <a:spcPct val="90000"/>
-              </a:lnSpc>
-              <a:spcBef>
-                <a:spcPts val="500"/>
-              </a:spcBef>
-              <a:buFont typeface="Arial" panose="020B0604020202020204" pitchFamily="34" charset="0"/>
-              <a:buChar char="•"/>
-              <a:defRPr sz="1800" kern="1200">
-                <a:solidFill>
-                  <a:schemeClr val="tx1"/>
-                </a:solidFill>
-                <a:latin typeface="+mn-lt"/>
-                <a:ea typeface="+mn-ea"/>
-                <a:cs typeface="+mn-cs"/>
-              </a:defRPr>
-            </a:lvl7pPr>
-            <a:lvl8pPr marL="3429000" indent="-228600" algn="l" defTabSz="914400" rtl="0" eaLnBrk="1" latinLnBrk="0" hangingPunct="1">
-              <a:lnSpc>
-                <a:spcPct val="90000"/>
-              </a:lnSpc>
-              <a:spcBef>
-                <a:spcPts val="500"/>
-              </a:spcBef>
-              <a:buFont typeface="Arial" panose="020B0604020202020204" pitchFamily="34" charset="0"/>
-              <a:buChar char="•"/>
-              <a:defRPr sz="1800" kern="1200">
-                <a:solidFill>
-                  <a:schemeClr val="tx1"/>
-                </a:solidFill>
-                <a:latin typeface="+mn-lt"/>
-                <a:ea typeface="+mn-ea"/>
-                <a:cs typeface="+mn-cs"/>
-              </a:defRPr>
-            </a:lvl8pPr>
-            <a:lvl9pPr marL="3886200" indent="-228600" algn="l" defTabSz="914400" rtl="0" eaLnBrk="1" latinLnBrk="0" hangingPunct="1">
-              <a:lnSpc>
-                <a:spcPct val="90000"/>
-              </a:lnSpc>
-              <a:spcBef>
-                <a:spcPts val="500"/>
-              </a:spcBef>
-              <a:buFont typeface="Arial" panose="020B0604020202020204" pitchFamily="34" charset="0"/>
-              <a:buChar char="•"/>
-              <a:defRPr sz="1800" kern="1200">
-                <a:solidFill>
-                  <a:schemeClr val="tx1"/>
-                </a:solidFill>
-                <a:latin typeface="+mn-lt"/>
-                <a:ea typeface="+mn-ea"/>
-                <a:cs typeface="+mn-cs"/>
-              </a:defRPr>
-            </a:lvl9pPr>
-          </a:lstStyle>
-          <a:p>
-            <a:pPr marL="0" indent="0">
-              <a:buNone/>
-            </a:pPr>
-            <a:r>
-              <a:rPr lang="fr-FR" sz="4000" b="1" dirty="0" smtClean="0"/>
-              <a:t>Conclusion</a:t>
-            </a:r>
-            <a:endParaRPr lang="fr-FR" sz="4000" b="1" dirty="0"/>
-          </a:p>
-        </p:txBody>
-      </p:sp>
-      <p:pic>
-        <p:nvPicPr>
-          <p:cNvPr id="2" name="Image 1"/>
           <p:cNvPicPr>
             <a:picLocks noChangeAspect="1"/>
           </p:cNvPicPr>
@@ -9823,14 +9154,549 @@
         </p:blipFill>
         <p:spPr>
           <a:xfrm>
-            <a:off x="4353607" y="1863822"/>
-            <a:ext cx="7759579" cy="4725235"/>
+            <a:off x="3912891" y="1769165"/>
+            <a:ext cx="8279109" cy="5088835"/>
           </a:xfrm>
           <a:prstGeom prst="rect">
             <a:avLst/>
           </a:prstGeom>
         </p:spPr>
       </p:pic>
+      <p:sp>
+        <p:nvSpPr>
+          <p:cNvPr id="19" name="Google Shape;222;p34"/>
+          <p:cNvSpPr txBox="1">
+            <a:spLocks noGrp="1"/>
+          </p:cNvSpPr>
+          <p:nvPr>
+            <p:ph type="subTitle" idx="4294967295"/>
+          </p:nvPr>
+        </p:nvSpPr>
+        <p:spPr>
+          <a:xfrm>
+            <a:off x="957984" y="4060453"/>
+            <a:ext cx="3185905" cy="661244"/>
+          </a:xfrm>
+          <a:prstGeom prst="rect">
+            <a:avLst/>
+          </a:prstGeom>
+        </p:spPr>
+        <p:txBody>
+          <a:bodyPr spcFirstLastPara="1" wrap="square" lIns="91425" tIns="91425" rIns="91425" bIns="91425" anchor="b" anchorCtr="0">
+            <a:noAutofit/>
+          </a:bodyPr>
+          <a:lstStyle/>
+          <a:p>
+            <a:pPr marL="0" lvl="0" indent="0" algn="l" rtl="0">
+              <a:spcBef>
+                <a:spcPts val="0"/>
+              </a:spcBef>
+              <a:spcAft>
+                <a:spcPts val="0"/>
+              </a:spcAft>
+              <a:buNone/>
+            </a:pPr>
+            <a:r>
+              <a:rPr lang="en" sz="5400" b="1" dirty="0"/>
+              <a:t>Compte rendu des activités</a:t>
+            </a:r>
+            <a:endParaRPr sz="5400" b="1" dirty="0"/>
+          </a:p>
+        </p:txBody>
+      </p:sp>
+      <p:sp>
+        <p:nvSpPr>
+          <p:cNvPr id="20" name="Google Shape;188;p31">
+            <a:extLst>
+              <a:ext uri="{FF2B5EF4-FFF2-40B4-BE49-F238E27FC236}">
+                <a16:creationId xmlns:a16="http://schemas.microsoft.com/office/drawing/2014/main" id="{1EE455DA-87D3-77FF-0CEF-E1F804EA9888}"/>
+              </a:ext>
+            </a:extLst>
+          </p:cNvPr>
+          <p:cNvSpPr txBox="1">
+            <a:spLocks/>
+          </p:cNvSpPr>
+          <p:nvPr/>
+        </p:nvSpPr>
+        <p:spPr>
+          <a:xfrm>
+            <a:off x="4248726" y="480813"/>
+            <a:ext cx="1160024" cy="896876"/>
+          </a:xfrm>
+          <a:prstGeom prst="rect">
+            <a:avLst/>
+          </a:prstGeom>
+          <a:solidFill>
+            <a:schemeClr val="accent4">
+              <a:lumMod val="20000"/>
+              <a:lumOff val="80000"/>
+            </a:schemeClr>
+          </a:solidFill>
+          <a:ln>
+            <a:noFill/>
+          </a:ln>
+        </p:spPr>
+        <p:txBody>
+          <a:bodyPr spcFirstLastPara="1" wrap="square" lIns="91425" tIns="91425" rIns="91425" bIns="91425" anchor="ctr" anchorCtr="0">
+            <a:noAutofit/>
+          </a:bodyPr>
+          <a:lstStyle>
+            <a:defPPr marR="0" lvl="0" algn="l" rtl="0">
+              <a:lnSpc>
+                <a:spcPct val="100000"/>
+              </a:lnSpc>
+              <a:spcBef>
+                <a:spcPts val="0"/>
+              </a:spcBef>
+              <a:spcAft>
+                <a:spcPts val="0"/>
+              </a:spcAft>
+            </a:defPPr>
+            <a:lvl1pPr marR="0" lvl="0" algn="ctr" rtl="0">
+              <a:lnSpc>
+                <a:spcPct val="100000"/>
+              </a:lnSpc>
+              <a:spcBef>
+                <a:spcPts val="0"/>
+              </a:spcBef>
+              <a:spcAft>
+                <a:spcPts val="0"/>
+              </a:spcAft>
+              <a:buClr>
+                <a:schemeClr val="dk1"/>
+              </a:buClr>
+              <a:buSzPts val="3000"/>
+              <a:buFont typeface="Doppio One"/>
+              <a:buNone/>
+              <a:defRPr sz="3000" b="1" i="0" u="none" strike="noStrike" cap="none">
+                <a:solidFill>
+                  <a:schemeClr val="accent2"/>
+                </a:solidFill>
+                <a:latin typeface="Doppio One"/>
+                <a:ea typeface="Doppio One"/>
+                <a:cs typeface="Doppio One"/>
+                <a:sym typeface="Doppio One"/>
+              </a:defRPr>
+            </a:lvl1pPr>
+            <a:lvl2pPr marR="0" lvl="1" algn="l" rtl="0">
+              <a:lnSpc>
+                <a:spcPct val="100000"/>
+              </a:lnSpc>
+              <a:spcBef>
+                <a:spcPts val="0"/>
+              </a:spcBef>
+              <a:spcAft>
+                <a:spcPts val="0"/>
+              </a:spcAft>
+              <a:buClr>
+                <a:schemeClr val="dk1"/>
+              </a:buClr>
+              <a:buSzPts val="3000"/>
+              <a:buFont typeface="Doppio One"/>
+              <a:buNone/>
+              <a:defRPr sz="3000" b="1" i="0" u="none" strike="noStrike" cap="none">
+                <a:solidFill>
+                  <a:schemeClr val="dk1"/>
+                </a:solidFill>
+                <a:latin typeface="Doppio One"/>
+                <a:ea typeface="Doppio One"/>
+                <a:cs typeface="Doppio One"/>
+                <a:sym typeface="Doppio One"/>
+              </a:defRPr>
+            </a:lvl2pPr>
+            <a:lvl3pPr marR="0" lvl="2" algn="l" rtl="0">
+              <a:lnSpc>
+                <a:spcPct val="100000"/>
+              </a:lnSpc>
+              <a:spcBef>
+                <a:spcPts val="0"/>
+              </a:spcBef>
+              <a:spcAft>
+                <a:spcPts val="0"/>
+              </a:spcAft>
+              <a:buClr>
+                <a:schemeClr val="dk1"/>
+              </a:buClr>
+              <a:buSzPts val="3000"/>
+              <a:buFont typeface="Doppio One"/>
+              <a:buNone/>
+              <a:defRPr sz="3000" b="1" i="0" u="none" strike="noStrike" cap="none">
+                <a:solidFill>
+                  <a:schemeClr val="dk1"/>
+                </a:solidFill>
+                <a:latin typeface="Doppio One"/>
+                <a:ea typeface="Doppio One"/>
+                <a:cs typeface="Doppio One"/>
+                <a:sym typeface="Doppio One"/>
+              </a:defRPr>
+            </a:lvl3pPr>
+            <a:lvl4pPr marR="0" lvl="3" algn="l" rtl="0">
+              <a:lnSpc>
+                <a:spcPct val="100000"/>
+              </a:lnSpc>
+              <a:spcBef>
+                <a:spcPts val="0"/>
+              </a:spcBef>
+              <a:spcAft>
+                <a:spcPts val="0"/>
+              </a:spcAft>
+              <a:buClr>
+                <a:schemeClr val="dk1"/>
+              </a:buClr>
+              <a:buSzPts val="3000"/>
+              <a:buFont typeface="Doppio One"/>
+              <a:buNone/>
+              <a:defRPr sz="3000" b="1" i="0" u="none" strike="noStrike" cap="none">
+                <a:solidFill>
+                  <a:schemeClr val="dk1"/>
+                </a:solidFill>
+                <a:latin typeface="Doppio One"/>
+                <a:ea typeface="Doppio One"/>
+                <a:cs typeface="Doppio One"/>
+                <a:sym typeface="Doppio One"/>
+              </a:defRPr>
+            </a:lvl4pPr>
+            <a:lvl5pPr marR="0" lvl="4" algn="l" rtl="0">
+              <a:lnSpc>
+                <a:spcPct val="100000"/>
+              </a:lnSpc>
+              <a:spcBef>
+                <a:spcPts val="0"/>
+              </a:spcBef>
+              <a:spcAft>
+                <a:spcPts val="0"/>
+              </a:spcAft>
+              <a:buClr>
+                <a:schemeClr val="dk1"/>
+              </a:buClr>
+              <a:buSzPts val="3000"/>
+              <a:buFont typeface="Doppio One"/>
+              <a:buNone/>
+              <a:defRPr sz="3000" b="1" i="0" u="none" strike="noStrike" cap="none">
+                <a:solidFill>
+                  <a:schemeClr val="dk1"/>
+                </a:solidFill>
+                <a:latin typeface="Doppio One"/>
+                <a:ea typeface="Doppio One"/>
+                <a:cs typeface="Doppio One"/>
+                <a:sym typeface="Doppio One"/>
+              </a:defRPr>
+            </a:lvl5pPr>
+            <a:lvl6pPr marR="0" lvl="5" algn="l" rtl="0">
+              <a:lnSpc>
+                <a:spcPct val="100000"/>
+              </a:lnSpc>
+              <a:spcBef>
+                <a:spcPts val="0"/>
+              </a:spcBef>
+              <a:spcAft>
+                <a:spcPts val="0"/>
+              </a:spcAft>
+              <a:buClr>
+                <a:schemeClr val="dk1"/>
+              </a:buClr>
+              <a:buSzPts val="3000"/>
+              <a:buFont typeface="Doppio One"/>
+              <a:buNone/>
+              <a:defRPr sz="3000" b="1" i="0" u="none" strike="noStrike" cap="none">
+                <a:solidFill>
+                  <a:schemeClr val="dk1"/>
+                </a:solidFill>
+                <a:latin typeface="Doppio One"/>
+                <a:ea typeface="Doppio One"/>
+                <a:cs typeface="Doppio One"/>
+                <a:sym typeface="Doppio One"/>
+              </a:defRPr>
+            </a:lvl6pPr>
+            <a:lvl7pPr marR="0" lvl="6" algn="l" rtl="0">
+              <a:lnSpc>
+                <a:spcPct val="100000"/>
+              </a:lnSpc>
+              <a:spcBef>
+                <a:spcPts val="0"/>
+              </a:spcBef>
+              <a:spcAft>
+                <a:spcPts val="0"/>
+              </a:spcAft>
+              <a:buClr>
+                <a:schemeClr val="dk1"/>
+              </a:buClr>
+              <a:buSzPts val="3000"/>
+              <a:buFont typeface="Doppio One"/>
+              <a:buNone/>
+              <a:defRPr sz="3000" b="1" i="0" u="none" strike="noStrike" cap="none">
+                <a:solidFill>
+                  <a:schemeClr val="dk1"/>
+                </a:solidFill>
+                <a:latin typeface="Doppio One"/>
+                <a:ea typeface="Doppio One"/>
+                <a:cs typeface="Doppio One"/>
+                <a:sym typeface="Doppio One"/>
+              </a:defRPr>
+            </a:lvl7pPr>
+            <a:lvl8pPr marR="0" lvl="7" algn="l" rtl="0">
+              <a:lnSpc>
+                <a:spcPct val="100000"/>
+              </a:lnSpc>
+              <a:spcBef>
+                <a:spcPts val="0"/>
+              </a:spcBef>
+              <a:spcAft>
+                <a:spcPts val="0"/>
+              </a:spcAft>
+              <a:buClr>
+                <a:schemeClr val="dk1"/>
+              </a:buClr>
+              <a:buSzPts val="3000"/>
+              <a:buFont typeface="Doppio One"/>
+              <a:buNone/>
+              <a:defRPr sz="3000" b="1" i="0" u="none" strike="noStrike" cap="none">
+                <a:solidFill>
+                  <a:schemeClr val="dk1"/>
+                </a:solidFill>
+                <a:latin typeface="Doppio One"/>
+                <a:ea typeface="Doppio One"/>
+                <a:cs typeface="Doppio One"/>
+                <a:sym typeface="Doppio One"/>
+              </a:defRPr>
+            </a:lvl8pPr>
+            <a:lvl9pPr marR="0" lvl="8" algn="l" rtl="0">
+              <a:lnSpc>
+                <a:spcPct val="100000"/>
+              </a:lnSpc>
+              <a:spcBef>
+                <a:spcPts val="0"/>
+              </a:spcBef>
+              <a:spcAft>
+                <a:spcPts val="0"/>
+              </a:spcAft>
+              <a:buClr>
+                <a:schemeClr val="dk1"/>
+              </a:buClr>
+              <a:buSzPts val="3000"/>
+              <a:buFont typeface="Doppio One"/>
+              <a:buNone/>
+              <a:defRPr sz="3000" b="1" i="0" u="none" strike="noStrike" cap="none">
+                <a:solidFill>
+                  <a:schemeClr val="dk1"/>
+                </a:solidFill>
+                <a:latin typeface="Doppio One"/>
+                <a:ea typeface="Doppio One"/>
+                <a:cs typeface="Doppio One"/>
+                <a:sym typeface="Doppio One"/>
+              </a:defRPr>
+            </a:lvl9pPr>
+          </a:lstStyle>
+          <a:p>
+            <a:r>
+              <a:rPr lang="en" sz="4000" dirty="0">
+                <a:solidFill>
+                  <a:schemeClr val="accent1">
+                    <a:lumMod val="50000"/>
+                  </a:schemeClr>
+                </a:solidFill>
+              </a:rPr>
+              <a:t>04</a:t>
+            </a:r>
+          </a:p>
+        </p:txBody>
+      </p:sp>
+      <p:sp>
+        <p:nvSpPr>
+          <p:cNvPr id="21" name="Google Shape;194;p31"/>
+          <p:cNvSpPr txBox="1">
+            <a:spLocks/>
+          </p:cNvSpPr>
+          <p:nvPr/>
+        </p:nvSpPr>
+        <p:spPr>
+          <a:xfrm>
+            <a:off x="5408750" y="480813"/>
+            <a:ext cx="3067080" cy="596900"/>
+          </a:xfrm>
+          <a:prstGeom prst="rect">
+            <a:avLst/>
+          </a:prstGeom>
+        </p:spPr>
+        <p:txBody>
+          <a:bodyPr spcFirstLastPara="1" wrap="square" lIns="91425" tIns="91425" rIns="91425" bIns="91425" anchor="t" anchorCtr="0">
+            <a:noAutofit/>
+          </a:bodyPr>
+          <a:lstStyle>
+            <a:lvl1pPr marL="228600" indent="-228600" algn="l" defTabSz="914400" rtl="0" eaLnBrk="1" latinLnBrk="0" hangingPunct="1">
+              <a:lnSpc>
+                <a:spcPct val="90000"/>
+              </a:lnSpc>
+              <a:spcBef>
+                <a:spcPts val="1000"/>
+              </a:spcBef>
+              <a:buFont typeface="Arial" panose="020B0604020202020204" pitchFamily="34" charset="0"/>
+              <a:buChar char="•"/>
+              <a:defRPr sz="2800" kern="1200">
+                <a:solidFill>
+                  <a:schemeClr val="tx1"/>
+                </a:solidFill>
+                <a:latin typeface="+mn-lt"/>
+                <a:ea typeface="+mn-ea"/>
+                <a:cs typeface="+mn-cs"/>
+              </a:defRPr>
+            </a:lvl1pPr>
+            <a:lvl2pPr marL="685800" indent="-228600" algn="l" defTabSz="914400" rtl="0" eaLnBrk="1" latinLnBrk="0" hangingPunct="1">
+              <a:lnSpc>
+                <a:spcPct val="90000"/>
+              </a:lnSpc>
+              <a:spcBef>
+                <a:spcPts val="500"/>
+              </a:spcBef>
+              <a:buFont typeface="Arial" panose="020B0604020202020204" pitchFamily="34" charset="0"/>
+              <a:buChar char="•"/>
+              <a:defRPr sz="2400" kern="1200">
+                <a:solidFill>
+                  <a:schemeClr val="tx1"/>
+                </a:solidFill>
+                <a:latin typeface="+mn-lt"/>
+                <a:ea typeface="+mn-ea"/>
+                <a:cs typeface="+mn-cs"/>
+              </a:defRPr>
+            </a:lvl2pPr>
+            <a:lvl3pPr marL="1143000" indent="-228600" algn="l" defTabSz="914400" rtl="0" eaLnBrk="1" latinLnBrk="0" hangingPunct="1">
+              <a:lnSpc>
+                <a:spcPct val="90000"/>
+              </a:lnSpc>
+              <a:spcBef>
+                <a:spcPts val="500"/>
+              </a:spcBef>
+              <a:buFont typeface="Arial" panose="020B0604020202020204" pitchFamily="34" charset="0"/>
+              <a:buChar char="•"/>
+              <a:defRPr sz="2000" kern="1200">
+                <a:solidFill>
+                  <a:schemeClr val="tx1"/>
+                </a:solidFill>
+                <a:latin typeface="+mn-lt"/>
+                <a:ea typeface="+mn-ea"/>
+                <a:cs typeface="+mn-cs"/>
+              </a:defRPr>
+            </a:lvl3pPr>
+            <a:lvl4pPr marL="1600200" indent="-228600" algn="l" defTabSz="914400" rtl="0" eaLnBrk="1" latinLnBrk="0" hangingPunct="1">
+              <a:lnSpc>
+                <a:spcPct val="90000"/>
+              </a:lnSpc>
+              <a:spcBef>
+                <a:spcPts val="500"/>
+              </a:spcBef>
+              <a:buFont typeface="Arial" panose="020B0604020202020204" pitchFamily="34" charset="0"/>
+              <a:buChar char="•"/>
+              <a:defRPr sz="1800" kern="1200">
+                <a:solidFill>
+                  <a:schemeClr val="tx1"/>
+                </a:solidFill>
+                <a:latin typeface="+mn-lt"/>
+                <a:ea typeface="+mn-ea"/>
+                <a:cs typeface="+mn-cs"/>
+              </a:defRPr>
+            </a:lvl4pPr>
+            <a:lvl5pPr marL="2057400" indent="-228600" algn="l" defTabSz="914400" rtl="0" eaLnBrk="1" latinLnBrk="0" hangingPunct="1">
+              <a:lnSpc>
+                <a:spcPct val="90000"/>
+              </a:lnSpc>
+              <a:spcBef>
+                <a:spcPts val="500"/>
+              </a:spcBef>
+              <a:buFont typeface="Arial" panose="020B0604020202020204" pitchFamily="34" charset="0"/>
+              <a:buChar char="•"/>
+              <a:defRPr sz="1800" kern="1200">
+                <a:solidFill>
+                  <a:schemeClr val="tx1"/>
+                </a:solidFill>
+                <a:latin typeface="+mn-lt"/>
+                <a:ea typeface="+mn-ea"/>
+                <a:cs typeface="+mn-cs"/>
+              </a:defRPr>
+            </a:lvl5pPr>
+            <a:lvl6pPr marL="2514600" indent="-228600" algn="l" defTabSz="914400" rtl="0" eaLnBrk="1" latinLnBrk="0" hangingPunct="1">
+              <a:lnSpc>
+                <a:spcPct val="90000"/>
+              </a:lnSpc>
+              <a:spcBef>
+                <a:spcPts val="500"/>
+              </a:spcBef>
+              <a:buFont typeface="Arial" panose="020B0604020202020204" pitchFamily="34" charset="0"/>
+              <a:buChar char="•"/>
+              <a:defRPr sz="1800" kern="1200">
+                <a:solidFill>
+                  <a:schemeClr val="tx1"/>
+                </a:solidFill>
+                <a:latin typeface="+mn-lt"/>
+                <a:ea typeface="+mn-ea"/>
+                <a:cs typeface="+mn-cs"/>
+              </a:defRPr>
+            </a:lvl6pPr>
+            <a:lvl7pPr marL="2971800" indent="-228600" algn="l" defTabSz="914400" rtl="0" eaLnBrk="1" latinLnBrk="0" hangingPunct="1">
+              <a:lnSpc>
+                <a:spcPct val="90000"/>
+              </a:lnSpc>
+              <a:spcBef>
+                <a:spcPts val="500"/>
+              </a:spcBef>
+              <a:buFont typeface="Arial" panose="020B0604020202020204" pitchFamily="34" charset="0"/>
+              <a:buChar char="•"/>
+              <a:defRPr sz="1800" kern="1200">
+                <a:solidFill>
+                  <a:schemeClr val="tx1"/>
+                </a:solidFill>
+                <a:latin typeface="+mn-lt"/>
+                <a:ea typeface="+mn-ea"/>
+                <a:cs typeface="+mn-cs"/>
+              </a:defRPr>
+            </a:lvl7pPr>
+            <a:lvl8pPr marL="3429000" indent="-228600" algn="l" defTabSz="914400" rtl="0" eaLnBrk="1" latinLnBrk="0" hangingPunct="1">
+              <a:lnSpc>
+                <a:spcPct val="90000"/>
+              </a:lnSpc>
+              <a:spcBef>
+                <a:spcPts val="500"/>
+              </a:spcBef>
+              <a:buFont typeface="Arial" panose="020B0604020202020204" pitchFamily="34" charset="0"/>
+              <a:buChar char="•"/>
+              <a:defRPr sz="1800" kern="1200">
+                <a:solidFill>
+                  <a:schemeClr val="tx1"/>
+                </a:solidFill>
+                <a:latin typeface="+mn-lt"/>
+                <a:ea typeface="+mn-ea"/>
+                <a:cs typeface="+mn-cs"/>
+              </a:defRPr>
+            </a:lvl8pPr>
+            <a:lvl9pPr marL="3886200" indent="-228600" algn="l" defTabSz="914400" rtl="0" eaLnBrk="1" latinLnBrk="0" hangingPunct="1">
+              <a:lnSpc>
+                <a:spcPct val="90000"/>
+              </a:lnSpc>
+              <a:spcBef>
+                <a:spcPts val="500"/>
+              </a:spcBef>
+              <a:buFont typeface="Arial" panose="020B0604020202020204" pitchFamily="34" charset="0"/>
+              <a:buChar char="•"/>
+              <a:defRPr sz="1800" kern="1200">
+                <a:solidFill>
+                  <a:schemeClr val="tx1"/>
+                </a:solidFill>
+                <a:latin typeface="+mn-lt"/>
+                <a:ea typeface="+mn-ea"/>
+                <a:cs typeface="+mn-cs"/>
+              </a:defRPr>
+            </a:lvl9pPr>
+          </a:lstStyle>
+          <a:p>
+            <a:pPr marL="0" indent="0">
+              <a:buNone/>
+            </a:pPr>
+            <a:r>
+              <a:rPr lang="fr-FR" sz="4000" b="1" dirty="0"/>
+              <a:t>Conclusion</a:t>
+            </a:r>
+          </a:p>
+        </p:txBody>
+      </p:sp>
       <p:pic>
         <p:nvPicPr>
           <p:cNvPr id="11" name="Image 10"/>
@@ -9893,7 +9759,7 @@
               <a:rPr lang="fr-FR" smtClean="0"/>
               <a:t>20</a:t>
             </a:fld>
-            <a:endParaRPr lang="fr-FR"/>
+            <a:endParaRPr lang="fr-FR" dirty="0"/>
           </a:p>
         </p:txBody>
       </p:sp>
@@ -9907,13 +9773,6 @@
   <p:clrMapOvr>
     <a:masterClrMapping/>
   </p:clrMapOvr>
-  <p:timing>
-    <p:tnLst>
-      <p:par>
-        <p:cTn id="1" dur="indefinite" restart="never" nodeType="tmRoot"/>
-      </p:par>
-    </p:tnLst>
-  </p:timing>
 </p:sld>
 </file>
 
@@ -9969,7 +9828,7 @@
               <a:buNone/>
             </a:pPr>
             <a:r>
-              <a:rPr lang="en" sz="5400" b="1" dirty="0" smtClean="0"/>
+              <a:rPr lang="en" sz="5400" b="1" dirty="0"/>
               <a:t>GANTT</a:t>
             </a:r>
             <a:endParaRPr sz="5400" b="1" dirty="0"/>
@@ -10052,13 +9911,6 @@
   <p:clrMapOvr>
     <a:masterClrMapping/>
   </p:clrMapOvr>
-  <p:timing>
-    <p:tnLst>
-      <p:par>
-        <p:cTn id="1" dur="indefinite" restart="never" nodeType="tmRoot"/>
-      </p:par>
-    </p:tnLst>
-  </p:timing>
 </p:sld>
 </file>
 
@@ -10114,8 +9966,14 @@
               <a:buNone/>
             </a:pPr>
             <a:r>
-              <a:rPr lang="en" sz="5400" b="1" dirty="0" smtClean="0">
-                <a:hlinkClick r:id="rId2"/>
+              <a:rPr lang="en" sz="5400" b="1" dirty="0">
+                <a:hlinkClick r:id="rId2">
+                  <a:extLst>
+                    <a:ext uri="{A12FA001-AC4F-418D-AE19-62706E023703}">
+                      <ahyp:hlinkClr xmlns:ahyp="http://schemas.microsoft.com/office/drawing/2018/hyperlinkcolor" val="tx"/>
+                    </a:ext>
+                  </a:extLst>
+                </a:hlinkClick>
               </a:rPr>
               <a:t>GITHUB</a:t>
             </a:r>
@@ -10199,13 +10057,6 @@
   <p:clrMapOvr>
     <a:masterClrMapping/>
   </p:clrMapOvr>
-  <p:timing>
-    <p:tnLst>
-      <p:par>
-        <p:cTn id="1" dur="indefinite" restart="never" nodeType="tmRoot"/>
-      </p:par>
-    </p:tnLst>
-  </p:timing>
 </p:sld>
 </file>
 
@@ -10261,7 +10112,7 @@
               <a:buNone/>
             </a:pPr>
             <a:r>
-              <a:rPr lang="en" sz="5400" b="1" dirty="0" smtClean="0">
+              <a:rPr lang="en" sz="5400" b="1" dirty="0">
                 <a:hlinkClick r:id="rId2"/>
               </a:rPr>
               <a:t>TRELLO</a:t>
@@ -10346,13 +10197,6 @@
   <p:clrMapOvr>
     <a:masterClrMapping/>
   </p:clrMapOvr>
-  <p:timing>
-    <p:tnLst>
-      <p:par>
-        <p:cTn id="1" dur="indefinite" restart="never" nodeType="tmRoot"/>
-      </p:par>
-    </p:tnLst>
-  </p:timing>
 </p:sld>
 </file>
 
@@ -10408,7 +10252,7 @@
               <a:buNone/>
             </a:pPr>
             <a:r>
-              <a:rPr lang="en" sz="5400" b="1" dirty="0" smtClean="0"/>
+              <a:rPr lang="en" sz="5400" b="1" dirty="0"/>
               <a:t>Démonstration des modules de tests et cahier de recette</a:t>
             </a:r>
           </a:p>
@@ -10490,13 +10334,6 @@
   <p:clrMapOvr>
     <a:masterClrMapping/>
   </p:clrMapOvr>
-  <p:timing>
-    <p:tnLst>
-      <p:par>
-        <p:cTn id="1" dur="indefinite" restart="never" nodeType="tmRoot"/>
-      </p:par>
-    </p:tnLst>
-  </p:timing>
 </p:sld>
 </file>
 
@@ -10552,7 +10389,7 @@
               <a:buNone/>
             </a:pPr>
             <a:r>
-              <a:rPr lang="en" sz="8000" b="1" dirty="0" smtClean="0">
+              <a:rPr lang="en" sz="8000" b="1" dirty="0">
                 <a:solidFill>
                   <a:srgbClr val="002060"/>
                 </a:solidFill>
@@ -10599,26 +10436,11 @@
               <a:buSzPts val="1100"/>
             </a:pPr>
             <a:r>
-              <a:rPr lang="fr-FR" sz="1200" dirty="0" smtClean="0">
+              <a:rPr lang="fr-FR" sz="1200" dirty="0">
                 <a:latin typeface="+mj-lt"/>
               </a:rPr>
-              <a:t>- Imprimer </a:t>
-            </a:r>
-            <a:r>
-              <a:rPr lang="fr-FR" sz="1200" dirty="0" smtClean="0">
-                <a:latin typeface="+mj-lt"/>
-              </a:rPr>
-              <a:t>: cahier de recette + synoptique + diagramme déploiement + manuel </a:t>
-            </a:r>
-            <a:r>
-              <a:rPr lang="fr-FR" sz="1200" dirty="0" smtClean="0">
-                <a:latin typeface="+mj-lt"/>
-              </a:rPr>
-              <a:t>d’utilisation (de tout le monde) + (scénario ?)</a:t>
-            </a:r>
-            <a:endParaRPr lang="fr-FR" sz="1200" dirty="0">
-              <a:latin typeface="+mj-lt"/>
-            </a:endParaRPr>
+              <a:t>- Imprimer : cahier de recette + synoptique + diagramme déploiement + manuel d’utilisation (de tout le monde) + (scénario ?)</a:t>
+            </a:r>
           </a:p>
           <a:p>
             <a:pPr marL="0" lvl="0" indent="0">
@@ -10629,56 +10451,47 @@
               <a:buNone/>
             </a:pPr>
             <a:r>
-              <a:rPr lang="fr-FR" sz="1200" dirty="0" smtClean="0">
+              <a:rPr lang="fr-FR" sz="1200" dirty="0">
                 <a:latin typeface="+mj-lt"/>
               </a:rPr>
               <a:t>- Faire </a:t>
             </a:r>
             <a:r>
-              <a:rPr lang="fr-FR" sz="1200" dirty="0" err="1" smtClean="0">
+              <a:rPr lang="fr-FR" sz="1200" dirty="0" err="1">
                 <a:latin typeface="+mj-lt"/>
               </a:rPr>
               <a:t>gantt</a:t>
             </a:r>
             <a:r>
-              <a:rPr lang="fr-FR" sz="1200" dirty="0" smtClean="0">
+              <a:rPr lang="fr-FR" sz="1200" dirty="0">
                 <a:latin typeface="+mj-lt"/>
               </a:rPr>
               <a:t> + </a:t>
             </a:r>
             <a:r>
-              <a:rPr lang="fr-FR" sz="1200" dirty="0" err="1" smtClean="0">
+              <a:rPr lang="fr-FR" sz="1200" dirty="0" err="1">
                 <a:latin typeface="+mj-lt"/>
               </a:rPr>
               <a:t>gantt</a:t>
             </a:r>
             <a:r>
-              <a:rPr lang="fr-FR" sz="1200" dirty="0" smtClean="0">
+              <a:rPr lang="fr-FR" sz="1200" dirty="0">
                 <a:latin typeface="+mj-lt"/>
               </a:rPr>
               <a:t> </a:t>
             </a:r>
             <a:r>
-              <a:rPr lang="fr-FR" sz="1200" dirty="0" err="1" smtClean="0">
+              <a:rPr lang="fr-FR" sz="1200" dirty="0" err="1">
                 <a:latin typeface="+mj-lt"/>
               </a:rPr>
               <a:t>prévi</a:t>
             </a:r>
             <a:r>
-              <a:rPr lang="fr-FR" sz="1200" dirty="0" smtClean="0">
+              <a:rPr lang="fr-FR" sz="1200" dirty="0">
                 <a:latin typeface="+mj-lt"/>
               </a:rPr>
-              <a:t> (que du perso</a:t>
-            </a:r>
-            <a:r>
-              <a:rPr lang="fr-FR" sz="1200" dirty="0" smtClean="0">
-                <a:latin typeface="+mj-lt"/>
-              </a:rPr>
-              <a:t>)</a:t>
-            </a:r>
-            <a:endParaRPr lang="fr-FR" sz="1200" dirty="0">
-              <a:latin typeface="+mj-lt"/>
-            </a:endParaRPr>
+              <a:t> (que du perso)</a:t>
+            </a:r>
           </a:p>
           <a:p>
             <a:pPr marL="0" lvl="0" indent="0">
@@ -10689,38 +10502,23 @@
               <a:buNone/>
             </a:pPr>
             <a:r>
-              <a:rPr lang="fr-FR" sz="1200" dirty="0" smtClean="0">
+              <a:rPr lang="fr-FR" sz="1200" dirty="0">
                 <a:latin typeface="+mj-lt"/>
               </a:rPr>
               <a:t>- </a:t>
             </a:r>
             <a:r>
-              <a:rPr lang="fr-FR" sz="1200" dirty="0" err="1" smtClean="0">
+              <a:rPr lang="fr-FR" sz="1200" dirty="0" err="1">
                 <a:latin typeface="+mj-lt"/>
               </a:rPr>
               <a:t>Modif</a:t>
             </a:r>
             <a:r>
-              <a:rPr lang="fr-FR" sz="1200" dirty="0" smtClean="0">
+              <a:rPr lang="fr-FR" sz="1200" dirty="0">
                 <a:latin typeface="+mj-lt"/>
               </a:rPr>
-              <a:t> </a:t>
-            </a:r>
-            <a:r>
-              <a:rPr lang="fr-FR" sz="1200" dirty="0" smtClean="0">
-                <a:latin typeface="+mj-lt"/>
-              </a:rPr>
-              <a:t>diagramme de </a:t>
-            </a:r>
-            <a:r>
-              <a:rPr lang="fr-FR" sz="1200" dirty="0" smtClean="0">
-                <a:latin typeface="+mj-lt"/>
-              </a:rPr>
-              <a:t>classe</a:t>
-            </a:r>
-            <a:endParaRPr lang="fr-FR" sz="1200" dirty="0">
-              <a:latin typeface="+mj-lt"/>
-            </a:endParaRPr>
+              <a:t> diagramme de classe</a:t>
+            </a:r>
           </a:p>
           <a:p>
             <a:pPr marL="0" lvl="0" indent="0">
@@ -10731,26 +10529,11 @@
               <a:buNone/>
             </a:pPr>
             <a:r>
-              <a:rPr lang="fr-FR" sz="1200" dirty="0" smtClean="0">
+              <a:rPr lang="fr-FR" sz="1200" dirty="0">
                 <a:latin typeface="+mj-lt"/>
               </a:rPr>
-              <a:t>- Finir </a:t>
-            </a:r>
-            <a:r>
-              <a:rPr lang="fr-FR" sz="1200" dirty="0" smtClean="0">
-                <a:latin typeface="+mj-lt"/>
-              </a:rPr>
-              <a:t>design </a:t>
-            </a:r>
-            <a:r>
-              <a:rPr lang="fr-FR" sz="1200" dirty="0" smtClean="0">
-                <a:latin typeface="+mj-lt"/>
-              </a:rPr>
-              <a:t>diapo</a:t>
-            </a:r>
-            <a:endParaRPr lang="fr-FR" sz="1200" dirty="0">
-              <a:latin typeface="+mj-lt"/>
-            </a:endParaRPr>
+              <a:t>- Finir design diapo</a:t>
+            </a:r>
           </a:p>
           <a:p>
             <a:pPr marL="0" lvl="0" indent="0">
@@ -10761,26 +10544,11 @@
               <a:buNone/>
             </a:pPr>
             <a:r>
-              <a:rPr lang="fr-FR" sz="1200" dirty="0" smtClean="0">
+              <a:rPr lang="fr-FR" sz="1200" dirty="0">
                 <a:latin typeface="+mj-lt"/>
               </a:rPr>
-              <a:t>- Nommer </a:t>
-            </a:r>
-            <a:r>
-              <a:rPr lang="fr-FR" sz="1200" dirty="0" smtClean="0">
-                <a:latin typeface="+mj-lt"/>
-              </a:rPr>
-              <a:t>les fichiers des modules de </a:t>
-            </a:r>
-            <a:r>
-              <a:rPr lang="fr-FR" sz="1200" dirty="0" smtClean="0">
-                <a:latin typeface="+mj-lt"/>
-              </a:rPr>
-              <a:t>tests</a:t>
-            </a:r>
-            <a:endParaRPr lang="fr-FR" sz="1200" dirty="0">
-              <a:latin typeface="+mj-lt"/>
-            </a:endParaRPr>
+              <a:t>- Nommer les fichiers des modules de tests</a:t>
+            </a:r>
           </a:p>
           <a:p>
             <a:pPr marL="0" lvl="0" indent="0">
@@ -10791,40 +10559,10 @@
               <a:buNone/>
             </a:pPr>
             <a:r>
-              <a:rPr lang="fr-FR" sz="1200" dirty="0" smtClean="0">
+              <a:rPr lang="fr-FR" sz="1200" dirty="0">
                 <a:latin typeface="+mj-lt"/>
               </a:rPr>
               <a:t>- Changer scénario</a:t>
-            </a:r>
-          </a:p>
-          <a:p>
-            <a:pPr marL="0" lvl="0" indent="0">
-              <a:buClr>
-                <a:schemeClr val="lt1"/>
-              </a:buClr>
-              <a:buSzPts val="1100"/>
-              <a:buNone/>
-            </a:pPr>
-            <a:r>
-              <a:rPr lang="fr-FR" sz="1200" dirty="0" smtClean="0">
-                <a:latin typeface="+mj-lt"/>
-              </a:rPr>
-              <a:t>- Finir CRA</a:t>
-            </a:r>
-          </a:p>
-          <a:p>
-            <a:pPr marL="0" lvl="0" indent="0">
-              <a:buClr>
-                <a:schemeClr val="lt1"/>
-              </a:buClr>
-              <a:buSzPts val="1100"/>
-              <a:buNone/>
-            </a:pPr>
-            <a:r>
-              <a:rPr lang="fr-FR" sz="1200" dirty="0" smtClean="0">
-                <a:latin typeface="+mj-lt"/>
-              </a:rPr>
-              <a:t>- Refaire le synoptique</a:t>
             </a:r>
           </a:p>
         </p:txBody>
@@ -10905,13 +10643,6 @@
   <p:clrMapOvr>
     <a:masterClrMapping/>
   </p:clrMapOvr>
-  <p:timing>
-    <p:tnLst>
-      <p:par>
-        <p:cTn id="1" dur="indefinite" restart="never" nodeType="tmRoot"/>
-      </p:par>
-    </p:tnLst>
-  </p:timing>
 </p:sld>
 </file>
 
@@ -11302,7 +11033,7 @@
           </a:lstStyle>
           <a:p>
             <a:r>
-              <a:rPr lang="en" sz="4000" dirty="0" smtClean="0">
+              <a:rPr lang="en" sz="4000" dirty="0">
                 <a:solidFill>
                   <a:schemeClr val="accent1">
                     <a:lumMod val="50000"/>
@@ -11504,10 +11235,9 @@
               <a:buNone/>
             </a:pPr>
             <a:r>
-              <a:rPr lang="fr-FR" sz="4000" b="1" dirty="0" smtClean="0"/>
+              <a:rPr lang="fr-FR" sz="4000" b="1" dirty="0"/>
               <a:t>Présentation du projet</a:t>
             </a:r>
-            <a:endParaRPr lang="fr-FR" sz="4000" b="1" dirty="0"/>
           </a:p>
         </p:txBody>
       </p:sp>
@@ -11611,7 +11341,7 @@
               <a:buNone/>
             </a:pPr>
             <a:r>
-              <a:rPr lang="en" sz="5400" b="1" dirty="0" smtClean="0"/>
+              <a:rPr lang="en" sz="5400" b="1" dirty="0"/>
               <a:t>Le but</a:t>
             </a:r>
             <a:endParaRPr sz="5400" b="1" dirty="0"/>
@@ -11733,13 +11463,6 @@
   <p:clrMapOvr>
     <a:masterClrMapping/>
   </p:clrMapOvr>
-  <p:timing>
-    <p:tnLst>
-      <p:par>
-        <p:cTn id="1" dur="indefinite" restart="never" nodeType="tmRoot"/>
-      </p:par>
-    </p:tnLst>
-  </p:timing>
 </p:sld>
 </file>
 
@@ -11795,7 +11518,7 @@
               <a:buNone/>
             </a:pPr>
             <a:r>
-              <a:rPr lang="en" sz="8000" b="1" dirty="0" smtClean="0">
+              <a:rPr lang="en" sz="8000" b="1" dirty="0">
                 <a:solidFill>
                   <a:srgbClr val="002060"/>
                 </a:solidFill>
@@ -11842,7 +11565,7 @@
               <a:buSzPts val="1100"/>
             </a:pPr>
             <a:r>
-              <a:rPr lang="fr-FR" sz="2400" dirty="0" smtClean="0">
+              <a:rPr lang="fr-FR" sz="2400" dirty="0">
                 <a:latin typeface="+mj-lt"/>
               </a:rPr>
               <a:t>- 4 personnes dans le groupe</a:t>
@@ -11855,7 +11578,7 @@
               </a:buClr>
               <a:buSzPts val="1100"/>
             </a:pPr>
-            <a:endParaRPr lang="fr-FR" sz="2400" dirty="0" smtClean="0">
+            <a:endParaRPr lang="fr-FR" sz="2400" dirty="0">
               <a:latin typeface="+mj-lt"/>
             </a:endParaRPr>
           </a:p>
@@ -11867,28 +11590,22 @@
               <a:buSzPts val="1100"/>
             </a:pPr>
             <a:r>
-              <a:rPr lang="fr-FR" sz="2400" dirty="0" smtClean="0">
+              <a:rPr lang="fr-FR" sz="2400" dirty="0">
                 <a:latin typeface="+mj-lt"/>
               </a:rPr>
               <a:t>- 1 personne qui gère le serveur linux (connexion avec le bus DMX, construction de la trame, configuration pour un serveur </a:t>
             </a:r>
             <a:r>
-              <a:rPr lang="fr-FR" sz="2400" dirty="0" err="1" smtClean="0">
+              <a:rPr lang="fr-FR" sz="2400" dirty="0" err="1">
                 <a:latin typeface="+mj-lt"/>
               </a:rPr>
               <a:t>websocket</a:t>
             </a:r>
             <a:r>
-              <a:rPr lang="fr-FR" sz="2400" dirty="0" smtClean="0">
-                <a:latin typeface="+mj-lt"/>
-              </a:rPr>
-              <a:t>), </a:t>
-            </a:r>
-            <a:r>
               <a:rPr lang="fr-FR" sz="2400" dirty="0">
                 <a:latin typeface="+mj-lt"/>
               </a:rPr>
-              <a:t>l’</a:t>
+              <a:t>), l’</a:t>
             </a:r>
             <a:r>
               <a:rPr lang="fr-FR" sz="2400" dirty="0" err="1">
@@ -11900,46 +11617,40 @@
               <a:rPr lang="fr-FR" sz="2400" dirty="0">
                 <a:latin typeface="+mj-lt"/>
               </a:rPr>
-              <a:t> C</a:t>
-            </a:r>
-            <a:r>
-              <a:rPr lang="fr-FR" sz="2400" dirty="0" smtClean="0">
-                <a:latin typeface="+mj-lt"/>
-              </a:rPr>
-              <a:t>++ sous </a:t>
-            </a:r>
-            <a:r>
-              <a:rPr lang="fr-FR" sz="2400" dirty="0" err="1" smtClean="0">
+              <a:t> C++ sous </a:t>
+            </a:r>
+            <a:r>
+              <a:rPr lang="fr-FR" sz="2400" dirty="0" err="1">
                 <a:latin typeface="+mj-lt"/>
               </a:rPr>
               <a:t>windows</a:t>
             </a:r>
             <a:r>
-              <a:rPr lang="fr-FR" sz="2400" dirty="0" smtClean="0">
+              <a:rPr lang="fr-FR" sz="2400" dirty="0">
                 <a:latin typeface="+mj-lt"/>
               </a:rPr>
               <a:t> (gestion des scènes, gestion des champs, canaux, implémentation de la librairie </a:t>
             </a:r>
             <a:r>
-              <a:rPr lang="fr-FR" sz="2400" dirty="0" err="1" smtClean="0">
+              <a:rPr lang="fr-FR" sz="2400" dirty="0" err="1">
                 <a:latin typeface="+mj-lt"/>
               </a:rPr>
               <a:t>arduino</a:t>
             </a:r>
             <a:r>
-              <a:rPr lang="fr-FR" sz="2400" dirty="0" smtClean="0">
+              <a:rPr lang="fr-FR" sz="2400" dirty="0">
                 <a:latin typeface="+mj-lt"/>
               </a:rPr>
               <a:t>, page pour piloter l’</a:t>
             </a:r>
             <a:r>
-              <a:rPr lang="fr-FR" sz="2400" dirty="0" err="1" smtClean="0">
+              <a:rPr lang="fr-FR" sz="2400" dirty="0" err="1">
                 <a:latin typeface="+mj-lt"/>
               </a:rPr>
               <a:t>arduino</a:t>
             </a:r>
             <a:r>
-              <a:rPr lang="fr-FR" sz="2400" dirty="0" smtClean="0">
+              <a:rPr lang="fr-FR" sz="2400" dirty="0">
                 <a:latin typeface="+mj-lt"/>
               </a:rPr>
               <a:t>)</a:t>
@@ -11982,22 +11693,10 @@
               <a:buSzPts val="1100"/>
             </a:pPr>
             <a:r>
-              <a:rPr lang="fr-FR" sz="2400" dirty="0" smtClean="0">
-                <a:latin typeface="+mj-lt"/>
-              </a:rPr>
-              <a:t>- 1 personne qui a géré les équipements (création, modification et suppression des équipements)</a:t>
-            </a:r>
-            <a:r>
               <a:rPr lang="fr-FR" sz="2400" dirty="0">
                 <a:latin typeface="+mj-lt"/>
               </a:rPr>
-              <a:t> </a:t>
-            </a:r>
-            <a:r>
-              <a:rPr lang="fr-FR" sz="2400" dirty="0" smtClean="0">
-                <a:latin typeface="+mj-lt"/>
-              </a:rPr>
-              <a:t>+ réadaptation du CRUD de l’IHM pour la table scène</a:t>
+              <a:t>- 1 personne qui a géré les équipements (création, modification et suppression des équipements) + réadaptation du CRUD de l’IHM pour la table scène</a:t>
             </a:r>
           </a:p>
         </p:txBody>
@@ -12034,25 +11733,25 @@
               <a:buSzPts val="1100"/>
             </a:pPr>
             <a:r>
-              <a:rPr lang="fr-FR" sz="2400" dirty="0" smtClean="0">
+              <a:rPr lang="fr-FR" sz="2400" dirty="0">
                 <a:latin typeface="+mj-lt"/>
               </a:rPr>
               <a:t>- 1 personne incompréhension du sujet, création de la librairie </a:t>
             </a:r>
             <a:r>
-              <a:rPr lang="fr-FR" sz="2400" dirty="0" err="1" smtClean="0">
+              <a:rPr lang="fr-FR" sz="2400" dirty="0" err="1">
                 <a:latin typeface="+mj-lt"/>
               </a:rPr>
               <a:t>arduino</a:t>
             </a:r>
             <a:r>
-              <a:rPr lang="fr-FR" sz="2400" dirty="0" smtClean="0">
+              <a:rPr lang="fr-FR" sz="2400" dirty="0">
                 <a:latin typeface="+mj-lt"/>
               </a:rPr>
               <a:t> pour la partie C++, de la console et du code </a:t>
             </a:r>
             <a:r>
-              <a:rPr lang="fr-FR" sz="2400" dirty="0" err="1" smtClean="0">
+              <a:rPr lang="fr-FR" sz="2400" dirty="0" err="1">
                 <a:latin typeface="+mj-lt"/>
               </a:rPr>
               <a:t>arduino</a:t>
@@ -12139,13 +11838,6 @@
   <p:clrMapOvr>
     <a:masterClrMapping/>
   </p:clrMapOvr>
-  <p:timing>
-    <p:tnLst>
-      <p:par>
-        <p:cTn id="1" dur="indefinite" restart="never" nodeType="tmRoot"/>
-      </p:par>
-    </p:tnLst>
-  </p:timing>
 </p:sld>
 </file>
 
@@ -12481,7 +12173,7 @@
           </a:lstStyle>
           <a:p>
             <a:r>
-              <a:rPr lang="en" sz="4000" dirty="0" smtClean="0">
+              <a:rPr lang="en" sz="4000" dirty="0">
                 <a:solidFill>
                   <a:schemeClr val="accent1">
                     <a:lumMod val="50000"/>
@@ -12683,10 +12375,9 @@
               <a:buNone/>
             </a:pPr>
             <a:r>
-              <a:rPr lang="fr-FR" sz="4000" b="1" dirty="0" smtClean="0"/>
+              <a:rPr lang="fr-FR" sz="4000" b="1" dirty="0"/>
               <a:t>Les Documentations</a:t>
             </a:r>
-            <a:endParaRPr lang="fr-FR" sz="4000" b="1" dirty="0"/>
           </a:p>
         </p:txBody>
       </p:sp>
@@ -12725,7 +12416,7 @@
               <a:buNone/>
             </a:pPr>
             <a:r>
-              <a:rPr lang="en" sz="5400" b="1" dirty="0" smtClean="0">
+              <a:rPr lang="en" sz="5400" b="1" dirty="0">
                 <a:solidFill>
                   <a:srgbClr val="002060"/>
                 </a:solidFill>
@@ -12902,13 +12593,6 @@
   <p:clrMapOvr>
     <a:masterClrMapping/>
   </p:clrMapOvr>
-  <p:timing>
-    <p:tnLst>
-      <p:par>
-        <p:cTn id="1" dur="indefinite" restart="never" nodeType="tmRoot"/>
-      </p:par>
-    </p:tnLst>
-  </p:timing>
 </p:sld>
 </file>
 
@@ -12941,8 +12625,8 @@
         </p:nvSpPr>
         <p:spPr>
           <a:xfrm>
-            <a:off x="957984" y="4060453"/>
-            <a:ext cx="3185905" cy="661244"/>
+            <a:off x="3104769" y="2988588"/>
+            <a:ext cx="5982462" cy="880824"/>
           </a:xfrm>
           <a:prstGeom prst="rect">
             <a:avLst/>
@@ -12964,13 +12648,56 @@
               <a:buNone/>
             </a:pPr>
             <a:r>
-              <a:rPr lang="en" sz="5400" b="1" dirty="0" smtClean="0"/>
-              <a:t>GANTT prévi</a:t>
+              <a:rPr lang="en" sz="5400" b="1" dirty="0"/>
+              <a:t>GANTT prévisionnel</a:t>
             </a:r>
             <a:endParaRPr sz="5400" b="1" dirty="0"/>
           </a:p>
         </p:txBody>
       </p:sp>
+      <p:pic>
+        <p:nvPicPr>
+          <p:cNvPr id="6" name="Image 5"/>
+          <p:cNvPicPr>
+            <a:picLocks noChangeAspect="1"/>
+          </p:cNvPicPr>
+          <p:nvPr/>
+        </p:nvPicPr>
+        <p:blipFill>
+          <a:blip r:embed="rId2" cstate="print">
+            <a:extLst>
+              <a:ext uri="{28A0092B-C50C-407E-A947-70E740481C1C}">
+                <a14:useLocalDpi xmlns:a14="http://schemas.microsoft.com/office/drawing/2010/main" val="0"/>
+              </a:ext>
+            </a:extLst>
+          </a:blip>
+          <a:stretch>
+            <a:fillRect/>
+          </a:stretch>
+        </p:blipFill>
+        <p:spPr>
+          <a:xfrm>
+            <a:off x="120073" y="6492182"/>
+            <a:ext cx="1477818" cy="248227"/>
+          </a:xfrm>
+          <a:prstGeom prst="rect">
+            <a:avLst/>
+          </a:prstGeom>
+          <a:effectLst>
+            <a:glow rad="127000">
+              <a:schemeClr val="accent1">
+                <a:alpha val="0"/>
+              </a:schemeClr>
+            </a:glow>
+            <a:outerShdw blurRad="50800" dist="50800" dir="5400000" algn="ctr" rotWithShape="0">
+              <a:srgbClr val="000000">
+                <a:alpha val="0"/>
+              </a:srgbClr>
+            </a:outerShdw>
+            <a:reflection endPos="65000" dist="50800" dir="5400000" sy="-100000" algn="bl" rotWithShape="0"/>
+          </a:effectLst>
+        </p:spPr>
+      </p:pic>
       <p:sp>
         <p:nvSpPr>
           <p:cNvPr id="3" name="Espace réservé du numéro de diapositive 2"/>
@@ -12997,20 +12724,13 @@
     </p:spTree>
     <p:extLst>
       <p:ext uri="{BB962C8B-B14F-4D97-AF65-F5344CB8AC3E}">
-        <p14:creationId xmlns:p14="http://schemas.microsoft.com/office/powerpoint/2010/main" val="1101787734"/>
+        <p14:creationId xmlns:p14="http://schemas.microsoft.com/office/powerpoint/2010/main" val="1573474146"/>
       </p:ext>
     </p:extLst>
   </p:cSld>
   <p:clrMapOvr>
     <a:masterClrMapping/>
   </p:clrMapOvr>
-  <p:timing>
-    <p:tnLst>
-      <p:par>
-        <p:cTn id="1" dur="indefinite" restart="never" nodeType="tmRoot"/>
-      </p:par>
-    </p:tnLst>
-  </p:timing>
 </p:sld>
 </file>
 
@@ -13066,7 +12786,7 @@
               <a:buNone/>
             </a:pPr>
             <a:r>
-              <a:rPr lang="en" sz="5400" b="1" dirty="0" smtClean="0">
+              <a:rPr lang="en" sz="5400" b="1" dirty="0">
                 <a:solidFill>
                   <a:srgbClr val="002060"/>
                 </a:solidFill>
@@ -13186,13 +12906,6 @@
   <p:clrMapOvr>
     <a:masterClrMapping/>
   </p:clrMapOvr>
-  <p:timing>
-    <p:tnLst>
-      <p:par>
-        <p:cTn id="1" dur="indefinite" restart="never" nodeType="tmRoot"/>
-      </p:par>
-    </p:tnLst>
-  </p:timing>
 </p:sld>
 </file>
 
@@ -13248,7 +12961,7 @@
               <a:buNone/>
             </a:pPr>
             <a:r>
-              <a:rPr lang="en" sz="5400" b="1" dirty="0" smtClean="0">
+              <a:rPr lang="en" sz="5400" b="1" dirty="0">
                 <a:solidFill>
                   <a:srgbClr val="002060"/>
                 </a:solidFill>
@@ -13526,13 +13239,6 @@
   <p:clrMapOvr>
     <a:masterClrMapping/>
   </p:clrMapOvr>
-  <p:timing>
-    <p:tnLst>
-      <p:par>
-        <p:cTn id="1" dur="indefinite" restart="never" nodeType="tmRoot"/>
-      </p:par>
-    </p:tnLst>
-  </p:timing>
 </p:sld>
 </file>
 
@@ -13588,7 +13294,7 @@
               <a:buNone/>
             </a:pPr>
             <a:r>
-              <a:rPr lang="en" sz="5400" b="1" dirty="0" smtClean="0">
+              <a:rPr lang="en" sz="5400" b="1" dirty="0">
                 <a:solidFill>
                   <a:srgbClr val="002060"/>
                 </a:solidFill>
@@ -13755,13 +13461,6 @@
   <p:clrMapOvr>
     <a:masterClrMapping/>
   </p:clrMapOvr>
-  <p:timing>
-    <p:tnLst>
-      <p:par>
-        <p:cTn id="1" dur="indefinite" restart="never" nodeType="tmRoot"/>
-      </p:par>
-    </p:tnLst>
-  </p:timing>
 </p:sld>
 </file>
 

</xml_diff>